<commit_message>
Add map_shelf and modify map_pptx
</commit_message>
<xml_diff>
--- a/img/map_make/map_pptx/map 2.0.pptx
+++ b/img/map_make/map_pptx/map 2.0.pptx
@@ -8,7 +8,8 @@
     <p:sldId id="269" r:id="rId2"/>
     <p:sldId id="270" r:id="rId3"/>
     <p:sldId id="272" r:id="rId4"/>
-    <p:sldId id="273" r:id="rId5"/>
+    <p:sldId id="274" r:id="rId5"/>
+    <p:sldId id="273" r:id="rId6"/>
   </p:sldIdLst>
   <p:sldSz cx="12192000" cy="6858000"/>
   <p:notesSz cx="6858000" cy="9144000"/>
@@ -107,6 +108,11 @@
       </a:defRPr>
     </a:lvl9pPr>
   </p:defaultTextStyle>
+  <p:extLst>
+    <p:ext uri="{EFAFB233-063F-42B5-8137-9DF3F51BA10A}">
+      <p15:sldGuideLst xmlns:p15="http://schemas.microsoft.com/office/powerpoint/2012/main"/>
+    </p:ext>
+  </p:extLst>
 </p:presentation>
 </file>
 
@@ -4352,286 +4358,6 @@
           </a:fontRef>
         </p:style>
       </p:cxnSp>
-      <p:sp>
-        <p:nvSpPr>
-          <p:cNvPr id="13" name="직사각형 12">
-            <a:extLst>
-              <a:ext uri="{FF2B5EF4-FFF2-40B4-BE49-F238E27FC236}">
-                <a16:creationId xmlns:a16="http://schemas.microsoft.com/office/drawing/2014/main" id="{C2CA37F7-1F53-4222-B698-CE566A75DFF6}"/>
-              </a:ext>
-            </a:extLst>
-          </p:cNvPr>
-          <p:cNvSpPr/>
-          <p:nvPr/>
-        </p:nvSpPr>
-        <p:spPr>
-          <a:xfrm>
-            <a:off x="7364340" y="3621618"/>
-            <a:ext cx="282857" cy="158969"/>
-          </a:xfrm>
-          <a:prstGeom prst="rect">
-            <a:avLst/>
-          </a:prstGeom>
-          <a:solidFill>
-            <a:srgbClr val="FF7C80"/>
-          </a:solidFill>
-          <a:ln w="19050">
-            <a:solidFill>
-              <a:schemeClr val="tx1"/>
-            </a:solidFill>
-          </a:ln>
-        </p:spPr>
-        <p:style>
-          <a:lnRef idx="2">
-            <a:schemeClr val="accent1">
-              <a:shade val="50000"/>
-            </a:schemeClr>
-          </a:lnRef>
-          <a:fillRef idx="1">
-            <a:schemeClr val="accent1"/>
-          </a:fillRef>
-          <a:effectRef idx="0">
-            <a:schemeClr val="accent1"/>
-          </a:effectRef>
-          <a:fontRef idx="minor">
-            <a:schemeClr val="lt1"/>
-          </a:fontRef>
-        </p:style>
-        <p:txBody>
-          <a:bodyPr rtlCol="0" anchor="ctr"/>
-          <a:lstStyle/>
-          <a:p>
-            <a:pPr algn="ctr"/>
-            <a:endParaRPr lang="ko-KR" altLang="en-US" sz="688"/>
-          </a:p>
-        </p:txBody>
-      </p:sp>
-      <p:sp>
-        <p:nvSpPr>
-          <p:cNvPr id="14" name="직사각형 13">
-            <a:extLst>
-              <a:ext uri="{FF2B5EF4-FFF2-40B4-BE49-F238E27FC236}">
-                <a16:creationId xmlns:a16="http://schemas.microsoft.com/office/drawing/2014/main" id="{4915F500-2BE0-41A8-AE36-DA3C80CED566}"/>
-              </a:ext>
-            </a:extLst>
-          </p:cNvPr>
-          <p:cNvSpPr/>
-          <p:nvPr/>
-        </p:nvSpPr>
-        <p:spPr>
-          <a:xfrm>
-            <a:off x="7082055" y="3621316"/>
-            <a:ext cx="282857" cy="158969"/>
-          </a:xfrm>
-          <a:prstGeom prst="rect">
-            <a:avLst/>
-          </a:prstGeom>
-          <a:solidFill>
-            <a:srgbClr val="FF7C80"/>
-          </a:solidFill>
-          <a:ln w="19050">
-            <a:solidFill>
-              <a:schemeClr val="tx1"/>
-            </a:solidFill>
-          </a:ln>
-        </p:spPr>
-        <p:style>
-          <a:lnRef idx="2">
-            <a:schemeClr val="accent1">
-              <a:shade val="50000"/>
-            </a:schemeClr>
-          </a:lnRef>
-          <a:fillRef idx="1">
-            <a:schemeClr val="accent1"/>
-          </a:fillRef>
-          <a:effectRef idx="0">
-            <a:schemeClr val="accent1"/>
-          </a:effectRef>
-          <a:fontRef idx="minor">
-            <a:schemeClr val="lt1"/>
-          </a:fontRef>
-        </p:style>
-        <p:txBody>
-          <a:bodyPr rtlCol="0" anchor="ctr"/>
-          <a:lstStyle/>
-          <a:p>
-            <a:pPr algn="ctr"/>
-            <a:endParaRPr lang="ko-KR" altLang="en-US" sz="688"/>
-          </a:p>
-        </p:txBody>
-      </p:sp>
-      <p:cxnSp>
-        <p:nvCxnSpPr>
-          <p:cNvPr id="15" name="직선 연결선 14">
-            <a:extLst>
-              <a:ext uri="{FF2B5EF4-FFF2-40B4-BE49-F238E27FC236}">
-                <a16:creationId xmlns:a16="http://schemas.microsoft.com/office/drawing/2014/main" id="{D2765817-D032-462D-8AD1-6F51ED4153F9}"/>
-              </a:ext>
-            </a:extLst>
-          </p:cNvPr>
-          <p:cNvCxnSpPr>
-            <a:cxnSpLocks/>
-          </p:cNvCxnSpPr>
-          <p:nvPr/>
-        </p:nvCxnSpPr>
-        <p:spPr>
-          <a:xfrm>
-            <a:off x="7084464" y="3748191"/>
-            <a:ext cx="565714" cy="0"/>
-          </a:xfrm>
-          <a:prstGeom prst="line">
-            <a:avLst/>
-          </a:prstGeom>
-          <a:ln w="19050">
-            <a:solidFill>
-              <a:schemeClr val="tx1"/>
-            </a:solidFill>
-          </a:ln>
-        </p:spPr>
-        <p:style>
-          <a:lnRef idx="1">
-            <a:schemeClr val="accent1"/>
-          </a:lnRef>
-          <a:fillRef idx="0">
-            <a:schemeClr val="accent1"/>
-          </a:fillRef>
-          <a:effectRef idx="0">
-            <a:schemeClr val="accent1"/>
-          </a:effectRef>
-          <a:fontRef idx="minor">
-            <a:schemeClr val="tx1"/>
-          </a:fontRef>
-        </p:style>
-      </p:cxnSp>
-      <p:cxnSp>
-        <p:nvCxnSpPr>
-          <p:cNvPr id="16" name="직선 연결선 15">
-            <a:extLst>
-              <a:ext uri="{FF2B5EF4-FFF2-40B4-BE49-F238E27FC236}">
-                <a16:creationId xmlns:a16="http://schemas.microsoft.com/office/drawing/2014/main" id="{F969EA7B-A7FC-4BE7-B481-88ECAB5F0D48}"/>
-              </a:ext>
-            </a:extLst>
-          </p:cNvPr>
-          <p:cNvCxnSpPr>
-            <a:cxnSpLocks/>
-          </p:cNvCxnSpPr>
-          <p:nvPr/>
-        </p:nvCxnSpPr>
-        <p:spPr>
-          <a:xfrm>
-            <a:off x="7079929" y="3717196"/>
-            <a:ext cx="565714" cy="0"/>
-          </a:xfrm>
-          <a:prstGeom prst="line">
-            <a:avLst/>
-          </a:prstGeom>
-          <a:ln w="19050">
-            <a:solidFill>
-              <a:schemeClr val="tx1"/>
-            </a:solidFill>
-          </a:ln>
-        </p:spPr>
-        <p:style>
-          <a:lnRef idx="1">
-            <a:schemeClr val="accent1"/>
-          </a:lnRef>
-          <a:fillRef idx="0">
-            <a:schemeClr val="accent1"/>
-          </a:fillRef>
-          <a:effectRef idx="0">
-            <a:schemeClr val="accent1"/>
-          </a:effectRef>
-          <a:fontRef idx="minor">
-            <a:schemeClr val="tx1"/>
-          </a:fontRef>
-        </p:style>
-      </p:cxnSp>
-      <p:cxnSp>
-        <p:nvCxnSpPr>
-          <p:cNvPr id="17" name="직선 연결선 16">
-            <a:extLst>
-              <a:ext uri="{FF2B5EF4-FFF2-40B4-BE49-F238E27FC236}">
-                <a16:creationId xmlns:a16="http://schemas.microsoft.com/office/drawing/2014/main" id="{65C3780F-229E-4618-BDE8-221A95C47D87}"/>
-              </a:ext>
-            </a:extLst>
-          </p:cNvPr>
-          <p:cNvCxnSpPr>
-            <a:cxnSpLocks/>
-          </p:cNvCxnSpPr>
-          <p:nvPr/>
-        </p:nvCxnSpPr>
-        <p:spPr>
-          <a:xfrm>
-            <a:off x="7082197" y="3683176"/>
-            <a:ext cx="565714" cy="0"/>
-          </a:xfrm>
-          <a:prstGeom prst="line">
-            <a:avLst/>
-          </a:prstGeom>
-          <a:ln w="19050">
-            <a:solidFill>
-              <a:schemeClr val="tx1"/>
-            </a:solidFill>
-          </a:ln>
-        </p:spPr>
-        <p:style>
-          <a:lnRef idx="1">
-            <a:schemeClr val="accent1"/>
-          </a:lnRef>
-          <a:fillRef idx="0">
-            <a:schemeClr val="accent1"/>
-          </a:fillRef>
-          <a:effectRef idx="0">
-            <a:schemeClr val="accent1"/>
-          </a:effectRef>
-          <a:fontRef idx="minor">
-            <a:schemeClr val="tx1"/>
-          </a:fontRef>
-        </p:style>
-      </p:cxnSp>
-      <p:cxnSp>
-        <p:nvCxnSpPr>
-          <p:cNvPr id="18" name="직선 연결선 17">
-            <a:extLst>
-              <a:ext uri="{FF2B5EF4-FFF2-40B4-BE49-F238E27FC236}">
-                <a16:creationId xmlns:a16="http://schemas.microsoft.com/office/drawing/2014/main" id="{39E5C078-4EFA-434D-8E19-4FF3E8026768}"/>
-              </a:ext>
-            </a:extLst>
-          </p:cNvPr>
-          <p:cNvCxnSpPr>
-            <a:cxnSpLocks/>
-          </p:cNvCxnSpPr>
-          <p:nvPr/>
-        </p:nvCxnSpPr>
-        <p:spPr>
-          <a:xfrm>
-            <a:off x="7084464" y="3652672"/>
-            <a:ext cx="565714" cy="0"/>
-          </a:xfrm>
-          <a:prstGeom prst="line">
-            <a:avLst/>
-          </a:prstGeom>
-          <a:ln w="19050">
-            <a:solidFill>
-              <a:schemeClr val="tx1"/>
-            </a:solidFill>
-          </a:ln>
-        </p:spPr>
-        <p:style>
-          <a:lnRef idx="1">
-            <a:schemeClr val="accent1"/>
-          </a:lnRef>
-          <a:fillRef idx="0">
-            <a:schemeClr val="accent1"/>
-          </a:fillRef>
-          <a:effectRef idx="0">
-            <a:schemeClr val="accent1"/>
-          </a:effectRef>
-          <a:fontRef idx="minor">
-            <a:schemeClr val="tx1"/>
-          </a:fontRef>
-        </p:style>
-      </p:cxnSp>
       <p:cxnSp>
         <p:nvCxnSpPr>
           <p:cNvPr id="63" name="직선 연결선 62">
@@ -7991,7 +7717,7 @@
         </p:nvSpPr>
         <p:spPr>
           <a:xfrm>
-            <a:off x="7082055" y="3779392"/>
+            <a:off x="7080467" y="3779392"/>
             <a:ext cx="615600" cy="302091"/>
           </a:xfrm>
           <a:prstGeom prst="rect">
@@ -8350,6 +8076,318 @@
           </a:p>
         </p:txBody>
       </p:sp>
+      <p:sp>
+        <p:nvSpPr>
+          <p:cNvPr id="94" name="직사각형 93">
+            <a:extLst>
+              <a:ext uri="{FF2B5EF4-FFF2-40B4-BE49-F238E27FC236}">
+                <a16:creationId xmlns:a16="http://schemas.microsoft.com/office/drawing/2014/main" id="{D303E271-C1DB-4375-B8B0-493D1E16C11B}"/>
+              </a:ext>
+            </a:extLst>
+          </p:cNvPr>
+          <p:cNvSpPr/>
+          <p:nvPr/>
+        </p:nvSpPr>
+        <p:spPr>
+          <a:xfrm>
+            <a:off x="7079787" y="3419176"/>
+            <a:ext cx="563589" cy="158969"/>
+          </a:xfrm>
+          <a:prstGeom prst="rect">
+            <a:avLst/>
+          </a:prstGeom>
+          <a:solidFill>
+            <a:srgbClr val="FF7C80"/>
+          </a:solidFill>
+          <a:ln w="19050">
+            <a:solidFill>
+              <a:schemeClr val="tx1"/>
+            </a:solidFill>
+          </a:ln>
+        </p:spPr>
+        <p:style>
+          <a:lnRef idx="2">
+            <a:schemeClr val="accent1">
+              <a:shade val="50000"/>
+            </a:schemeClr>
+          </a:lnRef>
+          <a:fillRef idx="1">
+            <a:schemeClr val="accent1"/>
+          </a:fillRef>
+          <a:effectRef idx="0">
+            <a:schemeClr val="accent1"/>
+          </a:effectRef>
+          <a:fontRef idx="minor">
+            <a:schemeClr val="lt1"/>
+          </a:fontRef>
+        </p:style>
+        <p:txBody>
+          <a:bodyPr rtlCol="0" anchor="ctr"/>
+          <a:lstStyle/>
+          <a:p>
+            <a:pPr algn="ctr"/>
+            <a:endParaRPr lang="ko-KR" altLang="en-US" sz="688"/>
+          </a:p>
+        </p:txBody>
+      </p:sp>
+      <p:cxnSp>
+        <p:nvCxnSpPr>
+          <p:cNvPr id="95" name="직선 연결선 94">
+            <a:extLst>
+              <a:ext uri="{FF2B5EF4-FFF2-40B4-BE49-F238E27FC236}">
+                <a16:creationId xmlns:a16="http://schemas.microsoft.com/office/drawing/2014/main" id="{977F09A2-EB22-496E-BC8C-3CCD2FBD270A}"/>
+              </a:ext>
+            </a:extLst>
+          </p:cNvPr>
+          <p:cNvCxnSpPr>
+            <a:cxnSpLocks/>
+          </p:cNvCxnSpPr>
+          <p:nvPr/>
+        </p:nvCxnSpPr>
+        <p:spPr>
+          <a:xfrm>
+            <a:off x="7082196" y="3546051"/>
+            <a:ext cx="565714" cy="0"/>
+          </a:xfrm>
+          <a:prstGeom prst="line">
+            <a:avLst/>
+          </a:prstGeom>
+          <a:ln w="19050">
+            <a:solidFill>
+              <a:schemeClr val="tx1"/>
+            </a:solidFill>
+          </a:ln>
+        </p:spPr>
+        <p:style>
+          <a:lnRef idx="1">
+            <a:schemeClr val="accent1"/>
+          </a:lnRef>
+          <a:fillRef idx="0">
+            <a:schemeClr val="accent1"/>
+          </a:fillRef>
+          <a:effectRef idx="0">
+            <a:schemeClr val="accent1"/>
+          </a:effectRef>
+          <a:fontRef idx="minor">
+            <a:schemeClr val="tx1"/>
+          </a:fontRef>
+        </p:style>
+      </p:cxnSp>
+      <p:cxnSp>
+        <p:nvCxnSpPr>
+          <p:cNvPr id="99" name="직선 연결선 98">
+            <a:extLst>
+              <a:ext uri="{FF2B5EF4-FFF2-40B4-BE49-F238E27FC236}">
+                <a16:creationId xmlns:a16="http://schemas.microsoft.com/office/drawing/2014/main" id="{6877FB1D-E82B-4F72-A025-4D02626D2C86}"/>
+              </a:ext>
+            </a:extLst>
+          </p:cNvPr>
+          <p:cNvCxnSpPr>
+            <a:cxnSpLocks/>
+          </p:cNvCxnSpPr>
+          <p:nvPr/>
+        </p:nvCxnSpPr>
+        <p:spPr>
+          <a:xfrm>
+            <a:off x="7077662" y="3515056"/>
+            <a:ext cx="565714" cy="0"/>
+          </a:xfrm>
+          <a:prstGeom prst="line">
+            <a:avLst/>
+          </a:prstGeom>
+          <a:ln w="19050">
+            <a:solidFill>
+              <a:schemeClr val="tx1"/>
+            </a:solidFill>
+          </a:ln>
+        </p:spPr>
+        <p:style>
+          <a:lnRef idx="1">
+            <a:schemeClr val="accent1"/>
+          </a:lnRef>
+          <a:fillRef idx="0">
+            <a:schemeClr val="accent1"/>
+          </a:fillRef>
+          <a:effectRef idx="0">
+            <a:schemeClr val="accent1"/>
+          </a:effectRef>
+          <a:fontRef idx="minor">
+            <a:schemeClr val="tx1"/>
+          </a:fontRef>
+        </p:style>
+      </p:cxnSp>
+      <p:cxnSp>
+        <p:nvCxnSpPr>
+          <p:cNvPr id="100" name="직선 연결선 99">
+            <a:extLst>
+              <a:ext uri="{FF2B5EF4-FFF2-40B4-BE49-F238E27FC236}">
+                <a16:creationId xmlns:a16="http://schemas.microsoft.com/office/drawing/2014/main" id="{E5F942CC-BAFF-4A3D-9C96-3B9AFF0C609D}"/>
+              </a:ext>
+            </a:extLst>
+          </p:cNvPr>
+          <p:cNvCxnSpPr>
+            <a:cxnSpLocks/>
+          </p:cNvCxnSpPr>
+          <p:nvPr/>
+        </p:nvCxnSpPr>
+        <p:spPr>
+          <a:xfrm>
+            <a:off x="7079929" y="3481036"/>
+            <a:ext cx="565714" cy="0"/>
+          </a:xfrm>
+          <a:prstGeom prst="line">
+            <a:avLst/>
+          </a:prstGeom>
+          <a:ln w="19050">
+            <a:solidFill>
+              <a:schemeClr val="tx1"/>
+            </a:solidFill>
+          </a:ln>
+        </p:spPr>
+        <p:style>
+          <a:lnRef idx="1">
+            <a:schemeClr val="accent1"/>
+          </a:lnRef>
+          <a:fillRef idx="0">
+            <a:schemeClr val="accent1"/>
+          </a:fillRef>
+          <a:effectRef idx="0">
+            <a:schemeClr val="accent1"/>
+          </a:effectRef>
+          <a:fontRef idx="minor">
+            <a:schemeClr val="tx1"/>
+          </a:fontRef>
+        </p:style>
+      </p:cxnSp>
+      <p:cxnSp>
+        <p:nvCxnSpPr>
+          <p:cNvPr id="101" name="직선 연결선 100">
+            <a:extLst>
+              <a:ext uri="{FF2B5EF4-FFF2-40B4-BE49-F238E27FC236}">
+                <a16:creationId xmlns:a16="http://schemas.microsoft.com/office/drawing/2014/main" id="{6C128CD1-DE78-43BD-BE32-2097EA74FA4C}"/>
+              </a:ext>
+            </a:extLst>
+          </p:cNvPr>
+          <p:cNvCxnSpPr>
+            <a:cxnSpLocks/>
+          </p:cNvCxnSpPr>
+          <p:nvPr/>
+        </p:nvCxnSpPr>
+        <p:spPr>
+          <a:xfrm>
+            <a:off x="7082196" y="3450532"/>
+            <a:ext cx="565714" cy="0"/>
+          </a:xfrm>
+          <a:prstGeom prst="line">
+            <a:avLst/>
+          </a:prstGeom>
+          <a:ln w="19050">
+            <a:solidFill>
+              <a:schemeClr val="tx1"/>
+            </a:solidFill>
+          </a:ln>
+        </p:spPr>
+        <p:style>
+          <a:lnRef idx="1">
+            <a:schemeClr val="accent1"/>
+          </a:lnRef>
+          <a:fillRef idx="0">
+            <a:schemeClr val="accent1"/>
+          </a:fillRef>
+          <a:effectRef idx="0">
+            <a:schemeClr val="accent1"/>
+          </a:effectRef>
+          <a:fontRef idx="minor">
+            <a:schemeClr val="tx1"/>
+          </a:fontRef>
+        </p:style>
+      </p:cxnSp>
+      <p:cxnSp>
+        <p:nvCxnSpPr>
+          <p:cNvPr id="105" name="직선 연결선 104">
+            <a:extLst>
+              <a:ext uri="{FF2B5EF4-FFF2-40B4-BE49-F238E27FC236}">
+                <a16:creationId xmlns:a16="http://schemas.microsoft.com/office/drawing/2014/main" id="{DFCCFC54-08A7-49EA-AD2E-E2F9E69F1729}"/>
+              </a:ext>
+            </a:extLst>
+          </p:cNvPr>
+          <p:cNvCxnSpPr>
+            <a:cxnSpLocks/>
+          </p:cNvCxnSpPr>
+          <p:nvPr/>
+        </p:nvCxnSpPr>
+        <p:spPr>
+          <a:xfrm>
+            <a:off x="7369853" y="3419159"/>
+            <a:ext cx="14" cy="158969"/>
+          </a:xfrm>
+          <a:prstGeom prst="line">
+            <a:avLst/>
+          </a:prstGeom>
+          <a:ln w="19050">
+            <a:solidFill>
+              <a:schemeClr val="tx1"/>
+            </a:solidFill>
+          </a:ln>
+        </p:spPr>
+        <p:style>
+          <a:lnRef idx="1">
+            <a:schemeClr val="accent1"/>
+          </a:lnRef>
+          <a:fillRef idx="0">
+            <a:schemeClr val="accent1"/>
+          </a:fillRef>
+          <a:effectRef idx="0">
+            <a:schemeClr val="accent1"/>
+          </a:effectRef>
+          <a:fontRef idx="minor">
+            <a:schemeClr val="tx1"/>
+          </a:fontRef>
+        </p:style>
+      </p:cxnSp>
+      <p:cxnSp>
+        <p:nvCxnSpPr>
+          <p:cNvPr id="106" name="직선 연결선 105">
+            <a:extLst>
+              <a:ext uri="{FF2B5EF4-FFF2-40B4-BE49-F238E27FC236}">
+                <a16:creationId xmlns:a16="http://schemas.microsoft.com/office/drawing/2014/main" id="{AAC024DE-4988-4C85-AA3E-6F3C03CAAD8D}"/>
+              </a:ext>
+            </a:extLst>
+          </p:cNvPr>
+          <p:cNvCxnSpPr>
+            <a:cxnSpLocks/>
+          </p:cNvCxnSpPr>
+          <p:nvPr/>
+        </p:nvCxnSpPr>
+        <p:spPr>
+          <a:xfrm>
+            <a:off x="7079768" y="3564670"/>
+            <a:ext cx="0" cy="233109"/>
+          </a:xfrm>
+          <a:prstGeom prst="line">
+            <a:avLst/>
+          </a:prstGeom>
+          <a:ln w="19050">
+            <a:solidFill>
+              <a:schemeClr val="tx1"/>
+            </a:solidFill>
+          </a:ln>
+        </p:spPr>
+        <p:style>
+          <a:lnRef idx="1">
+            <a:schemeClr val="accent1"/>
+          </a:lnRef>
+          <a:fillRef idx="0">
+            <a:schemeClr val="accent1"/>
+          </a:fillRef>
+          <a:effectRef idx="0">
+            <a:schemeClr val="accent1"/>
+          </a:effectRef>
+          <a:fontRef idx="minor">
+            <a:schemeClr val="tx1"/>
+          </a:fontRef>
+        </p:style>
+      </p:cxnSp>
     </p:spTree>
     <p:extLst>
       <p:ext uri="{BB962C8B-B14F-4D97-AF65-F5344CB8AC3E}">
@@ -8619,8 +8657,15 @@
           </a:bodyPr>
           <a:lstStyle/>
           <a:p>
-            <a:pPr algn="ctr"/>
-            <a:endParaRPr lang="ko-KR" altLang="en-US" sz="688"/>
+            <a:pPr marL="0" algn="ctr" defTabSz="914400" rtl="0" eaLnBrk="1" latinLnBrk="1" hangingPunct="1"/>
+            <a:endParaRPr lang="ko-KR" altLang="en-US" sz="600" kern="1200">
+              <a:solidFill>
+                <a:schemeClr val="tx1"/>
+              </a:solidFill>
+              <a:latin typeface="나눔스퀘어OTF" panose="020B0600000101010101" pitchFamily="34" charset="-127"/>
+              <a:ea typeface="나눔스퀘어OTF" panose="020B0600000101010101" pitchFamily="34" charset="-127"/>
+              <a:cs typeface="+mn-cs"/>
+            </a:endParaRPr>
           </a:p>
         </p:txBody>
       </p:sp>
@@ -10241,7 +10286,7 @@
         </p:nvGrpSpPr>
         <p:grpSpPr>
           <a:xfrm rot="10800000">
-            <a:off x="3404475" y="3143325"/>
+            <a:off x="3405004" y="3143325"/>
             <a:ext cx="334285" cy="670443"/>
             <a:chOff x="6572249" y="1613132"/>
             <a:chExt cx="468000" cy="938619"/>
@@ -10382,8 +10427,8 @@
         </p:nvCxnSpPr>
         <p:spPr>
           <a:xfrm>
-            <a:off x="3572109" y="3522848"/>
-            <a:ext cx="0" cy="257143"/>
+            <a:off x="3572109" y="3647945"/>
+            <a:ext cx="0" cy="132046"/>
           </a:xfrm>
           <a:prstGeom prst="line">
             <a:avLst/>
@@ -10853,170 +10898,6 @@
           </a:fontRef>
         </p:style>
       </p:cxnSp>
-      <p:grpSp>
-        <p:nvGrpSpPr>
-          <p:cNvPr id="161" name="그룹 160">
-            <a:extLst>
-              <a:ext uri="{FF2B5EF4-FFF2-40B4-BE49-F238E27FC236}">
-                <a16:creationId xmlns:a16="http://schemas.microsoft.com/office/drawing/2014/main" id="{5E0E4488-58F6-4F33-8885-14F56B4AC432}"/>
-              </a:ext>
-            </a:extLst>
-          </p:cNvPr>
-          <p:cNvGrpSpPr/>
-          <p:nvPr/>
-        </p:nvGrpSpPr>
-        <p:grpSpPr>
-          <a:xfrm>
-            <a:off x="5116246" y="4850078"/>
-            <a:ext cx="1951636" cy="886056"/>
-            <a:chOff x="7191320" y="6790110"/>
-            <a:chExt cx="2732291" cy="1240478"/>
-          </a:xfrm>
-          <a:solidFill>
-            <a:schemeClr val="bg1"/>
-          </a:solidFill>
-        </p:grpSpPr>
-        <p:sp>
-          <p:nvSpPr>
-            <p:cNvPr id="99" name="직사각형 98">
-              <a:extLst>
-                <a:ext uri="{FF2B5EF4-FFF2-40B4-BE49-F238E27FC236}">
-                  <a16:creationId xmlns:a16="http://schemas.microsoft.com/office/drawing/2014/main" id="{CD381A83-0427-4297-88B0-DD2650BA382E}"/>
-                </a:ext>
-              </a:extLst>
-            </p:cNvPr>
-            <p:cNvSpPr/>
-            <p:nvPr/>
-          </p:nvSpPr>
-          <p:spPr>
-            <a:xfrm>
-              <a:off x="7197417" y="6793321"/>
-              <a:ext cx="2726192" cy="1237047"/>
-            </a:xfrm>
-            <a:prstGeom prst="rect">
-              <a:avLst/>
-            </a:prstGeom>
-            <a:grpFill/>
-            <a:ln w="19050">
-              <a:solidFill>
-                <a:schemeClr val="tx1"/>
-              </a:solidFill>
-            </a:ln>
-          </p:spPr>
-          <p:style>
-            <a:lnRef idx="2">
-              <a:schemeClr val="accent1">
-                <a:shade val="50000"/>
-              </a:schemeClr>
-            </a:lnRef>
-            <a:fillRef idx="1">
-              <a:schemeClr val="accent1"/>
-            </a:fillRef>
-            <a:effectRef idx="0">
-              <a:schemeClr val="accent1"/>
-            </a:effectRef>
-            <a:fontRef idx="minor">
-              <a:schemeClr val="lt1"/>
-            </a:fontRef>
-          </p:style>
-          <p:txBody>
-            <a:bodyPr rtlCol="0" anchor="ctr"/>
-            <a:lstStyle/>
-            <a:p>
-              <a:pPr algn="ctr"/>
-              <a:endParaRPr lang="ko-KR" altLang="en-US" sz="688"/>
-            </a:p>
-          </p:txBody>
-        </p:sp>
-        <p:cxnSp>
-          <p:nvCxnSpPr>
-            <p:cNvPr id="127" name="직선 연결선 126">
-              <a:extLst>
-                <a:ext uri="{FF2B5EF4-FFF2-40B4-BE49-F238E27FC236}">
-                  <a16:creationId xmlns:a16="http://schemas.microsoft.com/office/drawing/2014/main" id="{A4EB303F-68E0-4E5D-A678-723D3A4FEA9A}"/>
-                </a:ext>
-              </a:extLst>
-            </p:cNvPr>
-            <p:cNvCxnSpPr>
-              <a:cxnSpLocks/>
-            </p:cNvCxnSpPr>
-            <p:nvPr/>
-          </p:nvCxnSpPr>
-          <p:spPr>
-            <a:xfrm flipV="1">
-              <a:off x="7191320" y="6802771"/>
-              <a:ext cx="2732289" cy="1227817"/>
-            </a:xfrm>
-            <a:prstGeom prst="line">
-              <a:avLst/>
-            </a:prstGeom>
-            <a:grpFill/>
-            <a:ln w="19050">
-              <a:solidFill>
-                <a:schemeClr val="tx1"/>
-              </a:solidFill>
-            </a:ln>
-          </p:spPr>
-          <p:style>
-            <a:lnRef idx="1">
-              <a:schemeClr val="accent1"/>
-            </a:lnRef>
-            <a:fillRef idx="0">
-              <a:schemeClr val="accent1"/>
-            </a:fillRef>
-            <a:effectRef idx="0">
-              <a:schemeClr val="accent1"/>
-            </a:effectRef>
-            <a:fontRef idx="minor">
-              <a:schemeClr val="tx1"/>
-            </a:fontRef>
-          </p:style>
-        </p:cxnSp>
-        <p:cxnSp>
-          <p:nvCxnSpPr>
-            <p:cNvPr id="129" name="직선 연결선 128">
-              <a:extLst>
-                <a:ext uri="{FF2B5EF4-FFF2-40B4-BE49-F238E27FC236}">
-                  <a16:creationId xmlns:a16="http://schemas.microsoft.com/office/drawing/2014/main" id="{8EE5DE54-8159-47C4-AF2D-1A2CA0FECF7D}"/>
-                </a:ext>
-              </a:extLst>
-            </p:cNvPr>
-            <p:cNvCxnSpPr>
-              <a:cxnSpLocks/>
-            </p:cNvCxnSpPr>
-            <p:nvPr/>
-          </p:nvCxnSpPr>
-          <p:spPr>
-            <a:xfrm>
-              <a:off x="7195485" y="6790110"/>
-              <a:ext cx="2728126" cy="1237335"/>
-            </a:xfrm>
-            <a:prstGeom prst="line">
-              <a:avLst/>
-            </a:prstGeom>
-            <a:grpFill/>
-            <a:ln w="19050">
-              <a:solidFill>
-                <a:schemeClr val="tx1"/>
-              </a:solidFill>
-            </a:ln>
-          </p:spPr>
-          <p:style>
-            <a:lnRef idx="1">
-              <a:schemeClr val="accent1"/>
-            </a:lnRef>
-            <a:fillRef idx="0">
-              <a:schemeClr val="accent1"/>
-            </a:fillRef>
-            <a:effectRef idx="0">
-              <a:schemeClr val="accent1"/>
-            </a:effectRef>
-            <a:fontRef idx="minor">
-              <a:schemeClr val="tx1"/>
-            </a:fontRef>
-          </p:style>
-        </p:cxnSp>
-      </p:grpSp>
       <p:cxnSp>
         <p:nvCxnSpPr>
           <p:cNvPr id="157" name="직선 연결선 156">
@@ -11394,60 +11275,6 @@
       </p:cxnSp>
       <p:sp>
         <p:nvSpPr>
-          <p:cNvPr id="170" name="직사각형 169">
-            <a:extLst>
-              <a:ext uri="{FF2B5EF4-FFF2-40B4-BE49-F238E27FC236}">
-                <a16:creationId xmlns:a16="http://schemas.microsoft.com/office/drawing/2014/main" id="{381AADD7-16A6-461F-84FA-714A893D5E98}"/>
-              </a:ext>
-            </a:extLst>
-          </p:cNvPr>
-          <p:cNvSpPr/>
-          <p:nvPr/>
-        </p:nvSpPr>
-        <p:spPr>
-          <a:xfrm>
-            <a:off x="7362072" y="3423259"/>
-            <a:ext cx="282857" cy="158969"/>
-          </a:xfrm>
-          <a:prstGeom prst="rect">
-            <a:avLst/>
-          </a:prstGeom>
-          <a:solidFill>
-            <a:srgbClr val="FF7C80"/>
-          </a:solidFill>
-          <a:ln w="19050">
-            <a:solidFill>
-              <a:schemeClr val="tx1"/>
-            </a:solidFill>
-          </a:ln>
-        </p:spPr>
-        <p:style>
-          <a:lnRef idx="2">
-            <a:schemeClr val="accent1">
-              <a:shade val="50000"/>
-            </a:schemeClr>
-          </a:lnRef>
-          <a:fillRef idx="1">
-            <a:schemeClr val="accent1"/>
-          </a:fillRef>
-          <a:effectRef idx="0">
-            <a:schemeClr val="accent1"/>
-          </a:effectRef>
-          <a:fontRef idx="minor">
-            <a:schemeClr val="lt1"/>
-          </a:fontRef>
-        </p:style>
-        <p:txBody>
-          <a:bodyPr rtlCol="0" anchor="ctr"/>
-          <a:lstStyle/>
-          <a:p>
-            <a:pPr algn="ctr"/>
-            <a:endParaRPr lang="ko-KR" altLang="en-US" sz="688"/>
-          </a:p>
-        </p:txBody>
-      </p:sp>
-      <p:sp>
-        <p:nvSpPr>
           <p:cNvPr id="171" name="직사각형 170">
             <a:extLst>
               <a:ext uri="{FF2B5EF4-FFF2-40B4-BE49-F238E27FC236}">
@@ -11460,8 +11287,8 @@
         </p:nvSpPr>
         <p:spPr>
           <a:xfrm>
-            <a:off x="7079787" y="3422352"/>
-            <a:ext cx="282857" cy="158969"/>
+            <a:off x="7079787" y="3419176"/>
+            <a:ext cx="563589" cy="158969"/>
           </a:xfrm>
           <a:prstGeom prst="rect">
             <a:avLst/>
@@ -11516,7 +11343,7 @@
         </p:nvCxnSpPr>
         <p:spPr>
           <a:xfrm>
-            <a:off x="7082196" y="3549227"/>
+            <a:off x="7082196" y="3546051"/>
             <a:ext cx="565714" cy="0"/>
           </a:xfrm>
           <a:prstGeom prst="line">
@@ -11559,7 +11386,7 @@
         </p:nvCxnSpPr>
         <p:spPr>
           <a:xfrm>
-            <a:off x="7077662" y="3518232"/>
+            <a:off x="7077662" y="3515056"/>
             <a:ext cx="565714" cy="0"/>
           </a:xfrm>
           <a:prstGeom prst="line">
@@ -11602,7 +11429,7 @@
         </p:nvCxnSpPr>
         <p:spPr>
           <a:xfrm>
-            <a:off x="7079929" y="3484212"/>
+            <a:off x="7079929" y="3481036"/>
             <a:ext cx="565714" cy="0"/>
           </a:xfrm>
           <a:prstGeom prst="line">
@@ -11645,7 +11472,7 @@
         </p:nvCxnSpPr>
         <p:spPr>
           <a:xfrm>
-            <a:off x="7082196" y="3453708"/>
+            <a:off x="7082196" y="3450532"/>
             <a:ext cx="565714" cy="0"/>
           </a:xfrm>
           <a:prstGeom prst="line">
@@ -12169,7 +11996,7 @@
         </p:nvGrpSpPr>
         <p:grpSpPr>
           <a:xfrm rot="16200000">
-            <a:off x="6743362" y="2394584"/>
+            <a:off x="6743362" y="2392467"/>
             <a:ext cx="334285" cy="670443"/>
             <a:chOff x="6572249" y="1613132"/>
             <a:chExt cx="468000" cy="938619"/>
@@ -12404,14 +12231,14 @@
           <p:nvPr>
             <p:extLst>
               <p:ext uri="{D42A27DB-BD31-4B8C-83A1-F6EECF244321}">
-                <p14:modId xmlns:p14="http://schemas.microsoft.com/office/powerpoint/2010/main" val="3990800910"/>
+                <p14:modId xmlns:p14="http://schemas.microsoft.com/office/powerpoint/2010/main" val="1273659001"/>
               </p:ext>
             </p:extLst>
           </p:nvPr>
         </p:nvGraphicFramePr>
         <p:xfrm>
-          <a:off x="8513683" y="2729895"/>
-          <a:ext cx="597600" cy="1487011"/>
+          <a:off x="8512415" y="3429000"/>
+          <a:ext cx="597600" cy="786758"/>
         </p:xfrm>
         <a:graphic>
           <a:graphicData uri="http://schemas.openxmlformats.org/drawingml/2006/table">
@@ -12428,7 +12255,7 @@
                   </a:extLst>
                 </a:gridCol>
               </a:tblGrid>
-              <a:tr h="61772">
+              <a:tr h="65169">
                 <a:tc>
                   <a:txBody>
                     <a:bodyPr/>
@@ -12444,392 +12271,8 @@
                           <a:ea typeface="나눔스퀘어OTF" panose="020B0600000101010101" pitchFamily="34" charset="-127"/>
                           <a:cs typeface="+mn-cs"/>
                         </a:rPr>
-                        <a:t>154</a:t>
+                        <a:t>143</a:t>
                       </a:r>
-                      <a:endParaRPr lang="ko-KR" altLang="en-US" sz="400" kern="1200">
-                        <a:solidFill>
-                          <a:schemeClr val="tx1"/>
-                        </a:solidFill>
-                        <a:latin typeface="나눔스퀘어OTF" panose="020B0600000101010101" pitchFamily="34" charset="-127"/>
-                        <a:ea typeface="나눔스퀘어OTF" panose="020B0600000101010101" pitchFamily="34" charset="-127"/>
-                        <a:cs typeface="+mn-cs"/>
-                      </a:endParaRPr>
-                    </a:p>
-                  </a:txBody>
-                  <a:tcPr marL="0" marR="0" marT="0" marB="0" anchor="ctr">
-                    <a:solidFill>
-                      <a:schemeClr val="accent2">
-                        <a:lumMod val="20000"/>
-                        <a:lumOff val="80000"/>
-                      </a:schemeClr>
-                    </a:solidFill>
-                  </a:tcPr>
-                </a:tc>
-                <a:extLst>
-                  <a:ext uri="{0D108BD9-81ED-4DB2-BD59-A6C34878D82A}">
-                    <a16:rowId xmlns:a16="http://schemas.microsoft.com/office/drawing/2014/main" val="628567818"/>
-                  </a:ext>
-                </a:extLst>
-              </a:tr>
-              <a:tr h="61772">
-                <a:tc>
-                  <a:txBody>
-                    <a:bodyPr/>
-                    <a:lstStyle/>
-                    <a:p>
-                      <a:pPr marL="0" algn="ctr" defTabSz="914400" rtl="0" eaLnBrk="1" latinLnBrk="1" hangingPunct="1"/>
-                      <a:endParaRPr lang="ko-KR" altLang="en-US" sz="400" kern="1200">
-                        <a:solidFill>
-                          <a:schemeClr val="tx1"/>
-                        </a:solidFill>
-                        <a:latin typeface="나눔스퀘어OTF" panose="020B0600000101010101" pitchFamily="34" charset="-127"/>
-                        <a:ea typeface="나눔스퀘어OTF" panose="020B0600000101010101" pitchFamily="34" charset="-127"/>
-                        <a:cs typeface="+mn-cs"/>
-                      </a:endParaRPr>
-                    </a:p>
-                  </a:txBody>
-                  <a:tcPr marL="0" marR="0" marT="0" marB="0" anchor="ctr">
-                    <a:solidFill>
-                      <a:schemeClr val="accent2">
-                        <a:lumMod val="20000"/>
-                        <a:lumOff val="80000"/>
-                      </a:schemeClr>
-                    </a:solidFill>
-                  </a:tcPr>
-                </a:tc>
-                <a:extLst>
-                  <a:ext uri="{0D108BD9-81ED-4DB2-BD59-A6C34878D82A}">
-                    <a16:rowId xmlns:a16="http://schemas.microsoft.com/office/drawing/2014/main" val="2555614779"/>
-                  </a:ext>
-                </a:extLst>
-              </a:tr>
-              <a:tr h="61772">
-                <a:tc>
-                  <a:txBody>
-                    <a:bodyPr/>
-                    <a:lstStyle/>
-                    <a:p>
-                      <a:pPr marL="0" algn="ctr" defTabSz="914400" rtl="0" eaLnBrk="1" latinLnBrk="1" hangingPunct="1"/>
-                      <a:endParaRPr lang="ko-KR" altLang="en-US" sz="400" kern="1200">
-                        <a:solidFill>
-                          <a:schemeClr val="tx1"/>
-                        </a:solidFill>
-                        <a:latin typeface="나눔스퀘어OTF" panose="020B0600000101010101" pitchFamily="34" charset="-127"/>
-                        <a:ea typeface="나눔스퀘어OTF" panose="020B0600000101010101" pitchFamily="34" charset="-127"/>
-                        <a:cs typeface="+mn-cs"/>
-                      </a:endParaRPr>
-                    </a:p>
-                  </a:txBody>
-                  <a:tcPr marL="0" marR="0" marT="0" marB="0" anchor="ctr">
-                    <a:solidFill>
-                      <a:schemeClr val="accent2">
-                        <a:lumMod val="20000"/>
-                        <a:lumOff val="80000"/>
-                      </a:schemeClr>
-                    </a:solidFill>
-                  </a:tcPr>
-                </a:tc>
-                <a:extLst>
-                  <a:ext uri="{0D108BD9-81ED-4DB2-BD59-A6C34878D82A}">
-                    <a16:rowId xmlns:a16="http://schemas.microsoft.com/office/drawing/2014/main" val="3479974772"/>
-                  </a:ext>
-                </a:extLst>
-              </a:tr>
-              <a:tr h="61772">
-                <a:tc>
-                  <a:txBody>
-                    <a:bodyPr/>
-                    <a:lstStyle/>
-                    <a:p>
-                      <a:pPr marL="0" algn="ctr" defTabSz="914400" rtl="0" eaLnBrk="1" latinLnBrk="1" hangingPunct="1"/>
-                      <a:endParaRPr lang="ko-KR" altLang="en-US" sz="400" kern="1200">
-                        <a:solidFill>
-                          <a:schemeClr val="tx1"/>
-                        </a:solidFill>
-                        <a:latin typeface="나눔스퀘어OTF" panose="020B0600000101010101" pitchFamily="34" charset="-127"/>
-                        <a:ea typeface="나눔스퀘어OTF" panose="020B0600000101010101" pitchFamily="34" charset="-127"/>
-                        <a:cs typeface="+mn-cs"/>
-                      </a:endParaRPr>
-                    </a:p>
-                  </a:txBody>
-                  <a:tcPr marL="0" marR="0" marT="0" marB="0" anchor="ctr">
-                    <a:solidFill>
-                      <a:schemeClr val="accent2">
-                        <a:lumMod val="20000"/>
-                        <a:lumOff val="80000"/>
-                      </a:schemeClr>
-                    </a:solidFill>
-                  </a:tcPr>
-                </a:tc>
-                <a:extLst>
-                  <a:ext uri="{0D108BD9-81ED-4DB2-BD59-A6C34878D82A}">
-                    <a16:rowId xmlns:a16="http://schemas.microsoft.com/office/drawing/2014/main" val="1701727689"/>
-                  </a:ext>
-                </a:extLst>
-              </a:tr>
-              <a:tr h="61772">
-                <a:tc>
-                  <a:txBody>
-                    <a:bodyPr/>
-                    <a:lstStyle/>
-                    <a:p>
-                      <a:pPr marL="0" algn="ctr" defTabSz="914400" rtl="0" eaLnBrk="1" latinLnBrk="1" hangingPunct="1"/>
-                      <a:endParaRPr lang="ko-KR" altLang="en-US" sz="400" kern="1200">
-                        <a:solidFill>
-                          <a:schemeClr val="tx1"/>
-                        </a:solidFill>
-                        <a:latin typeface="나눔스퀘어OTF" panose="020B0600000101010101" pitchFamily="34" charset="-127"/>
-                        <a:ea typeface="나눔스퀘어OTF" panose="020B0600000101010101" pitchFamily="34" charset="-127"/>
-                        <a:cs typeface="+mn-cs"/>
-                      </a:endParaRPr>
-                    </a:p>
-                  </a:txBody>
-                  <a:tcPr marL="0" marR="0" marT="0" marB="0" anchor="ctr">
-                    <a:solidFill>
-                      <a:schemeClr val="accent2">
-                        <a:lumMod val="20000"/>
-                        <a:lumOff val="80000"/>
-                      </a:schemeClr>
-                    </a:solidFill>
-                  </a:tcPr>
-                </a:tc>
-                <a:extLst>
-                  <a:ext uri="{0D108BD9-81ED-4DB2-BD59-A6C34878D82A}">
-                    <a16:rowId xmlns:a16="http://schemas.microsoft.com/office/drawing/2014/main" val="3960566237"/>
-                  </a:ext>
-                </a:extLst>
-              </a:tr>
-              <a:tr h="61772">
-                <a:tc>
-                  <a:txBody>
-                    <a:bodyPr/>
-                    <a:lstStyle/>
-                    <a:p>
-                      <a:pPr marL="0" algn="ctr" defTabSz="914400" rtl="0" eaLnBrk="1" latinLnBrk="1" hangingPunct="1"/>
-                      <a:endParaRPr lang="ko-KR" altLang="en-US" sz="400" kern="1200">
-                        <a:solidFill>
-                          <a:schemeClr val="tx1"/>
-                        </a:solidFill>
-                        <a:latin typeface="나눔스퀘어OTF" panose="020B0600000101010101" pitchFamily="34" charset="-127"/>
-                        <a:ea typeface="나눔스퀘어OTF" panose="020B0600000101010101" pitchFamily="34" charset="-127"/>
-                        <a:cs typeface="+mn-cs"/>
-                      </a:endParaRPr>
-                    </a:p>
-                  </a:txBody>
-                  <a:tcPr marL="0" marR="0" marT="0" marB="0" anchor="ctr">
-                    <a:solidFill>
-                      <a:schemeClr val="accent2">
-                        <a:lumMod val="20000"/>
-                        <a:lumOff val="80000"/>
-                      </a:schemeClr>
-                    </a:solidFill>
-                  </a:tcPr>
-                </a:tc>
-                <a:extLst>
-                  <a:ext uri="{0D108BD9-81ED-4DB2-BD59-A6C34878D82A}">
-                    <a16:rowId xmlns:a16="http://schemas.microsoft.com/office/drawing/2014/main" val="1222946712"/>
-                  </a:ext>
-                </a:extLst>
-              </a:tr>
-              <a:tr h="61772">
-                <a:tc>
-                  <a:txBody>
-                    <a:bodyPr/>
-                    <a:lstStyle/>
-                    <a:p>
-                      <a:pPr marL="0" algn="ctr" defTabSz="914400" rtl="0" eaLnBrk="1" latinLnBrk="1" hangingPunct="1"/>
-                      <a:endParaRPr lang="ko-KR" altLang="en-US" sz="400" kern="1200">
-                        <a:solidFill>
-                          <a:schemeClr val="tx1"/>
-                        </a:solidFill>
-                        <a:latin typeface="나눔스퀘어OTF" panose="020B0600000101010101" pitchFamily="34" charset="-127"/>
-                        <a:ea typeface="나눔스퀘어OTF" panose="020B0600000101010101" pitchFamily="34" charset="-127"/>
-                        <a:cs typeface="+mn-cs"/>
-                      </a:endParaRPr>
-                    </a:p>
-                  </a:txBody>
-                  <a:tcPr marL="0" marR="0" marT="0" marB="0" anchor="ctr">
-                    <a:solidFill>
-                      <a:schemeClr val="accent2">
-                        <a:lumMod val="20000"/>
-                        <a:lumOff val="80000"/>
-                      </a:schemeClr>
-                    </a:solidFill>
-                  </a:tcPr>
-                </a:tc>
-                <a:extLst>
-                  <a:ext uri="{0D108BD9-81ED-4DB2-BD59-A6C34878D82A}">
-                    <a16:rowId xmlns:a16="http://schemas.microsoft.com/office/drawing/2014/main" val="3250344206"/>
-                  </a:ext>
-                </a:extLst>
-              </a:tr>
-              <a:tr h="61772">
-                <a:tc>
-                  <a:txBody>
-                    <a:bodyPr/>
-                    <a:lstStyle/>
-                    <a:p>
-                      <a:pPr marL="0" algn="ctr" defTabSz="914400" rtl="0" eaLnBrk="1" latinLnBrk="1" hangingPunct="1"/>
-                      <a:endParaRPr lang="ko-KR" altLang="en-US" sz="400" kern="1200">
-                        <a:solidFill>
-                          <a:schemeClr val="tx1"/>
-                        </a:solidFill>
-                        <a:latin typeface="나눔스퀘어OTF" panose="020B0600000101010101" pitchFamily="34" charset="-127"/>
-                        <a:ea typeface="나눔스퀘어OTF" panose="020B0600000101010101" pitchFamily="34" charset="-127"/>
-                        <a:cs typeface="+mn-cs"/>
-                      </a:endParaRPr>
-                    </a:p>
-                  </a:txBody>
-                  <a:tcPr marL="0" marR="0" marT="0" marB="0" anchor="ctr">
-                    <a:solidFill>
-                      <a:schemeClr val="accent2">
-                        <a:lumMod val="20000"/>
-                        <a:lumOff val="80000"/>
-                      </a:schemeClr>
-                    </a:solidFill>
-                  </a:tcPr>
-                </a:tc>
-                <a:extLst>
-                  <a:ext uri="{0D108BD9-81ED-4DB2-BD59-A6C34878D82A}">
-                    <a16:rowId xmlns:a16="http://schemas.microsoft.com/office/drawing/2014/main" val="1559009890"/>
-                  </a:ext>
-                </a:extLst>
-              </a:tr>
-              <a:tr h="61772">
-                <a:tc>
-                  <a:txBody>
-                    <a:bodyPr/>
-                    <a:lstStyle/>
-                    <a:p>
-                      <a:pPr marL="0" algn="ctr" defTabSz="914400" rtl="0" eaLnBrk="1" latinLnBrk="1" hangingPunct="1"/>
-                      <a:endParaRPr lang="ko-KR" altLang="en-US" sz="400" kern="1200">
-                        <a:solidFill>
-                          <a:schemeClr val="tx1"/>
-                        </a:solidFill>
-                        <a:latin typeface="나눔스퀘어OTF" panose="020B0600000101010101" pitchFamily="34" charset="-127"/>
-                        <a:ea typeface="나눔스퀘어OTF" panose="020B0600000101010101" pitchFamily="34" charset="-127"/>
-                        <a:cs typeface="+mn-cs"/>
-                      </a:endParaRPr>
-                    </a:p>
-                  </a:txBody>
-                  <a:tcPr marL="0" marR="0" marT="0" marB="0" anchor="ctr">
-                    <a:solidFill>
-                      <a:schemeClr val="accent2">
-                        <a:lumMod val="20000"/>
-                        <a:lumOff val="80000"/>
-                      </a:schemeClr>
-                    </a:solidFill>
-                  </a:tcPr>
-                </a:tc>
-                <a:extLst>
-                  <a:ext uri="{0D108BD9-81ED-4DB2-BD59-A6C34878D82A}">
-                    <a16:rowId xmlns:a16="http://schemas.microsoft.com/office/drawing/2014/main" val="1160346415"/>
-                  </a:ext>
-                </a:extLst>
-              </a:tr>
-              <a:tr h="61772">
-                <a:tc>
-                  <a:txBody>
-                    <a:bodyPr/>
-                    <a:lstStyle/>
-                    <a:p>
-                      <a:pPr marL="0" algn="ctr" defTabSz="914400" rtl="0" eaLnBrk="1" latinLnBrk="1" hangingPunct="1"/>
-                      <a:endParaRPr lang="ko-KR" altLang="en-US" sz="400" kern="1200">
-                        <a:solidFill>
-                          <a:schemeClr val="tx1"/>
-                        </a:solidFill>
-                        <a:latin typeface="나눔스퀘어OTF" panose="020B0600000101010101" pitchFamily="34" charset="-127"/>
-                        <a:ea typeface="나눔스퀘어OTF" panose="020B0600000101010101" pitchFamily="34" charset="-127"/>
-                        <a:cs typeface="+mn-cs"/>
-                      </a:endParaRPr>
-                    </a:p>
-                  </a:txBody>
-                  <a:tcPr marL="0" marR="0" marT="0" marB="0" anchor="ctr">
-                    <a:solidFill>
-                      <a:schemeClr val="accent2">
-                        <a:lumMod val="20000"/>
-                        <a:lumOff val="80000"/>
-                      </a:schemeClr>
-                    </a:solidFill>
-                  </a:tcPr>
-                </a:tc>
-                <a:extLst>
-                  <a:ext uri="{0D108BD9-81ED-4DB2-BD59-A6C34878D82A}">
-                    <a16:rowId xmlns:a16="http://schemas.microsoft.com/office/drawing/2014/main" val="1829253279"/>
-                  </a:ext>
-                </a:extLst>
-              </a:tr>
-              <a:tr h="61772">
-                <a:tc>
-                  <a:txBody>
-                    <a:bodyPr/>
-                    <a:lstStyle/>
-                    <a:p>
-                      <a:pPr marL="0" algn="ctr" defTabSz="914400" rtl="0" eaLnBrk="1" latinLnBrk="1" hangingPunct="1"/>
-                      <a:endParaRPr lang="ko-KR" altLang="en-US" sz="400" kern="1200">
-                        <a:solidFill>
-                          <a:schemeClr val="tx1"/>
-                        </a:solidFill>
-                        <a:latin typeface="나눔스퀘어OTF" panose="020B0600000101010101" pitchFamily="34" charset="-127"/>
-                        <a:ea typeface="나눔스퀘어OTF" panose="020B0600000101010101" pitchFamily="34" charset="-127"/>
-                        <a:cs typeface="+mn-cs"/>
-                      </a:endParaRPr>
-                    </a:p>
-                  </a:txBody>
-                  <a:tcPr marL="0" marR="0" marT="0" marB="0" anchor="ctr">
-                    <a:solidFill>
-                      <a:schemeClr val="accent2">
-                        <a:lumMod val="20000"/>
-                        <a:lumOff val="80000"/>
-                      </a:schemeClr>
-                    </a:solidFill>
-                  </a:tcPr>
-                </a:tc>
-                <a:extLst>
-                  <a:ext uri="{0D108BD9-81ED-4DB2-BD59-A6C34878D82A}">
-                    <a16:rowId xmlns:a16="http://schemas.microsoft.com/office/drawing/2014/main" val="386956212"/>
-                  </a:ext>
-                </a:extLst>
-              </a:tr>
-              <a:tr h="61772">
-                <a:tc>
-                  <a:txBody>
-                    <a:bodyPr/>
-                    <a:lstStyle/>
-                    <a:p>
-                      <a:pPr marL="0" algn="ctr" defTabSz="914400" rtl="0" eaLnBrk="1" latinLnBrk="1" hangingPunct="1"/>
-                      <a:endParaRPr lang="ko-KR" altLang="en-US" sz="400" kern="1200">
-                        <a:solidFill>
-                          <a:schemeClr val="tx1"/>
-                        </a:solidFill>
-                        <a:latin typeface="나눔스퀘어OTF" panose="020B0600000101010101" pitchFamily="34" charset="-127"/>
-                        <a:ea typeface="나눔스퀘어OTF" panose="020B0600000101010101" pitchFamily="34" charset="-127"/>
-                        <a:cs typeface="+mn-cs"/>
-                      </a:endParaRPr>
-                    </a:p>
-                  </a:txBody>
-                  <a:tcPr marL="0" marR="0" marT="0" marB="0" anchor="ctr">
-                    <a:solidFill>
-                      <a:schemeClr val="accent2">
-                        <a:lumMod val="20000"/>
-                        <a:lumOff val="80000"/>
-                      </a:schemeClr>
-                    </a:solidFill>
-                  </a:tcPr>
-                </a:tc>
-                <a:extLst>
-                  <a:ext uri="{0D108BD9-81ED-4DB2-BD59-A6C34878D82A}">
-                    <a16:rowId xmlns:a16="http://schemas.microsoft.com/office/drawing/2014/main" val="1353419532"/>
-                  </a:ext>
-                </a:extLst>
-              </a:tr>
-              <a:tr h="61772">
-                <a:tc>
-                  <a:txBody>
-                    <a:bodyPr/>
-                    <a:lstStyle/>
-                    <a:p>
-                      <a:pPr marL="0" algn="ctr" defTabSz="914400" rtl="0" eaLnBrk="1" latinLnBrk="1" hangingPunct="1"/>
                       <a:endParaRPr lang="ko-KR" altLang="en-US" sz="400" kern="1200">
                         <a:solidFill>
                           <a:schemeClr val="tx1"/>
@@ -12855,7 +12298,7 @@
                   </a:ext>
                 </a:extLst>
               </a:tr>
-              <a:tr h="61772">
+              <a:tr h="65169">
                 <a:tc>
                   <a:txBody>
                     <a:bodyPr/>
@@ -12887,7 +12330,7 @@
                   </a:ext>
                 </a:extLst>
               </a:tr>
-              <a:tr h="61772">
+              <a:tr h="65169">
                 <a:tc>
                   <a:txBody>
                     <a:bodyPr/>
@@ -12919,7 +12362,7 @@
                   </a:ext>
                 </a:extLst>
               </a:tr>
-              <a:tr h="61772">
+              <a:tr h="65169">
                 <a:tc>
                   <a:txBody>
                     <a:bodyPr/>
@@ -12951,7 +12394,7 @@
                   </a:ext>
                 </a:extLst>
               </a:tr>
-              <a:tr h="61772">
+              <a:tr h="65169">
                 <a:tc>
                   <a:txBody>
                     <a:bodyPr/>
@@ -12983,7 +12426,7 @@
                   </a:ext>
                 </a:extLst>
               </a:tr>
-              <a:tr h="61772">
+              <a:tr h="65169">
                 <a:tc>
                   <a:txBody>
                     <a:bodyPr/>
@@ -13015,7 +12458,7 @@
                   </a:ext>
                 </a:extLst>
               </a:tr>
-              <a:tr h="61772">
+              <a:tr h="65169">
                 <a:tc>
                   <a:txBody>
                     <a:bodyPr/>
@@ -13047,7 +12490,7 @@
                   </a:ext>
                 </a:extLst>
               </a:tr>
-              <a:tr h="61772">
+              <a:tr h="65169">
                 <a:tc>
                   <a:txBody>
                     <a:bodyPr/>
@@ -13079,7 +12522,7 @@
                   </a:ext>
                 </a:extLst>
               </a:tr>
-              <a:tr h="61772">
+              <a:tr h="65169">
                 <a:tc>
                   <a:txBody>
                     <a:bodyPr/>
@@ -13111,7 +12554,7 @@
                   </a:ext>
                 </a:extLst>
               </a:tr>
-              <a:tr h="61772">
+              <a:tr h="65169">
                 <a:tc>
                   <a:txBody>
                     <a:bodyPr/>
@@ -13143,7 +12586,7 @@
                   </a:ext>
                 </a:extLst>
               </a:tr>
-              <a:tr h="61772">
+              <a:tr h="65169">
                 <a:tc>
                   <a:txBody>
                     <a:bodyPr/>
@@ -13175,7 +12618,7 @@
                   </a:ext>
                 </a:extLst>
               </a:tr>
-              <a:tr h="66255">
+              <a:tr h="69899">
                 <a:tc>
                   <a:txBody>
                     <a:bodyPr/>
@@ -16334,14 +15777,14 @@
           <p:nvPr>
             <p:extLst>
               <p:ext uri="{D42A27DB-BD31-4B8C-83A1-F6EECF244321}">
-                <p14:modId xmlns:p14="http://schemas.microsoft.com/office/powerpoint/2010/main" val="3566173241"/>
+                <p14:modId xmlns:p14="http://schemas.microsoft.com/office/powerpoint/2010/main" val="4246309730"/>
               </p:ext>
             </p:extLst>
           </p:nvPr>
         </p:nvGraphicFramePr>
         <p:xfrm>
           <a:off x="2351832" y="4846407"/>
-          <a:ext cx="594000" cy="1386840"/>
+          <a:ext cx="594000" cy="1386000"/>
         </p:xfrm>
         <a:graphic>
           <a:graphicData uri="http://schemas.openxmlformats.org/drawingml/2006/table">
@@ -16358,7 +15801,7 @@
                   </a:extLst>
                 </a:gridCol>
               </a:tblGrid>
-              <a:tr h="106412">
+              <a:tr h="77000">
                 <a:tc>
                   <a:txBody>
                     <a:bodyPr/>
@@ -16366,7 +15809,7 @@
                     <a:p>
                       <a:pPr marL="0" algn="ctr" defTabSz="914400" rtl="0" eaLnBrk="1" latinLnBrk="1" hangingPunct="1"/>
                       <a:r>
-                        <a:rPr lang="en-US" altLang="ko-KR" sz="700" kern="1200">
+                        <a:rPr lang="en-US" altLang="ko-KR" sz="500" kern="1200">
                           <a:solidFill>
                             <a:schemeClr val="tx1"/>
                           </a:solidFill>
@@ -16376,7 +15819,7 @@
                         </a:rPr>
                         <a:t>001</a:t>
                       </a:r>
-                      <a:endParaRPr lang="ko-KR" altLang="en-US" sz="700" kern="1200">
+                      <a:endParaRPr lang="ko-KR" altLang="en-US" sz="500" kern="1200">
                         <a:solidFill>
                           <a:schemeClr val="tx1"/>
                         </a:solidFill>
@@ -16401,14 +15844,14 @@
                   </a:ext>
                 </a:extLst>
               </a:tr>
-              <a:tr h="106412">
+              <a:tr h="77000">
                 <a:tc>
                   <a:txBody>
                     <a:bodyPr/>
                     <a:lstStyle/>
                     <a:p>
                       <a:pPr marL="0" algn="ctr" defTabSz="914400" rtl="0" eaLnBrk="1" latinLnBrk="1" hangingPunct="1"/>
-                      <a:endParaRPr lang="ko-KR" altLang="en-US" sz="700" kern="1200">
+                      <a:endParaRPr lang="ko-KR" altLang="en-US" sz="500" kern="1200">
                         <a:solidFill>
                           <a:schemeClr val="tx1"/>
                         </a:solidFill>
@@ -16433,14 +15876,14 @@
                   </a:ext>
                 </a:extLst>
               </a:tr>
-              <a:tr h="106412">
+              <a:tr h="77000">
                 <a:tc>
                   <a:txBody>
                     <a:bodyPr/>
                     <a:lstStyle/>
                     <a:p>
                       <a:pPr marL="0" algn="ctr" defTabSz="914400" rtl="0" eaLnBrk="1" latinLnBrk="1" hangingPunct="1"/>
-                      <a:endParaRPr lang="ko-KR" altLang="en-US" sz="700" kern="1200">
+                      <a:endParaRPr lang="ko-KR" altLang="en-US" sz="500" kern="1200">
                         <a:solidFill>
                           <a:schemeClr val="tx1"/>
                         </a:solidFill>
@@ -16465,14 +15908,14 @@
                   </a:ext>
                 </a:extLst>
               </a:tr>
-              <a:tr h="106412">
+              <a:tr h="77000">
                 <a:tc>
                   <a:txBody>
                     <a:bodyPr/>
                     <a:lstStyle/>
                     <a:p>
                       <a:pPr marL="0" algn="ctr" defTabSz="914400" rtl="0" eaLnBrk="1" latinLnBrk="1" hangingPunct="1"/>
-                      <a:endParaRPr lang="ko-KR" altLang="en-US" sz="700" kern="1200">
+                      <a:endParaRPr lang="ko-KR" altLang="en-US" sz="500" kern="1200">
                         <a:solidFill>
                           <a:schemeClr val="tx1"/>
                         </a:solidFill>
@@ -16497,14 +15940,14 @@
                   </a:ext>
                 </a:extLst>
               </a:tr>
-              <a:tr h="106412">
+              <a:tr h="77000">
                 <a:tc>
                   <a:txBody>
                     <a:bodyPr/>
                     <a:lstStyle/>
                     <a:p>
                       <a:pPr marL="0" algn="ctr" defTabSz="914400" rtl="0" eaLnBrk="1" latinLnBrk="1" hangingPunct="1"/>
-                      <a:endParaRPr lang="ko-KR" altLang="en-US" sz="700" kern="1200">
+                      <a:endParaRPr lang="ko-KR" altLang="en-US" sz="500" kern="1200">
                         <a:solidFill>
                           <a:schemeClr val="tx1"/>
                         </a:solidFill>
@@ -16529,14 +15972,14 @@
                   </a:ext>
                 </a:extLst>
               </a:tr>
-              <a:tr h="106412">
+              <a:tr h="77000">
                 <a:tc>
                   <a:txBody>
                     <a:bodyPr/>
                     <a:lstStyle/>
                     <a:p>
                       <a:pPr marL="0" algn="ctr" defTabSz="914400" rtl="0" eaLnBrk="1" latinLnBrk="1" hangingPunct="1"/>
-                      <a:endParaRPr lang="ko-KR" altLang="en-US" sz="700" kern="1200">
+                      <a:endParaRPr lang="ko-KR" altLang="en-US" sz="500" kern="1200">
                         <a:solidFill>
                           <a:schemeClr val="tx1"/>
                         </a:solidFill>
@@ -16561,14 +16004,14 @@
                   </a:ext>
                 </a:extLst>
               </a:tr>
-              <a:tr h="106412">
+              <a:tr h="77000">
                 <a:tc>
                   <a:txBody>
                     <a:bodyPr/>
                     <a:lstStyle/>
                     <a:p>
                       <a:pPr marL="0" algn="ctr" defTabSz="914400" rtl="0" eaLnBrk="1" latinLnBrk="1" hangingPunct="1"/>
-                      <a:endParaRPr lang="ko-KR" altLang="en-US" sz="700" kern="1200">
+                      <a:endParaRPr lang="ko-KR" altLang="en-US" sz="500" kern="1200">
                         <a:solidFill>
                           <a:schemeClr val="tx1"/>
                         </a:solidFill>
@@ -16593,14 +16036,14 @@
                   </a:ext>
                 </a:extLst>
               </a:tr>
-              <a:tr h="106412">
+              <a:tr h="77000">
                 <a:tc>
                   <a:txBody>
                     <a:bodyPr/>
                     <a:lstStyle/>
                     <a:p>
                       <a:pPr marL="0" algn="ctr" defTabSz="914400" rtl="0" eaLnBrk="1" latinLnBrk="1" hangingPunct="1"/>
-                      <a:endParaRPr lang="ko-KR" altLang="en-US" sz="700" kern="1200">
+                      <a:endParaRPr lang="ko-KR" altLang="en-US" sz="500" kern="1200">
                         <a:solidFill>
                           <a:schemeClr val="tx1"/>
                         </a:solidFill>
@@ -16625,14 +16068,14 @@
                   </a:ext>
                 </a:extLst>
               </a:tr>
-              <a:tr h="106412">
+              <a:tr h="77000">
                 <a:tc>
                   <a:txBody>
                     <a:bodyPr/>
                     <a:lstStyle/>
                     <a:p>
                       <a:pPr marL="0" algn="ctr" defTabSz="914400" rtl="0" eaLnBrk="1" latinLnBrk="1" hangingPunct="1"/>
-                      <a:endParaRPr lang="ko-KR" altLang="en-US" sz="700" kern="1200">
+                      <a:endParaRPr lang="ko-KR" altLang="en-US" sz="500" kern="1200">
                         <a:solidFill>
                           <a:schemeClr val="tx1"/>
                         </a:solidFill>
@@ -16657,14 +16100,14 @@
                   </a:ext>
                 </a:extLst>
               </a:tr>
-              <a:tr h="106412">
+              <a:tr h="77000">
                 <a:tc>
                   <a:txBody>
                     <a:bodyPr/>
                     <a:lstStyle/>
                     <a:p>
                       <a:pPr marL="0" algn="ctr" defTabSz="914400" rtl="0" eaLnBrk="1" latinLnBrk="1" hangingPunct="1"/>
-                      <a:endParaRPr lang="ko-KR" altLang="en-US" sz="700" kern="1200">
+                      <a:endParaRPr lang="ko-KR" altLang="en-US" sz="500" kern="1200">
                         <a:solidFill>
                           <a:schemeClr val="tx1"/>
                         </a:solidFill>
@@ -16689,14 +16132,14 @@
                   </a:ext>
                 </a:extLst>
               </a:tr>
-              <a:tr h="106412">
+              <a:tr h="77000">
                 <a:tc>
                   <a:txBody>
                     <a:bodyPr/>
                     <a:lstStyle/>
                     <a:p>
                       <a:pPr marL="0" algn="ctr" defTabSz="914400" rtl="0" eaLnBrk="1" latinLnBrk="1" hangingPunct="1"/>
-                      <a:endParaRPr lang="ko-KR" altLang="en-US" sz="700" kern="1200">
+                      <a:endParaRPr lang="ko-KR" altLang="en-US" sz="500" kern="1200">
                         <a:solidFill>
                           <a:schemeClr val="tx1"/>
                         </a:solidFill>
@@ -16721,14 +16164,14 @@
                   </a:ext>
                 </a:extLst>
               </a:tr>
-              <a:tr h="106412">
+              <a:tr h="77000">
                 <a:tc>
                   <a:txBody>
                     <a:bodyPr/>
                     <a:lstStyle/>
                     <a:p>
                       <a:pPr marL="0" algn="ctr" defTabSz="914400" rtl="0" eaLnBrk="1" latinLnBrk="1" hangingPunct="1"/>
-                      <a:endParaRPr lang="ko-KR" altLang="en-US" sz="700" kern="1200">
+                      <a:endParaRPr lang="ko-KR" altLang="en-US" sz="500" kern="1200">
                         <a:solidFill>
                           <a:schemeClr val="tx1"/>
                         </a:solidFill>
@@ -16753,15 +16196,191 @@
                   </a:ext>
                 </a:extLst>
               </a:tr>
-              <a:tr h="106412">
+              <a:tr h="77000">
                 <a:tc>
                   <a:txBody>
                     <a:bodyPr/>
                     <a:lstStyle/>
                     <a:p>
                       <a:pPr marL="0" algn="ctr" defTabSz="914400" rtl="0" eaLnBrk="1" latinLnBrk="1" hangingPunct="1"/>
+                      <a:endParaRPr lang="ko-KR" altLang="en-US" sz="500" kern="1200">
+                        <a:solidFill>
+                          <a:schemeClr val="tx1"/>
+                        </a:solidFill>
+                        <a:latin typeface="나눔스퀘어OTF" panose="020B0600000101010101" pitchFamily="34" charset="-127"/>
+                        <a:ea typeface="나눔스퀘어OTF" panose="020B0600000101010101" pitchFamily="34" charset="-127"/>
+                        <a:cs typeface="+mn-cs"/>
+                      </a:endParaRPr>
+                    </a:p>
+                  </a:txBody>
+                  <a:tcPr marL="0" marR="0" marT="0" marB="0" anchor="ctr">
+                    <a:solidFill>
+                      <a:schemeClr val="accent2">
+                        <a:lumMod val="20000"/>
+                        <a:lumOff val="80000"/>
+                      </a:schemeClr>
+                    </a:solidFill>
+                  </a:tcPr>
+                </a:tc>
+                <a:extLst>
+                  <a:ext uri="{0D108BD9-81ED-4DB2-BD59-A6C34878D82A}">
+                    <a16:rowId xmlns:a16="http://schemas.microsoft.com/office/drawing/2014/main" val="803895883"/>
+                  </a:ext>
+                </a:extLst>
+              </a:tr>
+              <a:tr h="77000">
+                <a:tc>
+                  <a:txBody>
+                    <a:bodyPr/>
+                    <a:lstStyle/>
+                    <a:p>
+                      <a:pPr marL="0" algn="ctr" defTabSz="914400" rtl="0" eaLnBrk="1" latinLnBrk="1" hangingPunct="1"/>
+                      <a:endParaRPr lang="ko-KR" altLang="en-US" sz="500" kern="1200">
+                        <a:solidFill>
+                          <a:schemeClr val="tx1"/>
+                        </a:solidFill>
+                        <a:latin typeface="나눔스퀘어OTF" panose="020B0600000101010101" pitchFamily="34" charset="-127"/>
+                        <a:ea typeface="나눔스퀘어OTF" panose="020B0600000101010101" pitchFamily="34" charset="-127"/>
+                        <a:cs typeface="+mn-cs"/>
+                      </a:endParaRPr>
+                    </a:p>
+                  </a:txBody>
+                  <a:tcPr marL="0" marR="0" marT="0" marB="0" anchor="ctr">
+                    <a:solidFill>
+                      <a:schemeClr val="accent2">
+                        <a:lumMod val="20000"/>
+                        <a:lumOff val="80000"/>
+                      </a:schemeClr>
+                    </a:solidFill>
+                  </a:tcPr>
+                </a:tc>
+                <a:extLst>
+                  <a:ext uri="{0D108BD9-81ED-4DB2-BD59-A6C34878D82A}">
+                    <a16:rowId xmlns:a16="http://schemas.microsoft.com/office/drawing/2014/main" val="2551428350"/>
+                  </a:ext>
+                </a:extLst>
+              </a:tr>
+              <a:tr h="77000">
+                <a:tc>
+                  <a:txBody>
+                    <a:bodyPr/>
+                    <a:lstStyle/>
+                    <a:p>
+                      <a:pPr marL="0" algn="ctr" defTabSz="914400" rtl="0" eaLnBrk="1" latinLnBrk="1" hangingPunct="1"/>
+                      <a:endParaRPr lang="ko-KR" altLang="en-US" sz="500" kern="1200">
+                        <a:solidFill>
+                          <a:schemeClr val="tx1"/>
+                        </a:solidFill>
+                        <a:latin typeface="나눔스퀘어OTF" panose="020B0600000101010101" pitchFamily="34" charset="-127"/>
+                        <a:ea typeface="나눔스퀘어OTF" panose="020B0600000101010101" pitchFamily="34" charset="-127"/>
+                        <a:cs typeface="+mn-cs"/>
+                      </a:endParaRPr>
+                    </a:p>
+                  </a:txBody>
+                  <a:tcPr marL="0" marR="0" marT="0" marB="0" anchor="ctr">
+                    <a:solidFill>
+                      <a:schemeClr val="accent2">
+                        <a:lumMod val="20000"/>
+                        <a:lumOff val="80000"/>
+                      </a:schemeClr>
+                    </a:solidFill>
+                  </a:tcPr>
+                </a:tc>
+                <a:extLst>
+                  <a:ext uri="{0D108BD9-81ED-4DB2-BD59-A6C34878D82A}">
+                    <a16:rowId xmlns:a16="http://schemas.microsoft.com/office/drawing/2014/main" val="3195524099"/>
+                  </a:ext>
+                </a:extLst>
+              </a:tr>
+              <a:tr h="77000">
+                <a:tc>
+                  <a:txBody>
+                    <a:bodyPr/>
+                    <a:lstStyle/>
+                    <a:p>
+                      <a:pPr marL="0" algn="ctr" defTabSz="914400" rtl="0" eaLnBrk="1" latinLnBrk="1" hangingPunct="1"/>
+                      <a:endParaRPr lang="ko-KR" altLang="en-US" sz="500" kern="1200">
+                        <a:solidFill>
+                          <a:schemeClr val="tx1"/>
+                        </a:solidFill>
+                        <a:latin typeface="나눔스퀘어OTF" panose="020B0600000101010101" pitchFamily="34" charset="-127"/>
+                        <a:ea typeface="나눔스퀘어OTF" panose="020B0600000101010101" pitchFamily="34" charset="-127"/>
+                        <a:cs typeface="+mn-cs"/>
+                      </a:endParaRPr>
+                    </a:p>
+                  </a:txBody>
+                  <a:tcPr marL="0" marR="0" marT="0" marB="0" anchor="ctr">
+                    <a:solidFill>
+                      <a:schemeClr val="accent2">
+                        <a:lumMod val="20000"/>
+                        <a:lumOff val="80000"/>
+                      </a:schemeClr>
+                    </a:solidFill>
+                  </a:tcPr>
+                </a:tc>
+                <a:extLst>
+                  <a:ext uri="{0D108BD9-81ED-4DB2-BD59-A6C34878D82A}">
+                    <a16:rowId xmlns:a16="http://schemas.microsoft.com/office/drawing/2014/main" val="2476027285"/>
+                  </a:ext>
+                </a:extLst>
+              </a:tr>
+              <a:tr h="77000">
+                <a:tc>
+                  <a:txBody>
+                    <a:bodyPr/>
+                    <a:lstStyle/>
+                    <a:p>
+                      <a:pPr marL="0" algn="ctr" defTabSz="914400" rtl="0" eaLnBrk="1" latinLnBrk="1" hangingPunct="1"/>
+                      <a:endParaRPr lang="ko-KR" altLang="en-US" sz="500" kern="1200">
+                        <a:solidFill>
+                          <a:schemeClr val="tx1"/>
+                        </a:solidFill>
+                        <a:latin typeface="나눔스퀘어OTF" panose="020B0600000101010101" pitchFamily="34" charset="-127"/>
+                        <a:ea typeface="나눔스퀘어OTF" panose="020B0600000101010101" pitchFamily="34" charset="-127"/>
+                        <a:cs typeface="+mn-cs"/>
+                      </a:endParaRPr>
+                    </a:p>
+                  </a:txBody>
+                  <a:tcPr marL="0" marR="0" marT="0" marB="0" anchor="ctr">
+                    <a:solidFill>
+                      <a:schemeClr val="accent2">
+                        <a:lumMod val="20000"/>
+                        <a:lumOff val="80000"/>
+                      </a:schemeClr>
+                    </a:solidFill>
+                  </a:tcPr>
+                </a:tc>
+                <a:extLst>
+                  <a:ext uri="{0D108BD9-81ED-4DB2-BD59-A6C34878D82A}">
+                    <a16:rowId xmlns:a16="http://schemas.microsoft.com/office/drawing/2014/main" val="388534800"/>
+                  </a:ext>
+                </a:extLst>
+              </a:tr>
+              <a:tr h="77000">
+                <a:tc>
+                  <a:txBody>
+                    <a:bodyPr/>
+                    <a:lstStyle/>
+                    <a:p>
+                      <a:pPr marL="0" marR="0" lvl="0" indent="0" algn="ctr" defTabSz="914400" rtl="0" eaLnBrk="1" fontAlgn="auto" latinLnBrk="1" hangingPunct="1">
+                        <a:lnSpc>
+                          <a:spcPct val="100000"/>
+                        </a:lnSpc>
+                        <a:spcBef>
+                          <a:spcPts val="0"/>
+                        </a:spcBef>
+                        <a:spcAft>
+                          <a:spcPts val="0"/>
+                        </a:spcAft>
+                        <a:buClrTx/>
+                        <a:buSzTx/>
+                        <a:buFontTx/>
+                        <a:buNone/>
+                        <a:tabLst/>
+                        <a:defRPr/>
+                      </a:pPr>
                       <a:r>
-                        <a:rPr lang="en-US" altLang="ko-KR" sz="700" kern="1200">
+                        <a:rPr lang="en-US" altLang="ko-KR" sz="500" kern="1200">
                           <a:solidFill>
                             <a:schemeClr val="tx1"/>
                           </a:solidFill>
@@ -16771,7 +16390,7 @@
                         </a:rPr>
                         <a:t>018</a:t>
                       </a:r>
-                      <a:endParaRPr lang="ko-KR" altLang="en-US" sz="700" kern="1200">
+                      <a:endParaRPr lang="ko-KR" altLang="en-US" sz="500" kern="1200">
                         <a:solidFill>
                           <a:schemeClr val="tx1"/>
                         </a:solidFill>
@@ -16792,7 +16411,7 @@
                 </a:tc>
                 <a:extLst>
                   <a:ext uri="{0D108BD9-81ED-4DB2-BD59-A6C34878D82A}">
-                    <a16:rowId xmlns:a16="http://schemas.microsoft.com/office/drawing/2014/main" val="803895883"/>
+                    <a16:rowId xmlns:a16="http://schemas.microsoft.com/office/drawing/2014/main" val="4017081140"/>
                   </a:ext>
                 </a:extLst>
               </a:tr>
@@ -16815,14 +16434,14 @@
           <p:nvPr>
             <p:extLst>
               <p:ext uri="{D42A27DB-BD31-4B8C-83A1-F6EECF244321}">
-                <p14:modId xmlns:p14="http://schemas.microsoft.com/office/powerpoint/2010/main" val="2334517976"/>
+                <p14:modId xmlns:p14="http://schemas.microsoft.com/office/powerpoint/2010/main" val="3330592545"/>
               </p:ext>
             </p:extLst>
           </p:nvPr>
         </p:nvGraphicFramePr>
         <p:xfrm>
           <a:off x="3033378" y="4843560"/>
-          <a:ext cx="594000" cy="1386840"/>
+          <a:ext cx="594000" cy="1386000"/>
         </p:xfrm>
         <a:graphic>
           <a:graphicData uri="http://schemas.openxmlformats.org/drawingml/2006/table">
@@ -16839,7 +16458,7 @@
                   </a:extLst>
                 </a:gridCol>
               </a:tblGrid>
-              <a:tr h="106412">
+              <a:tr h="77000">
                 <a:tc>
                   <a:txBody>
                     <a:bodyPr/>
@@ -16847,7 +16466,7 @@
                     <a:p>
                       <a:pPr marL="0" algn="ctr" defTabSz="914400" rtl="0" eaLnBrk="1" latinLnBrk="1" hangingPunct="1"/>
                       <a:r>
-                        <a:rPr lang="en-US" altLang="ko-KR" sz="700" kern="1200">
+                        <a:rPr lang="en-US" altLang="ko-KR" sz="500" kern="1200">
                           <a:solidFill>
                             <a:schemeClr val="tx1"/>
                           </a:solidFill>
@@ -16857,7 +16476,7 @@
                         </a:rPr>
                         <a:t>036</a:t>
                       </a:r>
-                      <a:endParaRPr lang="ko-KR" altLang="en-US" sz="700" kern="1200">
+                      <a:endParaRPr lang="ko-KR" altLang="en-US" sz="500" kern="1200">
                         <a:solidFill>
                           <a:schemeClr val="tx1"/>
                         </a:solidFill>
@@ -16882,14 +16501,14 @@
                   </a:ext>
                 </a:extLst>
               </a:tr>
-              <a:tr h="106412">
+              <a:tr h="77000">
                 <a:tc>
                   <a:txBody>
                     <a:bodyPr/>
                     <a:lstStyle/>
                     <a:p>
                       <a:pPr marL="0" algn="ctr" defTabSz="914400" rtl="0" eaLnBrk="1" latinLnBrk="1" hangingPunct="1"/>
-                      <a:endParaRPr lang="ko-KR" altLang="en-US" sz="700" kern="1200">
+                      <a:endParaRPr lang="ko-KR" altLang="en-US" sz="500" kern="1200">
                         <a:solidFill>
                           <a:schemeClr val="tx1"/>
                         </a:solidFill>
@@ -16914,14 +16533,174 @@
                   </a:ext>
                 </a:extLst>
               </a:tr>
-              <a:tr h="106412">
+              <a:tr h="77000">
                 <a:tc>
                   <a:txBody>
                     <a:bodyPr/>
                     <a:lstStyle/>
                     <a:p>
                       <a:pPr marL="0" algn="ctr" defTabSz="914400" rtl="0" eaLnBrk="1" latinLnBrk="1" hangingPunct="1"/>
-                      <a:endParaRPr lang="ko-KR" altLang="en-US" sz="700" kern="1200">
+                      <a:endParaRPr lang="ko-KR" altLang="en-US" sz="500" kern="1200">
+                        <a:solidFill>
+                          <a:schemeClr val="tx1"/>
+                        </a:solidFill>
+                        <a:latin typeface="나눔스퀘어OTF" panose="020B0600000101010101" pitchFamily="34" charset="-127"/>
+                        <a:ea typeface="나눔스퀘어OTF" panose="020B0600000101010101" pitchFamily="34" charset="-127"/>
+                        <a:cs typeface="+mn-cs"/>
+                      </a:endParaRPr>
+                    </a:p>
+                  </a:txBody>
+                  <a:tcPr marL="0" marR="0" marT="0" marB="0" anchor="ctr">
+                    <a:solidFill>
+                      <a:schemeClr val="accent2">
+                        <a:lumMod val="20000"/>
+                        <a:lumOff val="80000"/>
+                      </a:schemeClr>
+                    </a:solidFill>
+                  </a:tcPr>
+                </a:tc>
+                <a:extLst>
+                  <a:ext uri="{0D108BD9-81ED-4DB2-BD59-A6C34878D82A}">
+                    <a16:rowId xmlns:a16="http://schemas.microsoft.com/office/drawing/2014/main" val="2992936909"/>
+                  </a:ext>
+                </a:extLst>
+              </a:tr>
+              <a:tr h="77000">
+                <a:tc>
+                  <a:txBody>
+                    <a:bodyPr/>
+                    <a:lstStyle/>
+                    <a:p>
+                      <a:pPr marL="0" algn="ctr" defTabSz="914400" rtl="0" eaLnBrk="1" latinLnBrk="1" hangingPunct="1"/>
+                      <a:endParaRPr lang="ko-KR" altLang="en-US" sz="500" kern="1200">
+                        <a:solidFill>
+                          <a:schemeClr val="tx1"/>
+                        </a:solidFill>
+                        <a:latin typeface="나눔스퀘어OTF" panose="020B0600000101010101" pitchFamily="34" charset="-127"/>
+                        <a:ea typeface="나눔스퀘어OTF" panose="020B0600000101010101" pitchFamily="34" charset="-127"/>
+                        <a:cs typeface="+mn-cs"/>
+                      </a:endParaRPr>
+                    </a:p>
+                  </a:txBody>
+                  <a:tcPr marL="0" marR="0" marT="0" marB="0" anchor="ctr">
+                    <a:solidFill>
+                      <a:schemeClr val="accent2">
+                        <a:lumMod val="20000"/>
+                        <a:lumOff val="80000"/>
+                      </a:schemeClr>
+                    </a:solidFill>
+                  </a:tcPr>
+                </a:tc>
+                <a:extLst>
+                  <a:ext uri="{0D108BD9-81ED-4DB2-BD59-A6C34878D82A}">
+                    <a16:rowId xmlns:a16="http://schemas.microsoft.com/office/drawing/2014/main" val="2558522736"/>
+                  </a:ext>
+                </a:extLst>
+              </a:tr>
+              <a:tr h="77000">
+                <a:tc>
+                  <a:txBody>
+                    <a:bodyPr/>
+                    <a:lstStyle/>
+                    <a:p>
+                      <a:pPr marL="0" algn="ctr" defTabSz="914400" rtl="0" eaLnBrk="1" latinLnBrk="1" hangingPunct="1"/>
+                      <a:endParaRPr lang="ko-KR" altLang="en-US" sz="500" kern="1200">
+                        <a:solidFill>
+                          <a:schemeClr val="tx1"/>
+                        </a:solidFill>
+                        <a:latin typeface="나눔스퀘어OTF" panose="020B0600000101010101" pitchFamily="34" charset="-127"/>
+                        <a:ea typeface="나눔스퀘어OTF" panose="020B0600000101010101" pitchFamily="34" charset="-127"/>
+                        <a:cs typeface="+mn-cs"/>
+                      </a:endParaRPr>
+                    </a:p>
+                  </a:txBody>
+                  <a:tcPr marL="0" marR="0" marT="0" marB="0" anchor="ctr">
+                    <a:solidFill>
+                      <a:schemeClr val="accent2">
+                        <a:lumMod val="20000"/>
+                        <a:lumOff val="80000"/>
+                      </a:schemeClr>
+                    </a:solidFill>
+                  </a:tcPr>
+                </a:tc>
+                <a:extLst>
+                  <a:ext uri="{0D108BD9-81ED-4DB2-BD59-A6C34878D82A}">
+                    <a16:rowId xmlns:a16="http://schemas.microsoft.com/office/drawing/2014/main" val="4033280036"/>
+                  </a:ext>
+                </a:extLst>
+              </a:tr>
+              <a:tr h="77000">
+                <a:tc>
+                  <a:txBody>
+                    <a:bodyPr/>
+                    <a:lstStyle/>
+                    <a:p>
+                      <a:pPr marL="0" algn="ctr" defTabSz="914400" rtl="0" eaLnBrk="1" latinLnBrk="1" hangingPunct="1"/>
+                      <a:endParaRPr lang="ko-KR" altLang="en-US" sz="500" kern="1200">
+                        <a:solidFill>
+                          <a:schemeClr val="tx1"/>
+                        </a:solidFill>
+                        <a:latin typeface="나눔스퀘어OTF" panose="020B0600000101010101" pitchFamily="34" charset="-127"/>
+                        <a:ea typeface="나눔스퀘어OTF" panose="020B0600000101010101" pitchFamily="34" charset="-127"/>
+                        <a:cs typeface="+mn-cs"/>
+                      </a:endParaRPr>
+                    </a:p>
+                  </a:txBody>
+                  <a:tcPr marL="0" marR="0" marT="0" marB="0" anchor="ctr">
+                    <a:solidFill>
+                      <a:schemeClr val="accent2">
+                        <a:lumMod val="20000"/>
+                        <a:lumOff val="80000"/>
+                      </a:schemeClr>
+                    </a:solidFill>
+                  </a:tcPr>
+                </a:tc>
+                <a:extLst>
+                  <a:ext uri="{0D108BD9-81ED-4DB2-BD59-A6C34878D82A}">
+                    <a16:rowId xmlns:a16="http://schemas.microsoft.com/office/drawing/2014/main" val="896505728"/>
+                  </a:ext>
+                </a:extLst>
+              </a:tr>
+              <a:tr h="77000">
+                <a:tc>
+                  <a:txBody>
+                    <a:bodyPr/>
+                    <a:lstStyle/>
+                    <a:p>
+                      <a:pPr marL="0" algn="ctr" defTabSz="914400" rtl="0" eaLnBrk="1" latinLnBrk="1" hangingPunct="1"/>
+                      <a:endParaRPr lang="ko-KR" altLang="en-US" sz="500" kern="1200">
+                        <a:solidFill>
+                          <a:schemeClr val="tx1"/>
+                        </a:solidFill>
+                        <a:latin typeface="나눔스퀘어OTF" panose="020B0600000101010101" pitchFamily="34" charset="-127"/>
+                        <a:ea typeface="나눔스퀘어OTF" panose="020B0600000101010101" pitchFamily="34" charset="-127"/>
+                        <a:cs typeface="+mn-cs"/>
+                      </a:endParaRPr>
+                    </a:p>
+                  </a:txBody>
+                  <a:tcPr marL="0" marR="0" marT="0" marB="0" anchor="ctr">
+                    <a:solidFill>
+                      <a:schemeClr val="accent2">
+                        <a:lumMod val="20000"/>
+                        <a:lumOff val="80000"/>
+                      </a:schemeClr>
+                    </a:solidFill>
+                  </a:tcPr>
+                </a:tc>
+                <a:extLst>
+                  <a:ext uri="{0D108BD9-81ED-4DB2-BD59-A6C34878D82A}">
+                    <a16:rowId xmlns:a16="http://schemas.microsoft.com/office/drawing/2014/main" val="2951619331"/>
+                  </a:ext>
+                </a:extLst>
+              </a:tr>
+              <a:tr h="77000">
+                <a:tc>
+                  <a:txBody>
+                    <a:bodyPr/>
+                    <a:lstStyle/>
+                    <a:p>
+                      <a:pPr marL="0" algn="ctr" defTabSz="914400" rtl="0" eaLnBrk="1" latinLnBrk="1" hangingPunct="1"/>
+                      <a:endParaRPr lang="ko-KR" altLang="en-US" sz="500" kern="1200">
                         <a:solidFill>
                           <a:schemeClr val="tx1"/>
                         </a:solidFill>
@@ -16946,14 +16725,14 @@
                   </a:ext>
                 </a:extLst>
               </a:tr>
-              <a:tr h="106412">
+              <a:tr h="77000">
                 <a:tc>
                   <a:txBody>
                     <a:bodyPr/>
                     <a:lstStyle/>
                     <a:p>
                       <a:pPr marL="0" algn="ctr" defTabSz="914400" rtl="0" eaLnBrk="1" latinLnBrk="1" hangingPunct="1"/>
-                      <a:endParaRPr lang="ko-KR" altLang="en-US" sz="700" kern="1200">
+                      <a:endParaRPr lang="ko-KR" altLang="en-US" sz="500" kern="1200">
                         <a:solidFill>
                           <a:schemeClr val="tx1"/>
                         </a:solidFill>
@@ -16978,14 +16757,14 @@
                   </a:ext>
                 </a:extLst>
               </a:tr>
-              <a:tr h="106412">
+              <a:tr h="77000">
                 <a:tc>
                   <a:txBody>
                     <a:bodyPr/>
                     <a:lstStyle/>
                     <a:p>
                       <a:pPr marL="0" algn="ctr" defTabSz="914400" rtl="0" eaLnBrk="1" latinLnBrk="1" hangingPunct="1"/>
-                      <a:endParaRPr lang="ko-KR" altLang="en-US" sz="700" kern="1200">
+                      <a:endParaRPr lang="ko-KR" altLang="en-US" sz="500" kern="1200">
                         <a:solidFill>
                           <a:schemeClr val="tx1"/>
                         </a:solidFill>
@@ -17010,14 +16789,14 @@
                   </a:ext>
                 </a:extLst>
               </a:tr>
-              <a:tr h="106412">
+              <a:tr h="77000">
                 <a:tc>
                   <a:txBody>
                     <a:bodyPr/>
                     <a:lstStyle/>
                     <a:p>
                       <a:pPr marL="0" algn="ctr" defTabSz="914400" rtl="0" eaLnBrk="1" latinLnBrk="1" hangingPunct="1"/>
-                      <a:endParaRPr lang="ko-KR" altLang="en-US" sz="700" kern="1200">
+                      <a:endParaRPr lang="ko-KR" altLang="en-US" sz="500" kern="1200">
                         <a:solidFill>
                           <a:schemeClr val="tx1"/>
                         </a:solidFill>
@@ -17042,14 +16821,14 @@
                   </a:ext>
                 </a:extLst>
               </a:tr>
-              <a:tr h="106412">
+              <a:tr h="77000">
                 <a:tc>
                   <a:txBody>
                     <a:bodyPr/>
                     <a:lstStyle/>
                     <a:p>
                       <a:pPr marL="0" algn="ctr" defTabSz="914400" rtl="0" eaLnBrk="1" latinLnBrk="1" hangingPunct="1"/>
-                      <a:endParaRPr lang="ko-KR" altLang="en-US" sz="700" kern="1200">
+                      <a:endParaRPr lang="ko-KR" altLang="en-US" sz="500" kern="1200">
                         <a:solidFill>
                           <a:schemeClr val="tx1"/>
                         </a:solidFill>
@@ -17074,14 +16853,14 @@
                   </a:ext>
                 </a:extLst>
               </a:tr>
-              <a:tr h="106412">
+              <a:tr h="77000">
                 <a:tc>
                   <a:txBody>
                     <a:bodyPr/>
                     <a:lstStyle/>
                     <a:p>
                       <a:pPr marL="0" algn="ctr" defTabSz="914400" rtl="0" eaLnBrk="1" latinLnBrk="1" hangingPunct="1"/>
-                      <a:endParaRPr lang="ko-KR" altLang="en-US" sz="700" kern="1200">
+                      <a:endParaRPr lang="ko-KR" altLang="en-US" sz="500" kern="1200">
                         <a:solidFill>
                           <a:schemeClr val="tx1"/>
                         </a:solidFill>
@@ -17106,14 +16885,14 @@
                   </a:ext>
                 </a:extLst>
               </a:tr>
-              <a:tr h="106412">
+              <a:tr h="77000">
                 <a:tc>
                   <a:txBody>
                     <a:bodyPr/>
                     <a:lstStyle/>
                     <a:p>
                       <a:pPr marL="0" algn="ctr" defTabSz="914400" rtl="0" eaLnBrk="1" latinLnBrk="1" hangingPunct="1"/>
-                      <a:endParaRPr lang="ko-KR" altLang="en-US" sz="700" kern="1200">
+                      <a:endParaRPr lang="ko-KR" altLang="en-US" sz="500" kern="1200">
                         <a:solidFill>
                           <a:schemeClr val="tx1"/>
                         </a:solidFill>
@@ -17138,14 +16917,14 @@
                   </a:ext>
                 </a:extLst>
               </a:tr>
-              <a:tr h="106412">
+              <a:tr h="77000">
                 <a:tc>
                   <a:txBody>
                     <a:bodyPr/>
                     <a:lstStyle/>
                     <a:p>
                       <a:pPr marL="0" algn="ctr" defTabSz="914400" rtl="0" eaLnBrk="1" latinLnBrk="1" hangingPunct="1"/>
-                      <a:endParaRPr lang="ko-KR" altLang="en-US" sz="700" kern="1200">
+                      <a:endParaRPr lang="ko-KR" altLang="en-US" sz="500" kern="1200">
                         <a:solidFill>
                           <a:schemeClr val="tx1"/>
                         </a:solidFill>
@@ -17170,14 +16949,14 @@
                   </a:ext>
                 </a:extLst>
               </a:tr>
-              <a:tr h="106412">
+              <a:tr h="77000">
                 <a:tc>
                   <a:txBody>
                     <a:bodyPr/>
                     <a:lstStyle/>
                     <a:p>
                       <a:pPr marL="0" algn="ctr" defTabSz="914400" rtl="0" eaLnBrk="1" latinLnBrk="1" hangingPunct="1"/>
-                      <a:endParaRPr lang="ko-KR" altLang="en-US" sz="700" kern="1200">
+                      <a:endParaRPr lang="ko-KR" altLang="en-US" sz="500" kern="1200">
                         <a:solidFill>
                           <a:schemeClr val="tx1"/>
                         </a:solidFill>
@@ -17202,14 +16981,14 @@
                   </a:ext>
                 </a:extLst>
               </a:tr>
-              <a:tr h="106412">
+              <a:tr h="77000">
                 <a:tc>
                   <a:txBody>
                     <a:bodyPr/>
                     <a:lstStyle/>
                     <a:p>
                       <a:pPr marL="0" algn="ctr" defTabSz="914400" rtl="0" eaLnBrk="1" latinLnBrk="1" hangingPunct="1"/>
-                      <a:endParaRPr lang="ko-KR" altLang="en-US" sz="700" kern="1200">
+                      <a:endParaRPr lang="ko-KR" altLang="en-US" sz="500" kern="1200">
                         <a:solidFill>
                           <a:schemeClr val="tx1"/>
                         </a:solidFill>
@@ -17234,7 +17013,7 @@
                   </a:ext>
                 </a:extLst>
               </a:tr>
-              <a:tr h="106412">
+              <a:tr h="77000">
                 <a:tc>
                   <a:txBody>
                     <a:bodyPr/>
@@ -17242,7 +17021,7 @@
                     <a:p>
                       <a:pPr marL="0" algn="ctr" defTabSz="914400" rtl="0" eaLnBrk="1" latinLnBrk="1" hangingPunct="1"/>
                       <a:r>
-                        <a:rPr lang="en-US" altLang="ko-KR" sz="700" kern="1200">
+                        <a:rPr lang="en-US" altLang="ko-KR" sz="500" kern="1200">
                           <a:solidFill>
                             <a:schemeClr val="tx1"/>
                           </a:solidFill>
@@ -17252,7 +17031,7 @@
                         </a:rPr>
                         <a:t>019</a:t>
                       </a:r>
-                      <a:endParaRPr lang="ko-KR" altLang="en-US" sz="700" kern="1200">
+                      <a:endParaRPr lang="ko-KR" altLang="en-US" sz="500" kern="1200">
                         <a:solidFill>
                           <a:schemeClr val="tx1"/>
                         </a:solidFill>
@@ -17296,14 +17075,14 @@
           <p:nvPr>
             <p:extLst>
               <p:ext uri="{D42A27DB-BD31-4B8C-83A1-F6EECF244321}">
-                <p14:modId xmlns:p14="http://schemas.microsoft.com/office/powerpoint/2010/main" val="2286650444"/>
+                <p14:modId xmlns:p14="http://schemas.microsoft.com/office/powerpoint/2010/main" val="4140992888"/>
               </p:ext>
             </p:extLst>
           </p:nvPr>
         </p:nvGraphicFramePr>
         <p:xfrm>
           <a:off x="3714649" y="4846407"/>
-          <a:ext cx="594000" cy="1386840"/>
+          <a:ext cx="594000" cy="1390338"/>
         </p:xfrm>
         <a:graphic>
           <a:graphicData uri="http://schemas.openxmlformats.org/drawingml/2006/table">
@@ -17320,7 +17099,7 @@
                   </a:extLst>
                 </a:gridCol>
               </a:tblGrid>
-              <a:tr h="106412">
+              <a:tr h="77241">
                 <a:tc>
                   <a:txBody>
                     <a:bodyPr/>
@@ -17328,7 +17107,7 @@
                     <a:p>
                       <a:pPr marL="0" algn="ctr" defTabSz="914400" rtl="0" eaLnBrk="1" latinLnBrk="1" hangingPunct="1"/>
                       <a:r>
-                        <a:rPr lang="en-US" altLang="ko-KR" sz="700" kern="1200">
+                        <a:rPr lang="en-US" altLang="ko-KR" sz="500" kern="1200">
                           <a:solidFill>
                             <a:schemeClr val="tx1"/>
                           </a:solidFill>
@@ -17338,7 +17117,7 @@
                         </a:rPr>
                         <a:t>037</a:t>
                       </a:r>
-                      <a:endParaRPr lang="ko-KR" altLang="en-US" sz="700" kern="1200">
+                      <a:endParaRPr lang="ko-KR" altLang="en-US" sz="500" kern="1200">
                         <a:solidFill>
                           <a:schemeClr val="tx1"/>
                         </a:solidFill>
@@ -17363,14 +17142,14 @@
                   </a:ext>
                 </a:extLst>
               </a:tr>
-              <a:tr h="106412">
+              <a:tr h="77241">
                 <a:tc>
                   <a:txBody>
                     <a:bodyPr/>
                     <a:lstStyle/>
                     <a:p>
                       <a:pPr marL="0" algn="ctr" defTabSz="914400" rtl="0" eaLnBrk="1" latinLnBrk="1" hangingPunct="1"/>
-                      <a:endParaRPr lang="ko-KR" altLang="en-US" sz="700" kern="1200">
+                      <a:endParaRPr lang="ko-KR" altLang="en-US" sz="500" kern="1200">
                         <a:solidFill>
                           <a:schemeClr val="tx1"/>
                         </a:solidFill>
@@ -17395,14 +17174,14 @@
                   </a:ext>
                 </a:extLst>
               </a:tr>
-              <a:tr h="106412">
+              <a:tr h="77241">
                 <a:tc>
                   <a:txBody>
                     <a:bodyPr/>
                     <a:lstStyle/>
                     <a:p>
                       <a:pPr marL="0" algn="ctr" defTabSz="914400" rtl="0" eaLnBrk="1" latinLnBrk="1" hangingPunct="1"/>
-                      <a:endParaRPr lang="ko-KR" altLang="en-US" sz="700" kern="1200">
+                      <a:endParaRPr lang="ko-KR" altLang="en-US" sz="500" kern="1200">
                         <a:solidFill>
                           <a:schemeClr val="tx1"/>
                         </a:solidFill>
@@ -17427,14 +17206,14 @@
                   </a:ext>
                 </a:extLst>
               </a:tr>
-              <a:tr h="106412">
+              <a:tr h="77241">
                 <a:tc>
                   <a:txBody>
                     <a:bodyPr/>
                     <a:lstStyle/>
                     <a:p>
                       <a:pPr marL="0" algn="ctr" defTabSz="914400" rtl="0" eaLnBrk="1" latinLnBrk="1" hangingPunct="1"/>
-                      <a:endParaRPr lang="ko-KR" altLang="en-US" sz="700" kern="1200">
+                      <a:endParaRPr lang="ko-KR" altLang="en-US" sz="500" kern="1200">
                         <a:solidFill>
                           <a:schemeClr val="tx1"/>
                         </a:solidFill>
@@ -17459,14 +17238,14 @@
                   </a:ext>
                 </a:extLst>
               </a:tr>
-              <a:tr h="106412">
+              <a:tr h="77241">
                 <a:tc>
                   <a:txBody>
                     <a:bodyPr/>
                     <a:lstStyle/>
                     <a:p>
                       <a:pPr marL="0" algn="ctr" defTabSz="914400" rtl="0" eaLnBrk="1" latinLnBrk="1" hangingPunct="1"/>
-                      <a:endParaRPr lang="ko-KR" altLang="en-US" sz="700" kern="1200">
+                      <a:endParaRPr lang="ko-KR" altLang="en-US" sz="500" kern="1200">
                         <a:solidFill>
                           <a:schemeClr val="tx1"/>
                         </a:solidFill>
@@ -17491,14 +17270,14 @@
                   </a:ext>
                 </a:extLst>
               </a:tr>
-              <a:tr h="106412">
+              <a:tr h="77241">
                 <a:tc>
                   <a:txBody>
                     <a:bodyPr/>
                     <a:lstStyle/>
                     <a:p>
                       <a:pPr marL="0" algn="ctr" defTabSz="914400" rtl="0" eaLnBrk="1" latinLnBrk="1" hangingPunct="1"/>
-                      <a:endParaRPr lang="ko-KR" altLang="en-US" sz="700" kern="1200">
+                      <a:endParaRPr lang="ko-KR" altLang="en-US" sz="500" kern="1200">
                         <a:solidFill>
                           <a:schemeClr val="tx1"/>
                         </a:solidFill>
@@ -17523,14 +17302,14 @@
                   </a:ext>
                 </a:extLst>
               </a:tr>
-              <a:tr h="106412">
+              <a:tr h="77241">
                 <a:tc>
                   <a:txBody>
                     <a:bodyPr/>
                     <a:lstStyle/>
                     <a:p>
                       <a:pPr marL="0" algn="ctr" defTabSz="914400" rtl="0" eaLnBrk="1" latinLnBrk="1" hangingPunct="1"/>
-                      <a:endParaRPr lang="ko-KR" altLang="en-US" sz="700" kern="1200">
+                      <a:endParaRPr lang="ko-KR" altLang="en-US" sz="500" kern="1200">
                         <a:solidFill>
                           <a:schemeClr val="tx1"/>
                         </a:solidFill>
@@ -17555,14 +17334,14 @@
                   </a:ext>
                 </a:extLst>
               </a:tr>
-              <a:tr h="106412">
+              <a:tr h="77241">
                 <a:tc>
                   <a:txBody>
                     <a:bodyPr/>
                     <a:lstStyle/>
                     <a:p>
                       <a:pPr marL="0" algn="ctr" defTabSz="914400" rtl="0" eaLnBrk="1" latinLnBrk="1" hangingPunct="1"/>
-                      <a:endParaRPr lang="ko-KR" altLang="en-US" sz="700" kern="1200">
+                      <a:endParaRPr lang="ko-KR" altLang="en-US" sz="500" kern="1200">
                         <a:solidFill>
                           <a:schemeClr val="tx1"/>
                         </a:solidFill>
@@ -17587,14 +17366,14 @@
                   </a:ext>
                 </a:extLst>
               </a:tr>
-              <a:tr h="106412">
+              <a:tr h="77241">
                 <a:tc>
                   <a:txBody>
                     <a:bodyPr/>
                     <a:lstStyle/>
                     <a:p>
                       <a:pPr marL="0" algn="ctr" defTabSz="914400" rtl="0" eaLnBrk="1" latinLnBrk="1" hangingPunct="1"/>
-                      <a:endParaRPr lang="ko-KR" altLang="en-US" sz="700" kern="1200">
+                      <a:endParaRPr lang="ko-KR" altLang="en-US" sz="500" kern="1200">
                         <a:solidFill>
                           <a:schemeClr val="tx1"/>
                         </a:solidFill>
@@ -17619,14 +17398,14 @@
                   </a:ext>
                 </a:extLst>
               </a:tr>
-              <a:tr h="106412">
+              <a:tr h="77241">
                 <a:tc>
                   <a:txBody>
                     <a:bodyPr/>
                     <a:lstStyle/>
                     <a:p>
                       <a:pPr marL="0" algn="ctr" defTabSz="914400" rtl="0" eaLnBrk="1" latinLnBrk="1" hangingPunct="1"/>
-                      <a:endParaRPr lang="ko-KR" altLang="en-US" sz="700" kern="1200">
+                      <a:endParaRPr lang="ko-KR" altLang="en-US" sz="500" kern="1200">
                         <a:solidFill>
                           <a:schemeClr val="tx1"/>
                         </a:solidFill>
@@ -17651,14 +17430,14 @@
                   </a:ext>
                 </a:extLst>
               </a:tr>
-              <a:tr h="106412">
+              <a:tr h="77241">
                 <a:tc>
                   <a:txBody>
                     <a:bodyPr/>
                     <a:lstStyle/>
                     <a:p>
                       <a:pPr marL="0" algn="ctr" defTabSz="914400" rtl="0" eaLnBrk="1" latinLnBrk="1" hangingPunct="1"/>
-                      <a:endParaRPr lang="ko-KR" altLang="en-US" sz="700" kern="1200">
+                      <a:endParaRPr lang="ko-KR" altLang="en-US" sz="500" kern="1200">
                         <a:solidFill>
                           <a:schemeClr val="tx1"/>
                         </a:solidFill>
@@ -17683,14 +17462,14 @@
                   </a:ext>
                 </a:extLst>
               </a:tr>
-              <a:tr h="106412">
+              <a:tr h="77241">
                 <a:tc>
                   <a:txBody>
                     <a:bodyPr/>
                     <a:lstStyle/>
                     <a:p>
                       <a:pPr marL="0" algn="ctr" defTabSz="914400" rtl="0" eaLnBrk="1" latinLnBrk="1" hangingPunct="1"/>
-                      <a:endParaRPr lang="ko-KR" altLang="en-US" sz="700" kern="1200">
+                      <a:endParaRPr lang="ko-KR" altLang="en-US" sz="500" kern="1200">
                         <a:solidFill>
                           <a:schemeClr val="tx1"/>
                         </a:solidFill>
@@ -17715,7 +17494,167 @@
                   </a:ext>
                 </a:extLst>
               </a:tr>
-              <a:tr h="106412">
+              <a:tr h="77241">
+                <a:tc>
+                  <a:txBody>
+                    <a:bodyPr/>
+                    <a:lstStyle/>
+                    <a:p>
+                      <a:pPr marL="0" algn="ctr" defTabSz="914400" rtl="0" eaLnBrk="1" latinLnBrk="1" hangingPunct="1"/>
+                      <a:endParaRPr lang="ko-KR" altLang="en-US" sz="500" kern="1200">
+                        <a:solidFill>
+                          <a:schemeClr val="tx1"/>
+                        </a:solidFill>
+                        <a:latin typeface="나눔스퀘어OTF" panose="020B0600000101010101" pitchFamily="34" charset="-127"/>
+                        <a:ea typeface="나눔스퀘어OTF" panose="020B0600000101010101" pitchFamily="34" charset="-127"/>
+                        <a:cs typeface="+mn-cs"/>
+                      </a:endParaRPr>
+                    </a:p>
+                  </a:txBody>
+                  <a:tcPr marL="0" marR="0" marT="0" marB="0" anchor="ctr">
+                    <a:solidFill>
+                      <a:schemeClr val="accent2">
+                        <a:lumMod val="20000"/>
+                        <a:lumOff val="80000"/>
+                      </a:schemeClr>
+                    </a:solidFill>
+                  </a:tcPr>
+                </a:tc>
+                <a:extLst>
+                  <a:ext uri="{0D108BD9-81ED-4DB2-BD59-A6C34878D82A}">
+                    <a16:rowId xmlns:a16="http://schemas.microsoft.com/office/drawing/2014/main" val="803895883"/>
+                  </a:ext>
+                </a:extLst>
+              </a:tr>
+              <a:tr h="77241">
+                <a:tc>
+                  <a:txBody>
+                    <a:bodyPr/>
+                    <a:lstStyle/>
+                    <a:p>
+                      <a:pPr marL="0" algn="ctr" defTabSz="914400" rtl="0" eaLnBrk="1" latinLnBrk="1" hangingPunct="1"/>
+                      <a:endParaRPr lang="ko-KR" altLang="en-US" sz="500" kern="1200">
+                        <a:solidFill>
+                          <a:schemeClr val="tx1"/>
+                        </a:solidFill>
+                        <a:latin typeface="나눔스퀘어OTF" panose="020B0600000101010101" pitchFamily="34" charset="-127"/>
+                        <a:ea typeface="나눔스퀘어OTF" panose="020B0600000101010101" pitchFamily="34" charset="-127"/>
+                        <a:cs typeface="+mn-cs"/>
+                      </a:endParaRPr>
+                    </a:p>
+                  </a:txBody>
+                  <a:tcPr marL="0" marR="0" marT="0" marB="0" anchor="ctr">
+                    <a:solidFill>
+                      <a:schemeClr val="accent2">
+                        <a:lumMod val="20000"/>
+                        <a:lumOff val="80000"/>
+                      </a:schemeClr>
+                    </a:solidFill>
+                  </a:tcPr>
+                </a:tc>
+                <a:extLst>
+                  <a:ext uri="{0D108BD9-81ED-4DB2-BD59-A6C34878D82A}">
+                    <a16:rowId xmlns:a16="http://schemas.microsoft.com/office/drawing/2014/main" val="907997741"/>
+                  </a:ext>
+                </a:extLst>
+              </a:tr>
+              <a:tr h="77241">
+                <a:tc>
+                  <a:txBody>
+                    <a:bodyPr/>
+                    <a:lstStyle/>
+                    <a:p>
+                      <a:pPr marL="0" algn="ctr" defTabSz="914400" rtl="0" eaLnBrk="1" latinLnBrk="1" hangingPunct="1"/>
+                      <a:endParaRPr lang="ko-KR" altLang="en-US" sz="500" kern="1200">
+                        <a:solidFill>
+                          <a:schemeClr val="tx1"/>
+                        </a:solidFill>
+                        <a:latin typeface="나눔스퀘어OTF" panose="020B0600000101010101" pitchFamily="34" charset="-127"/>
+                        <a:ea typeface="나눔스퀘어OTF" panose="020B0600000101010101" pitchFamily="34" charset="-127"/>
+                        <a:cs typeface="+mn-cs"/>
+                      </a:endParaRPr>
+                    </a:p>
+                  </a:txBody>
+                  <a:tcPr marL="0" marR="0" marT="0" marB="0" anchor="ctr">
+                    <a:solidFill>
+                      <a:schemeClr val="accent2">
+                        <a:lumMod val="20000"/>
+                        <a:lumOff val="80000"/>
+                      </a:schemeClr>
+                    </a:solidFill>
+                  </a:tcPr>
+                </a:tc>
+                <a:extLst>
+                  <a:ext uri="{0D108BD9-81ED-4DB2-BD59-A6C34878D82A}">
+                    <a16:rowId xmlns:a16="http://schemas.microsoft.com/office/drawing/2014/main" val="3606525901"/>
+                  </a:ext>
+                </a:extLst>
+              </a:tr>
+              <a:tr h="77241">
+                <a:tc>
+                  <a:txBody>
+                    <a:bodyPr/>
+                    <a:lstStyle/>
+                    <a:p>
+                      <a:pPr marL="0" algn="ctr" defTabSz="914400" rtl="0" eaLnBrk="1" latinLnBrk="1" hangingPunct="1"/>
+                      <a:endParaRPr lang="ko-KR" altLang="en-US" sz="500" kern="1200">
+                        <a:solidFill>
+                          <a:schemeClr val="tx1"/>
+                        </a:solidFill>
+                        <a:latin typeface="나눔스퀘어OTF" panose="020B0600000101010101" pitchFamily="34" charset="-127"/>
+                        <a:ea typeface="나눔스퀘어OTF" panose="020B0600000101010101" pitchFamily="34" charset="-127"/>
+                        <a:cs typeface="+mn-cs"/>
+                      </a:endParaRPr>
+                    </a:p>
+                  </a:txBody>
+                  <a:tcPr marL="0" marR="0" marT="0" marB="0" anchor="ctr">
+                    <a:solidFill>
+                      <a:schemeClr val="accent2">
+                        <a:lumMod val="20000"/>
+                        <a:lumOff val="80000"/>
+                      </a:schemeClr>
+                    </a:solidFill>
+                  </a:tcPr>
+                </a:tc>
+                <a:extLst>
+                  <a:ext uri="{0D108BD9-81ED-4DB2-BD59-A6C34878D82A}">
+                    <a16:rowId xmlns:a16="http://schemas.microsoft.com/office/drawing/2014/main" val="758378401"/>
+                  </a:ext>
+                </a:extLst>
+              </a:tr>
+              <a:tr h="77241">
+                <a:tc>
+                  <a:txBody>
+                    <a:bodyPr/>
+                    <a:lstStyle/>
+                    <a:p>
+                      <a:pPr marL="0" algn="ctr" defTabSz="914400" rtl="0" eaLnBrk="1" latinLnBrk="1" hangingPunct="1"/>
+                      <a:endParaRPr lang="ko-KR" altLang="en-US" sz="500" kern="1200">
+                        <a:solidFill>
+                          <a:schemeClr val="tx1"/>
+                        </a:solidFill>
+                        <a:latin typeface="나눔스퀘어OTF" panose="020B0600000101010101" pitchFamily="34" charset="-127"/>
+                        <a:ea typeface="나눔스퀘어OTF" panose="020B0600000101010101" pitchFamily="34" charset="-127"/>
+                        <a:cs typeface="+mn-cs"/>
+                      </a:endParaRPr>
+                    </a:p>
+                  </a:txBody>
+                  <a:tcPr marL="0" marR="0" marT="0" marB="0" anchor="ctr">
+                    <a:solidFill>
+                      <a:schemeClr val="accent2">
+                        <a:lumMod val="20000"/>
+                        <a:lumOff val="80000"/>
+                      </a:schemeClr>
+                    </a:solidFill>
+                  </a:tcPr>
+                </a:tc>
+                <a:extLst>
+                  <a:ext uri="{0D108BD9-81ED-4DB2-BD59-A6C34878D82A}">
+                    <a16:rowId xmlns:a16="http://schemas.microsoft.com/office/drawing/2014/main" val="194435120"/>
+                  </a:ext>
+                </a:extLst>
+              </a:tr>
+              <a:tr h="77241">
                 <a:tc>
                   <a:txBody>
                     <a:bodyPr/>
@@ -17723,7 +17662,7 @@
                     <a:p>
                       <a:pPr marL="0" algn="ctr" defTabSz="914400" rtl="0" eaLnBrk="1" latinLnBrk="1" hangingPunct="1"/>
                       <a:r>
-                        <a:rPr lang="en-US" altLang="ko-KR" sz="700" kern="1200">
+                        <a:rPr lang="en-US" altLang="ko-KR" sz="500" kern="1200">
                           <a:solidFill>
                             <a:schemeClr val="tx1"/>
                           </a:solidFill>
@@ -17733,7 +17672,7 @@
                         </a:rPr>
                         <a:t>054</a:t>
                       </a:r>
-                      <a:endParaRPr lang="ko-KR" altLang="en-US" sz="700" kern="1200">
+                      <a:endParaRPr lang="ko-KR" altLang="en-US" sz="500" kern="1200">
                         <a:solidFill>
                           <a:schemeClr val="tx1"/>
                         </a:solidFill>
@@ -17754,7 +17693,7 @@
                 </a:tc>
                 <a:extLst>
                   <a:ext uri="{0D108BD9-81ED-4DB2-BD59-A6C34878D82A}">
-                    <a16:rowId xmlns:a16="http://schemas.microsoft.com/office/drawing/2014/main" val="803895883"/>
+                    <a16:rowId xmlns:a16="http://schemas.microsoft.com/office/drawing/2014/main" val="581004715"/>
                   </a:ext>
                 </a:extLst>
               </a:tr>
@@ -17777,7 +17716,7 @@
           <p:nvPr>
             <p:extLst>
               <p:ext uri="{D42A27DB-BD31-4B8C-83A1-F6EECF244321}">
-                <p14:modId xmlns:p14="http://schemas.microsoft.com/office/powerpoint/2010/main" val="1094718544"/>
+                <p14:modId xmlns:p14="http://schemas.microsoft.com/office/powerpoint/2010/main" val="3016610500"/>
               </p:ext>
             </p:extLst>
           </p:nvPr>
@@ -17821,51 +17760,70 @@
                     <a:bodyPr/>
                     <a:lstStyle/>
                     <a:p>
-                      <a:pPr latinLnBrk="1"/>
+                      <a:pPr algn="ctr" latinLnBrk="1"/>
                       <a:r>
-                        <a:rPr lang="en-US" altLang="ko-KR" sz="700"/>
-                        <a:t>3</a:t>
+                        <a:rPr lang="en-US" altLang="ko-KR" sz="900">
+                          <a:latin typeface="나눔스퀘어OTF" panose="020B0600000101010101" pitchFamily="34" charset="-127"/>
+                          <a:ea typeface="나눔스퀘어OTF" panose="020B0600000101010101" pitchFamily="34" charset="-127"/>
+                        </a:rPr>
+                        <a:t>201</a:t>
                       </a:r>
-                      <a:endParaRPr lang="ko-KR" altLang="en-US" sz="700"/>
-                    </a:p>
-                  </a:txBody>
-                  <a:tcPr marL="0" marR="0" marT="0" marB="0" vert="eaVert">
-                    <a:solidFill>
-                      <a:schemeClr val="accent2">
-                        <a:lumMod val="20000"/>
-                        <a:lumOff val="80000"/>
-                      </a:schemeClr>
-                    </a:solidFill>
-                  </a:tcPr>
-                </a:tc>
-                <a:tc>
-                  <a:txBody>
-                    <a:bodyPr/>
-                    <a:lstStyle/>
-                    <a:p>
-                      <a:pPr latinLnBrk="1"/>
-                      <a:endParaRPr lang="ko-KR" altLang="en-US" sz="100"/>
-                    </a:p>
-                  </a:txBody>
-                  <a:tcPr marL="0" marR="0" marT="0" marB="0" vert="eaVert">
-                    <a:solidFill>
-                      <a:schemeClr val="accent2">
-                        <a:lumMod val="20000"/>
-                        <a:lumOff val="80000"/>
-                      </a:schemeClr>
-                    </a:solidFill>
-                  </a:tcPr>
-                </a:tc>
-                <a:tc>
-                  <a:txBody>
-                    <a:bodyPr/>
-                    <a:lstStyle/>
-                    <a:p>
-                      <a:pPr latinLnBrk="1"/>
-                      <a:endParaRPr lang="ko-KR" altLang="en-US" sz="100"/>
-                    </a:p>
-                  </a:txBody>
-                  <a:tcPr marL="0" marR="0" marT="0" marB="0" vert="eaVert">
+                      <a:endParaRPr lang="ko-KR" altLang="en-US" sz="900">
+                        <a:latin typeface="나눔스퀘어OTF" panose="020B0600000101010101" pitchFamily="34" charset="-127"/>
+                        <a:ea typeface="나눔스퀘어OTF" panose="020B0600000101010101" pitchFamily="34" charset="-127"/>
+                      </a:endParaRPr>
+                    </a:p>
+                  </a:txBody>
+                  <a:tcPr marL="0" marR="0" marT="0" marB="0" vert="wordArtVertRtl" anchor="ctr">
+                    <a:solidFill>
+                      <a:schemeClr val="accent2">
+                        <a:lumMod val="20000"/>
+                        <a:lumOff val="80000"/>
+                      </a:schemeClr>
+                    </a:solidFill>
+                  </a:tcPr>
+                </a:tc>
+                <a:tc>
+                  <a:txBody>
+                    <a:bodyPr/>
+                    <a:lstStyle/>
+                    <a:p>
+                      <a:pPr algn="ctr" latinLnBrk="1"/>
+                      <a:endParaRPr lang="ko-KR" altLang="en-US" sz="900">
+                        <a:latin typeface="나눔스퀘어OTF" panose="020B0600000101010101" pitchFamily="34" charset="-127"/>
+                        <a:ea typeface="나눔스퀘어OTF" panose="020B0600000101010101" pitchFamily="34" charset="-127"/>
+                      </a:endParaRPr>
+                    </a:p>
+                  </a:txBody>
+                  <a:tcPr marL="0" marR="0" marT="0" marB="0" vert="wordArtVertRtl" anchor="ctr">
+                    <a:solidFill>
+                      <a:schemeClr val="accent2">
+                        <a:lumMod val="20000"/>
+                        <a:lumOff val="80000"/>
+                      </a:schemeClr>
+                    </a:solidFill>
+                  </a:tcPr>
+                </a:tc>
+                <a:tc>
+                  <a:txBody>
+                    <a:bodyPr/>
+                    <a:lstStyle/>
+                    <a:p>
+                      <a:pPr algn="ctr" latinLnBrk="1"/>
+                      <a:r>
+                        <a:rPr lang="en-US" altLang="ko-KR" sz="900">
+                          <a:latin typeface="나눔스퀘어OTF" panose="020B0600000101010101" pitchFamily="34" charset="-127"/>
+                          <a:ea typeface="나눔스퀘어OTF" panose="020B0600000101010101" pitchFamily="34" charset="-127"/>
+                        </a:rPr>
+                        <a:t>203</a:t>
+                      </a:r>
+                      <a:endParaRPr lang="ko-KR" altLang="en-US" sz="900">
+                        <a:latin typeface="나눔스퀘어OTF" panose="020B0600000101010101" pitchFamily="34" charset="-127"/>
+                        <a:ea typeface="나눔스퀘어OTF" panose="020B0600000101010101" pitchFamily="34" charset="-127"/>
+                      </a:endParaRPr>
+                    </a:p>
+                  </a:txBody>
+                  <a:tcPr marL="0" marR="0" marT="0" marB="0" vert="wordArtVertRtl" anchor="ctr">
                     <a:solidFill>
                       <a:schemeClr val="accent2">
                         <a:lumMod val="20000"/>
@@ -21907,6 +21865,881 @@
           </a:fontRef>
         </p:style>
       </p:cxnSp>
+      <p:graphicFrame>
+        <p:nvGraphicFramePr>
+          <p:cNvPr id="102" name="표 5">
+            <a:extLst>
+              <a:ext uri="{FF2B5EF4-FFF2-40B4-BE49-F238E27FC236}">
+                <a16:creationId xmlns:a16="http://schemas.microsoft.com/office/drawing/2014/main" id="{79144195-B899-46AE-B336-B09FE2522BB0}"/>
+              </a:ext>
+            </a:extLst>
+          </p:cNvPr>
+          <p:cNvGraphicFramePr>
+            <a:graphicFrameLocks noGrp="1"/>
+          </p:cNvGraphicFramePr>
+          <p:nvPr>
+            <p:extLst>
+              <p:ext uri="{D42A27DB-BD31-4B8C-83A1-F6EECF244321}">
+                <p14:modId xmlns:p14="http://schemas.microsoft.com/office/powerpoint/2010/main" val="1413781943"/>
+              </p:ext>
+            </p:extLst>
+          </p:nvPr>
+        </p:nvGraphicFramePr>
+        <p:xfrm>
+          <a:off x="8512958" y="2730827"/>
+          <a:ext cx="597600" cy="502920"/>
+        </p:xfrm>
+        <a:graphic>
+          <a:graphicData uri="http://schemas.openxmlformats.org/drawingml/2006/table">
+            <a:tbl>
+              <a:tblPr firstRow="1" bandRow="1">
+                <a:tableStyleId>{5940675A-B579-460E-94D1-54222C63F5DA}</a:tableStyleId>
+              </a:tblPr>
+              <a:tblGrid>
+                <a:gridCol w="597600">
+                  <a:extLst>
+                    <a:ext uri="{9D8B030D-6E8A-4147-A177-3AD203B41FA5}">
+                      <a16:colId xmlns:a16="http://schemas.microsoft.com/office/drawing/2014/main" val="4045200075"/>
+                    </a:ext>
+                  </a:extLst>
+                </a:gridCol>
+              </a:tblGrid>
+              <a:tr h="41917">
+                <a:tc>
+                  <a:txBody>
+                    <a:bodyPr/>
+                    <a:lstStyle/>
+                    <a:p>
+                      <a:pPr marL="0" algn="ctr" defTabSz="914400" rtl="0" eaLnBrk="1" latinLnBrk="1" hangingPunct="1"/>
+                      <a:r>
+                        <a:rPr lang="en-US" altLang="ko-KR" sz="300" kern="1200">
+                          <a:solidFill>
+                            <a:schemeClr val="tx1"/>
+                          </a:solidFill>
+                          <a:latin typeface="나눔스퀘어OTF" panose="020B0600000101010101" pitchFamily="34" charset="-127"/>
+                          <a:ea typeface="나눔스퀘어OTF" panose="020B0600000101010101" pitchFamily="34" charset="-127"/>
+                          <a:cs typeface="+mn-cs"/>
+                        </a:rPr>
+                        <a:t>154</a:t>
+                      </a:r>
+                      <a:endParaRPr lang="ko-KR" altLang="en-US" sz="300" kern="1200">
+                        <a:solidFill>
+                          <a:schemeClr val="tx1"/>
+                        </a:solidFill>
+                        <a:latin typeface="나눔스퀘어OTF" panose="020B0600000101010101" pitchFamily="34" charset="-127"/>
+                        <a:ea typeface="나눔스퀘어OTF" panose="020B0600000101010101" pitchFamily="34" charset="-127"/>
+                        <a:cs typeface="+mn-cs"/>
+                      </a:endParaRPr>
+                    </a:p>
+                  </a:txBody>
+                  <a:tcPr marL="0" marR="0" marT="0" marB="0" anchor="ctr">
+                    <a:solidFill>
+                      <a:schemeClr val="accent2">
+                        <a:lumMod val="20000"/>
+                        <a:lumOff val="80000"/>
+                      </a:schemeClr>
+                    </a:solidFill>
+                  </a:tcPr>
+                </a:tc>
+                <a:extLst>
+                  <a:ext uri="{0D108BD9-81ED-4DB2-BD59-A6C34878D82A}">
+                    <a16:rowId xmlns:a16="http://schemas.microsoft.com/office/drawing/2014/main" val="628567818"/>
+                  </a:ext>
+                </a:extLst>
+              </a:tr>
+              <a:tr h="41917">
+                <a:tc>
+                  <a:txBody>
+                    <a:bodyPr/>
+                    <a:lstStyle/>
+                    <a:p>
+                      <a:pPr marL="0" algn="ctr" defTabSz="914400" rtl="0" eaLnBrk="1" latinLnBrk="1" hangingPunct="1"/>
+                      <a:endParaRPr lang="ko-KR" altLang="en-US" sz="300" kern="1200">
+                        <a:solidFill>
+                          <a:schemeClr val="tx1"/>
+                        </a:solidFill>
+                        <a:latin typeface="나눔스퀘어OTF" panose="020B0600000101010101" pitchFamily="34" charset="-127"/>
+                        <a:ea typeface="나눔스퀘어OTF" panose="020B0600000101010101" pitchFamily="34" charset="-127"/>
+                        <a:cs typeface="+mn-cs"/>
+                      </a:endParaRPr>
+                    </a:p>
+                  </a:txBody>
+                  <a:tcPr marL="0" marR="0" marT="0" marB="0" anchor="ctr">
+                    <a:solidFill>
+                      <a:schemeClr val="accent2">
+                        <a:lumMod val="20000"/>
+                        <a:lumOff val="80000"/>
+                      </a:schemeClr>
+                    </a:solidFill>
+                  </a:tcPr>
+                </a:tc>
+                <a:extLst>
+                  <a:ext uri="{0D108BD9-81ED-4DB2-BD59-A6C34878D82A}">
+                    <a16:rowId xmlns:a16="http://schemas.microsoft.com/office/drawing/2014/main" val="2532934461"/>
+                  </a:ext>
+                </a:extLst>
+              </a:tr>
+              <a:tr h="41917">
+                <a:tc>
+                  <a:txBody>
+                    <a:bodyPr/>
+                    <a:lstStyle/>
+                    <a:p>
+                      <a:pPr marL="0" algn="ctr" defTabSz="914400" rtl="0" eaLnBrk="1" latinLnBrk="1" hangingPunct="1"/>
+                      <a:endParaRPr lang="ko-KR" altLang="en-US" sz="300" kern="1200">
+                        <a:solidFill>
+                          <a:schemeClr val="tx1"/>
+                        </a:solidFill>
+                        <a:latin typeface="나눔스퀘어OTF" panose="020B0600000101010101" pitchFamily="34" charset="-127"/>
+                        <a:ea typeface="나눔스퀘어OTF" panose="020B0600000101010101" pitchFamily="34" charset="-127"/>
+                        <a:cs typeface="+mn-cs"/>
+                      </a:endParaRPr>
+                    </a:p>
+                  </a:txBody>
+                  <a:tcPr marL="0" marR="0" marT="0" marB="0" anchor="ctr">
+                    <a:solidFill>
+                      <a:schemeClr val="accent2">
+                        <a:lumMod val="20000"/>
+                        <a:lumOff val="80000"/>
+                      </a:schemeClr>
+                    </a:solidFill>
+                  </a:tcPr>
+                </a:tc>
+                <a:extLst>
+                  <a:ext uri="{0D108BD9-81ED-4DB2-BD59-A6C34878D82A}">
+                    <a16:rowId xmlns:a16="http://schemas.microsoft.com/office/drawing/2014/main" val="2555614779"/>
+                  </a:ext>
+                </a:extLst>
+              </a:tr>
+              <a:tr h="41917">
+                <a:tc>
+                  <a:txBody>
+                    <a:bodyPr/>
+                    <a:lstStyle/>
+                    <a:p>
+                      <a:pPr marL="0" algn="ctr" defTabSz="914400" rtl="0" eaLnBrk="1" latinLnBrk="1" hangingPunct="1"/>
+                      <a:endParaRPr lang="ko-KR" altLang="en-US" sz="300" kern="1200">
+                        <a:solidFill>
+                          <a:schemeClr val="tx1"/>
+                        </a:solidFill>
+                        <a:latin typeface="나눔스퀘어OTF" panose="020B0600000101010101" pitchFamily="34" charset="-127"/>
+                        <a:ea typeface="나눔스퀘어OTF" panose="020B0600000101010101" pitchFamily="34" charset="-127"/>
+                        <a:cs typeface="+mn-cs"/>
+                      </a:endParaRPr>
+                    </a:p>
+                  </a:txBody>
+                  <a:tcPr marL="0" marR="0" marT="0" marB="0" anchor="ctr">
+                    <a:solidFill>
+                      <a:schemeClr val="accent2">
+                        <a:lumMod val="20000"/>
+                        <a:lumOff val="80000"/>
+                      </a:schemeClr>
+                    </a:solidFill>
+                  </a:tcPr>
+                </a:tc>
+                <a:extLst>
+                  <a:ext uri="{0D108BD9-81ED-4DB2-BD59-A6C34878D82A}">
+                    <a16:rowId xmlns:a16="http://schemas.microsoft.com/office/drawing/2014/main" val="3479974772"/>
+                  </a:ext>
+                </a:extLst>
+              </a:tr>
+              <a:tr h="41917">
+                <a:tc>
+                  <a:txBody>
+                    <a:bodyPr/>
+                    <a:lstStyle/>
+                    <a:p>
+                      <a:pPr marL="0" algn="ctr" defTabSz="914400" rtl="0" eaLnBrk="1" latinLnBrk="1" hangingPunct="1"/>
+                      <a:endParaRPr lang="ko-KR" altLang="en-US" sz="300" kern="1200">
+                        <a:solidFill>
+                          <a:schemeClr val="tx1"/>
+                        </a:solidFill>
+                        <a:latin typeface="나눔스퀘어OTF" panose="020B0600000101010101" pitchFamily="34" charset="-127"/>
+                        <a:ea typeface="나눔스퀘어OTF" panose="020B0600000101010101" pitchFamily="34" charset="-127"/>
+                        <a:cs typeface="+mn-cs"/>
+                      </a:endParaRPr>
+                    </a:p>
+                  </a:txBody>
+                  <a:tcPr marL="0" marR="0" marT="0" marB="0" anchor="ctr">
+                    <a:solidFill>
+                      <a:schemeClr val="accent2">
+                        <a:lumMod val="20000"/>
+                        <a:lumOff val="80000"/>
+                      </a:schemeClr>
+                    </a:solidFill>
+                  </a:tcPr>
+                </a:tc>
+                <a:extLst>
+                  <a:ext uri="{0D108BD9-81ED-4DB2-BD59-A6C34878D82A}">
+                    <a16:rowId xmlns:a16="http://schemas.microsoft.com/office/drawing/2014/main" val="1701727689"/>
+                  </a:ext>
+                </a:extLst>
+              </a:tr>
+              <a:tr h="41917">
+                <a:tc>
+                  <a:txBody>
+                    <a:bodyPr/>
+                    <a:lstStyle/>
+                    <a:p>
+                      <a:pPr marL="0" algn="ctr" defTabSz="914400" rtl="0" eaLnBrk="1" latinLnBrk="1" hangingPunct="1"/>
+                      <a:endParaRPr lang="ko-KR" altLang="en-US" sz="300" kern="1200">
+                        <a:solidFill>
+                          <a:schemeClr val="tx1"/>
+                        </a:solidFill>
+                        <a:latin typeface="나눔스퀘어OTF" panose="020B0600000101010101" pitchFamily="34" charset="-127"/>
+                        <a:ea typeface="나눔스퀘어OTF" panose="020B0600000101010101" pitchFamily="34" charset="-127"/>
+                        <a:cs typeface="+mn-cs"/>
+                      </a:endParaRPr>
+                    </a:p>
+                  </a:txBody>
+                  <a:tcPr marL="0" marR="0" marT="0" marB="0" anchor="ctr">
+                    <a:solidFill>
+                      <a:schemeClr val="accent2">
+                        <a:lumMod val="20000"/>
+                        <a:lumOff val="80000"/>
+                      </a:schemeClr>
+                    </a:solidFill>
+                  </a:tcPr>
+                </a:tc>
+                <a:extLst>
+                  <a:ext uri="{0D108BD9-81ED-4DB2-BD59-A6C34878D82A}">
+                    <a16:rowId xmlns:a16="http://schemas.microsoft.com/office/drawing/2014/main" val="3960566237"/>
+                  </a:ext>
+                </a:extLst>
+              </a:tr>
+              <a:tr h="41917">
+                <a:tc>
+                  <a:txBody>
+                    <a:bodyPr/>
+                    <a:lstStyle/>
+                    <a:p>
+                      <a:pPr marL="0" algn="ctr" defTabSz="914400" rtl="0" eaLnBrk="1" latinLnBrk="1" hangingPunct="1"/>
+                      <a:endParaRPr lang="ko-KR" altLang="en-US" sz="300" kern="1200">
+                        <a:solidFill>
+                          <a:schemeClr val="tx1"/>
+                        </a:solidFill>
+                        <a:latin typeface="나눔스퀘어OTF" panose="020B0600000101010101" pitchFamily="34" charset="-127"/>
+                        <a:ea typeface="나눔스퀘어OTF" panose="020B0600000101010101" pitchFamily="34" charset="-127"/>
+                        <a:cs typeface="+mn-cs"/>
+                      </a:endParaRPr>
+                    </a:p>
+                  </a:txBody>
+                  <a:tcPr marL="0" marR="0" marT="0" marB="0" anchor="ctr">
+                    <a:solidFill>
+                      <a:schemeClr val="accent2">
+                        <a:lumMod val="20000"/>
+                        <a:lumOff val="80000"/>
+                      </a:schemeClr>
+                    </a:solidFill>
+                  </a:tcPr>
+                </a:tc>
+                <a:extLst>
+                  <a:ext uri="{0D108BD9-81ED-4DB2-BD59-A6C34878D82A}">
+                    <a16:rowId xmlns:a16="http://schemas.microsoft.com/office/drawing/2014/main" val="1222946712"/>
+                  </a:ext>
+                </a:extLst>
+              </a:tr>
+              <a:tr h="41917">
+                <a:tc>
+                  <a:txBody>
+                    <a:bodyPr/>
+                    <a:lstStyle/>
+                    <a:p>
+                      <a:pPr marL="0" algn="ctr" defTabSz="914400" rtl="0" eaLnBrk="1" latinLnBrk="1" hangingPunct="1"/>
+                      <a:endParaRPr lang="ko-KR" altLang="en-US" sz="300" kern="1200">
+                        <a:solidFill>
+                          <a:schemeClr val="tx1"/>
+                        </a:solidFill>
+                        <a:latin typeface="나눔스퀘어OTF" panose="020B0600000101010101" pitchFamily="34" charset="-127"/>
+                        <a:ea typeface="나눔스퀘어OTF" panose="020B0600000101010101" pitchFamily="34" charset="-127"/>
+                        <a:cs typeface="+mn-cs"/>
+                      </a:endParaRPr>
+                    </a:p>
+                  </a:txBody>
+                  <a:tcPr marL="0" marR="0" marT="0" marB="0" anchor="ctr">
+                    <a:solidFill>
+                      <a:schemeClr val="accent2">
+                        <a:lumMod val="20000"/>
+                        <a:lumOff val="80000"/>
+                      </a:schemeClr>
+                    </a:solidFill>
+                  </a:tcPr>
+                </a:tc>
+                <a:extLst>
+                  <a:ext uri="{0D108BD9-81ED-4DB2-BD59-A6C34878D82A}">
+                    <a16:rowId xmlns:a16="http://schemas.microsoft.com/office/drawing/2014/main" val="3250344206"/>
+                  </a:ext>
+                </a:extLst>
+              </a:tr>
+              <a:tr h="41917">
+                <a:tc>
+                  <a:txBody>
+                    <a:bodyPr/>
+                    <a:lstStyle/>
+                    <a:p>
+                      <a:pPr marL="0" algn="ctr" defTabSz="914400" rtl="0" eaLnBrk="1" latinLnBrk="1" hangingPunct="1"/>
+                      <a:endParaRPr lang="ko-KR" altLang="en-US" sz="300" kern="1200">
+                        <a:solidFill>
+                          <a:schemeClr val="tx1"/>
+                        </a:solidFill>
+                        <a:latin typeface="나눔스퀘어OTF" panose="020B0600000101010101" pitchFamily="34" charset="-127"/>
+                        <a:ea typeface="나눔스퀘어OTF" panose="020B0600000101010101" pitchFamily="34" charset="-127"/>
+                        <a:cs typeface="+mn-cs"/>
+                      </a:endParaRPr>
+                    </a:p>
+                  </a:txBody>
+                  <a:tcPr marL="0" marR="0" marT="0" marB="0" anchor="ctr">
+                    <a:solidFill>
+                      <a:schemeClr val="accent2">
+                        <a:lumMod val="20000"/>
+                        <a:lumOff val="80000"/>
+                      </a:schemeClr>
+                    </a:solidFill>
+                  </a:tcPr>
+                </a:tc>
+                <a:extLst>
+                  <a:ext uri="{0D108BD9-81ED-4DB2-BD59-A6C34878D82A}">
+                    <a16:rowId xmlns:a16="http://schemas.microsoft.com/office/drawing/2014/main" val="1559009890"/>
+                  </a:ext>
+                </a:extLst>
+              </a:tr>
+              <a:tr h="41917">
+                <a:tc>
+                  <a:txBody>
+                    <a:bodyPr/>
+                    <a:lstStyle/>
+                    <a:p>
+                      <a:pPr marL="0" algn="ctr" defTabSz="914400" rtl="0" eaLnBrk="1" latinLnBrk="1" hangingPunct="1"/>
+                      <a:endParaRPr lang="ko-KR" altLang="en-US" sz="300" kern="1200">
+                        <a:solidFill>
+                          <a:schemeClr val="tx1"/>
+                        </a:solidFill>
+                        <a:latin typeface="나눔스퀘어OTF" panose="020B0600000101010101" pitchFamily="34" charset="-127"/>
+                        <a:ea typeface="나눔스퀘어OTF" panose="020B0600000101010101" pitchFamily="34" charset="-127"/>
+                        <a:cs typeface="+mn-cs"/>
+                      </a:endParaRPr>
+                    </a:p>
+                  </a:txBody>
+                  <a:tcPr marL="0" marR="0" marT="0" marB="0" anchor="ctr">
+                    <a:solidFill>
+                      <a:schemeClr val="accent2">
+                        <a:lumMod val="20000"/>
+                        <a:lumOff val="80000"/>
+                      </a:schemeClr>
+                    </a:solidFill>
+                  </a:tcPr>
+                </a:tc>
+                <a:extLst>
+                  <a:ext uri="{0D108BD9-81ED-4DB2-BD59-A6C34878D82A}">
+                    <a16:rowId xmlns:a16="http://schemas.microsoft.com/office/drawing/2014/main" val="1160346415"/>
+                  </a:ext>
+                </a:extLst>
+              </a:tr>
+              <a:tr h="41917">
+                <a:tc>
+                  <a:txBody>
+                    <a:bodyPr/>
+                    <a:lstStyle/>
+                    <a:p>
+                      <a:pPr marL="0" algn="ctr" defTabSz="914400" rtl="0" eaLnBrk="1" latinLnBrk="1" hangingPunct="1"/>
+                      <a:r>
+                        <a:rPr lang="en-US" altLang="ko-KR" sz="300" kern="1200">
+                          <a:solidFill>
+                            <a:schemeClr val="tx1"/>
+                          </a:solidFill>
+                          <a:latin typeface="나눔스퀘어OTF" panose="020B0600000101010101" pitchFamily="34" charset="-127"/>
+                          <a:ea typeface="나눔스퀘어OTF" panose="020B0600000101010101" pitchFamily="34" charset="-127"/>
+                          <a:cs typeface="+mn-cs"/>
+                        </a:rPr>
+                        <a:t>144</a:t>
+                      </a:r>
+                      <a:endParaRPr lang="ko-KR" altLang="en-US" sz="300" kern="1200">
+                        <a:solidFill>
+                          <a:schemeClr val="tx1"/>
+                        </a:solidFill>
+                        <a:latin typeface="나눔스퀘어OTF" panose="020B0600000101010101" pitchFamily="34" charset="-127"/>
+                        <a:ea typeface="나눔스퀘어OTF" panose="020B0600000101010101" pitchFamily="34" charset="-127"/>
+                        <a:cs typeface="+mn-cs"/>
+                      </a:endParaRPr>
+                    </a:p>
+                  </a:txBody>
+                  <a:tcPr marL="0" marR="0" marT="0" marB="0" anchor="ctr">
+                    <a:solidFill>
+                      <a:schemeClr val="accent2">
+                        <a:lumMod val="20000"/>
+                        <a:lumOff val="80000"/>
+                      </a:schemeClr>
+                    </a:solidFill>
+                  </a:tcPr>
+                </a:tc>
+                <a:extLst>
+                  <a:ext uri="{0D108BD9-81ED-4DB2-BD59-A6C34878D82A}">
+                    <a16:rowId xmlns:a16="http://schemas.microsoft.com/office/drawing/2014/main" val="1829253279"/>
+                  </a:ext>
+                </a:extLst>
+              </a:tr>
+            </a:tbl>
+          </a:graphicData>
+        </a:graphic>
+      </p:graphicFrame>
+      <p:cxnSp>
+        <p:nvCxnSpPr>
+          <p:cNvPr id="111" name="직선 연결선 110">
+            <a:extLst>
+              <a:ext uri="{FF2B5EF4-FFF2-40B4-BE49-F238E27FC236}">
+                <a16:creationId xmlns:a16="http://schemas.microsoft.com/office/drawing/2014/main" id="{57FA862C-5F58-49F6-A167-8087B19C35D2}"/>
+              </a:ext>
+            </a:extLst>
+          </p:cNvPr>
+          <p:cNvCxnSpPr>
+            <a:cxnSpLocks/>
+          </p:cNvCxnSpPr>
+          <p:nvPr/>
+        </p:nvCxnSpPr>
+        <p:spPr>
+          <a:xfrm>
+            <a:off x="7369853" y="3419159"/>
+            <a:ext cx="14" cy="158969"/>
+          </a:xfrm>
+          <a:prstGeom prst="line">
+            <a:avLst/>
+          </a:prstGeom>
+          <a:ln w="19050">
+            <a:solidFill>
+              <a:schemeClr val="tx1"/>
+            </a:solidFill>
+          </a:ln>
+        </p:spPr>
+        <p:style>
+          <a:lnRef idx="1">
+            <a:schemeClr val="accent1"/>
+          </a:lnRef>
+          <a:fillRef idx="0">
+            <a:schemeClr val="accent1"/>
+          </a:fillRef>
+          <a:effectRef idx="0">
+            <a:schemeClr val="accent1"/>
+          </a:effectRef>
+          <a:fontRef idx="minor">
+            <a:schemeClr val="tx1"/>
+          </a:fontRef>
+        </p:style>
+      </p:cxnSp>
+      <p:grpSp>
+        <p:nvGrpSpPr>
+          <p:cNvPr id="161" name="그룹 160">
+            <a:extLst>
+              <a:ext uri="{FF2B5EF4-FFF2-40B4-BE49-F238E27FC236}">
+                <a16:creationId xmlns:a16="http://schemas.microsoft.com/office/drawing/2014/main" id="{5E0E4488-58F6-4F33-8885-14F56B4AC432}"/>
+              </a:ext>
+            </a:extLst>
+          </p:cNvPr>
+          <p:cNvGrpSpPr/>
+          <p:nvPr/>
+        </p:nvGrpSpPr>
+        <p:grpSpPr>
+          <a:xfrm>
+            <a:off x="5116246" y="4850078"/>
+            <a:ext cx="1951636" cy="886056"/>
+            <a:chOff x="7191320" y="6790110"/>
+            <a:chExt cx="2732291" cy="1240478"/>
+          </a:xfrm>
+          <a:solidFill>
+            <a:schemeClr val="bg1"/>
+          </a:solidFill>
+        </p:grpSpPr>
+        <p:sp>
+          <p:nvSpPr>
+            <p:cNvPr id="99" name="직사각형 98">
+              <a:extLst>
+                <a:ext uri="{FF2B5EF4-FFF2-40B4-BE49-F238E27FC236}">
+                  <a16:creationId xmlns:a16="http://schemas.microsoft.com/office/drawing/2014/main" id="{CD381A83-0427-4297-88B0-DD2650BA382E}"/>
+                </a:ext>
+              </a:extLst>
+            </p:cNvPr>
+            <p:cNvSpPr/>
+            <p:nvPr/>
+          </p:nvSpPr>
+          <p:spPr>
+            <a:xfrm>
+              <a:off x="7197417" y="6793321"/>
+              <a:ext cx="2726192" cy="1237047"/>
+            </a:xfrm>
+            <a:prstGeom prst="rect">
+              <a:avLst/>
+            </a:prstGeom>
+            <a:grpFill/>
+            <a:ln w="19050">
+              <a:solidFill>
+                <a:schemeClr val="tx1"/>
+              </a:solidFill>
+            </a:ln>
+          </p:spPr>
+          <p:style>
+            <a:lnRef idx="2">
+              <a:schemeClr val="accent1">
+                <a:shade val="50000"/>
+              </a:schemeClr>
+            </a:lnRef>
+            <a:fillRef idx="1">
+              <a:schemeClr val="accent1"/>
+            </a:fillRef>
+            <a:effectRef idx="0">
+              <a:schemeClr val="accent1"/>
+            </a:effectRef>
+            <a:fontRef idx="minor">
+              <a:schemeClr val="lt1"/>
+            </a:fontRef>
+          </p:style>
+          <p:txBody>
+            <a:bodyPr rtlCol="0" anchor="ctr"/>
+            <a:lstStyle/>
+            <a:p>
+              <a:pPr algn="ctr"/>
+              <a:endParaRPr lang="ko-KR" altLang="en-US" sz="688"/>
+            </a:p>
+          </p:txBody>
+        </p:sp>
+        <p:cxnSp>
+          <p:nvCxnSpPr>
+            <p:cNvPr id="127" name="직선 연결선 126">
+              <a:extLst>
+                <a:ext uri="{FF2B5EF4-FFF2-40B4-BE49-F238E27FC236}">
+                  <a16:creationId xmlns:a16="http://schemas.microsoft.com/office/drawing/2014/main" id="{A4EB303F-68E0-4E5D-A678-723D3A4FEA9A}"/>
+                </a:ext>
+              </a:extLst>
+            </p:cNvPr>
+            <p:cNvCxnSpPr>
+              <a:cxnSpLocks/>
+            </p:cNvCxnSpPr>
+            <p:nvPr/>
+          </p:nvCxnSpPr>
+          <p:spPr>
+            <a:xfrm flipV="1">
+              <a:off x="7191320" y="6802771"/>
+              <a:ext cx="2732289" cy="1227817"/>
+            </a:xfrm>
+            <a:prstGeom prst="line">
+              <a:avLst/>
+            </a:prstGeom>
+            <a:grpFill/>
+            <a:ln w="19050">
+              <a:solidFill>
+                <a:schemeClr val="tx1"/>
+              </a:solidFill>
+            </a:ln>
+          </p:spPr>
+          <p:style>
+            <a:lnRef idx="1">
+              <a:schemeClr val="accent1"/>
+            </a:lnRef>
+            <a:fillRef idx="0">
+              <a:schemeClr val="accent1"/>
+            </a:fillRef>
+            <a:effectRef idx="0">
+              <a:schemeClr val="accent1"/>
+            </a:effectRef>
+            <a:fontRef idx="minor">
+              <a:schemeClr val="tx1"/>
+            </a:fontRef>
+          </p:style>
+        </p:cxnSp>
+        <p:cxnSp>
+          <p:nvCxnSpPr>
+            <p:cNvPr id="129" name="직선 연결선 128">
+              <a:extLst>
+                <a:ext uri="{FF2B5EF4-FFF2-40B4-BE49-F238E27FC236}">
+                  <a16:creationId xmlns:a16="http://schemas.microsoft.com/office/drawing/2014/main" id="{8EE5DE54-8159-47C4-AF2D-1A2CA0FECF7D}"/>
+                </a:ext>
+              </a:extLst>
+            </p:cNvPr>
+            <p:cNvCxnSpPr>
+              <a:cxnSpLocks/>
+            </p:cNvCxnSpPr>
+            <p:nvPr/>
+          </p:nvCxnSpPr>
+          <p:spPr>
+            <a:xfrm>
+              <a:off x="7195485" y="6790110"/>
+              <a:ext cx="2728126" cy="1237335"/>
+            </a:xfrm>
+            <a:prstGeom prst="line">
+              <a:avLst/>
+            </a:prstGeom>
+            <a:grpFill/>
+            <a:ln w="19050">
+              <a:solidFill>
+                <a:schemeClr val="tx1"/>
+              </a:solidFill>
+            </a:ln>
+          </p:spPr>
+          <p:style>
+            <a:lnRef idx="1">
+              <a:schemeClr val="accent1"/>
+            </a:lnRef>
+            <a:fillRef idx="0">
+              <a:schemeClr val="accent1"/>
+            </a:fillRef>
+            <a:effectRef idx="0">
+              <a:schemeClr val="accent1"/>
+            </a:effectRef>
+            <a:fontRef idx="minor">
+              <a:schemeClr val="tx1"/>
+            </a:fontRef>
+          </p:style>
+        </p:cxnSp>
+      </p:grpSp>
+      <p:graphicFrame>
+        <p:nvGraphicFramePr>
+          <p:cNvPr id="6" name="표 9">
+            <a:extLst>
+              <a:ext uri="{FF2B5EF4-FFF2-40B4-BE49-F238E27FC236}">
+                <a16:creationId xmlns:a16="http://schemas.microsoft.com/office/drawing/2014/main" id="{C5D2E9D2-880F-45EC-A04F-E8AA91CC9C08}"/>
+              </a:ext>
+            </a:extLst>
+          </p:cNvPr>
+          <p:cNvGraphicFramePr>
+            <a:graphicFrameLocks noGrp="1"/>
+          </p:cNvGraphicFramePr>
+          <p:nvPr>
+            <p:extLst>
+              <p:ext uri="{D42A27DB-BD31-4B8C-83A1-F6EECF244321}">
+                <p14:modId xmlns:p14="http://schemas.microsoft.com/office/powerpoint/2010/main" val="1642051137"/>
+              </p:ext>
+            </p:extLst>
+          </p:nvPr>
+        </p:nvGraphicFramePr>
+        <p:xfrm>
+          <a:off x="1985682" y="5923866"/>
+          <a:ext cx="957476" cy="228600"/>
+        </p:xfrm>
+        <a:graphic>
+          <a:graphicData uri="http://schemas.openxmlformats.org/drawingml/2006/table">
+            <a:tbl>
+              <a:tblPr firstRow="1" bandRow="1">
+                <a:tableStyleId>{5940675A-B579-460E-94D1-54222C63F5DA}</a:tableStyleId>
+              </a:tblPr>
+              <a:tblGrid>
+                <a:gridCol w="365935">
+                  <a:extLst>
+                    <a:ext uri="{9D8B030D-6E8A-4147-A177-3AD203B41FA5}">
+                      <a16:colId xmlns:a16="http://schemas.microsoft.com/office/drawing/2014/main" val="2905739457"/>
+                    </a:ext>
+                  </a:extLst>
+                </a:gridCol>
+                <a:gridCol w="591541">
+                  <a:extLst>
+                    <a:ext uri="{9D8B030D-6E8A-4147-A177-3AD203B41FA5}">
+                      <a16:colId xmlns:a16="http://schemas.microsoft.com/office/drawing/2014/main" val="470330918"/>
+                    </a:ext>
+                  </a:extLst>
+                </a:gridCol>
+              </a:tblGrid>
+              <a:tr h="60718">
+                <a:tc>
+                  <a:txBody>
+                    <a:bodyPr/>
+                    <a:lstStyle/>
+                    <a:p>
+                      <a:pPr latinLnBrk="1"/>
+                      <a:endParaRPr lang="ko-KR" altLang="en-US" sz="500">
+                        <a:latin typeface="나눔스퀘어OTF" panose="020B0600000101010101" pitchFamily="34" charset="-127"/>
+                        <a:ea typeface="나눔스퀘어OTF" panose="020B0600000101010101" pitchFamily="34" charset="-127"/>
+                      </a:endParaRPr>
+                    </a:p>
+                  </a:txBody>
+                  <a:tcPr marL="0" marR="0" marT="0" marB="0">
+                    <a:solidFill>
+                      <a:schemeClr val="accent2">
+                        <a:lumMod val="20000"/>
+                        <a:lumOff val="80000"/>
+                      </a:schemeClr>
+                    </a:solidFill>
+                  </a:tcPr>
+                </a:tc>
+                <a:tc>
+                  <a:txBody>
+                    <a:bodyPr/>
+                    <a:lstStyle/>
+                    <a:p>
+                      <a:pPr latinLnBrk="1"/>
+                      <a:endParaRPr lang="ko-KR" altLang="en-US" sz="500">
+                        <a:latin typeface="나눔스퀘어OTF" panose="020B0600000101010101" pitchFamily="34" charset="-127"/>
+                        <a:ea typeface="나눔스퀘어OTF" panose="020B0600000101010101" pitchFamily="34" charset="-127"/>
+                      </a:endParaRPr>
+                    </a:p>
+                  </a:txBody>
+                  <a:tcPr marL="0" marR="0" marT="0" marB="0">
+                    <a:solidFill>
+                      <a:schemeClr val="accent2">
+                        <a:lumMod val="20000"/>
+                        <a:lumOff val="80000"/>
+                      </a:schemeClr>
+                    </a:solidFill>
+                  </a:tcPr>
+                </a:tc>
+                <a:extLst>
+                  <a:ext uri="{0D108BD9-81ED-4DB2-BD59-A6C34878D82A}">
+                    <a16:rowId xmlns:a16="http://schemas.microsoft.com/office/drawing/2014/main" val="212233811"/>
+                  </a:ext>
+                </a:extLst>
+              </a:tr>
+              <a:tr h="60718">
+                <a:tc>
+                  <a:txBody>
+                    <a:bodyPr/>
+                    <a:lstStyle/>
+                    <a:p>
+                      <a:pPr latinLnBrk="1"/>
+                      <a:endParaRPr lang="ko-KR" altLang="en-US" sz="500">
+                        <a:latin typeface="나눔스퀘어OTF" panose="020B0600000101010101" pitchFamily="34" charset="-127"/>
+                        <a:ea typeface="나눔스퀘어OTF" panose="020B0600000101010101" pitchFamily="34" charset="-127"/>
+                      </a:endParaRPr>
+                    </a:p>
+                  </a:txBody>
+                  <a:tcPr marL="0" marR="0" marT="0" marB="0">
+                    <a:solidFill>
+                      <a:schemeClr val="accent2">
+                        <a:lumMod val="20000"/>
+                        <a:lumOff val="80000"/>
+                      </a:schemeClr>
+                    </a:solidFill>
+                  </a:tcPr>
+                </a:tc>
+                <a:tc>
+                  <a:txBody>
+                    <a:bodyPr/>
+                    <a:lstStyle/>
+                    <a:p>
+                      <a:pPr latinLnBrk="1"/>
+                      <a:endParaRPr lang="ko-KR" altLang="en-US" sz="500">
+                        <a:latin typeface="나눔스퀘어OTF" panose="020B0600000101010101" pitchFamily="34" charset="-127"/>
+                        <a:ea typeface="나눔스퀘어OTF" panose="020B0600000101010101" pitchFamily="34" charset="-127"/>
+                      </a:endParaRPr>
+                    </a:p>
+                  </a:txBody>
+                  <a:tcPr marL="0" marR="0" marT="0" marB="0">
+                    <a:solidFill>
+                      <a:schemeClr val="accent2">
+                        <a:lumMod val="20000"/>
+                        <a:lumOff val="80000"/>
+                      </a:schemeClr>
+                    </a:solidFill>
+                  </a:tcPr>
+                </a:tc>
+                <a:extLst>
+                  <a:ext uri="{0D108BD9-81ED-4DB2-BD59-A6C34878D82A}">
+                    <a16:rowId xmlns:a16="http://schemas.microsoft.com/office/drawing/2014/main" val="2926609775"/>
+                  </a:ext>
+                </a:extLst>
+              </a:tr>
+              <a:tr h="60718">
+                <a:tc>
+                  <a:txBody>
+                    <a:bodyPr/>
+                    <a:lstStyle/>
+                    <a:p>
+                      <a:pPr latinLnBrk="1"/>
+                      <a:endParaRPr lang="ko-KR" altLang="en-US" sz="500">
+                        <a:latin typeface="나눔스퀘어OTF" panose="020B0600000101010101" pitchFamily="34" charset="-127"/>
+                        <a:ea typeface="나눔스퀘어OTF" panose="020B0600000101010101" pitchFamily="34" charset="-127"/>
+                      </a:endParaRPr>
+                    </a:p>
+                  </a:txBody>
+                  <a:tcPr marL="0" marR="0" marT="0" marB="0">
+                    <a:solidFill>
+                      <a:schemeClr val="accent2">
+                        <a:lumMod val="20000"/>
+                        <a:lumOff val="80000"/>
+                      </a:schemeClr>
+                    </a:solidFill>
+                  </a:tcPr>
+                </a:tc>
+                <a:tc>
+                  <a:txBody>
+                    <a:bodyPr/>
+                    <a:lstStyle/>
+                    <a:p>
+                      <a:pPr latinLnBrk="1"/>
+                      <a:endParaRPr lang="ko-KR" altLang="en-US" sz="500">
+                        <a:latin typeface="나눔스퀘어OTF" panose="020B0600000101010101" pitchFamily="34" charset="-127"/>
+                        <a:ea typeface="나눔스퀘어OTF" panose="020B0600000101010101" pitchFamily="34" charset="-127"/>
+                      </a:endParaRPr>
+                    </a:p>
+                  </a:txBody>
+                  <a:tcPr marL="0" marR="0" marT="0" marB="0">
+                    <a:solidFill>
+                      <a:schemeClr val="accent2">
+                        <a:lumMod val="20000"/>
+                        <a:lumOff val="80000"/>
+                      </a:schemeClr>
+                    </a:solidFill>
+                  </a:tcPr>
+                </a:tc>
+                <a:extLst>
+                  <a:ext uri="{0D108BD9-81ED-4DB2-BD59-A6C34878D82A}">
+                    <a16:rowId xmlns:a16="http://schemas.microsoft.com/office/drawing/2014/main" val="2746630710"/>
+                  </a:ext>
+                </a:extLst>
+              </a:tr>
+            </a:tbl>
+          </a:graphicData>
+        </a:graphic>
+      </p:graphicFrame>
+      <p:sp>
+        <p:nvSpPr>
+          <p:cNvPr id="112" name="직사각형 111">
+            <a:extLst>
+              <a:ext uri="{FF2B5EF4-FFF2-40B4-BE49-F238E27FC236}">
+                <a16:creationId xmlns:a16="http://schemas.microsoft.com/office/drawing/2014/main" id="{781FBCB7-D019-4F1D-B76E-A091160B4D1C}"/>
+              </a:ext>
+            </a:extLst>
+          </p:cNvPr>
+          <p:cNvSpPr/>
+          <p:nvPr/>
+        </p:nvSpPr>
+        <p:spPr>
+          <a:xfrm>
+            <a:off x="5201921" y="1898288"/>
+            <a:ext cx="1539207" cy="749983"/>
+          </a:xfrm>
+          <a:prstGeom prst="rect">
+            <a:avLst/>
+          </a:prstGeom>
+          <a:solidFill>
+            <a:srgbClr val="FAFED2"/>
+          </a:solidFill>
+          <a:ln>
+            <a:solidFill>
+              <a:schemeClr val="tx1"/>
+            </a:solidFill>
+          </a:ln>
+        </p:spPr>
+        <p:style>
+          <a:lnRef idx="2">
+            <a:schemeClr val="accent1">
+              <a:shade val="50000"/>
+            </a:schemeClr>
+          </a:lnRef>
+          <a:fillRef idx="1">
+            <a:schemeClr val="accent1"/>
+          </a:fillRef>
+          <a:effectRef idx="0">
+            <a:schemeClr val="accent1"/>
+          </a:effectRef>
+          <a:fontRef idx="minor">
+            <a:schemeClr val="lt1"/>
+          </a:fontRef>
+        </p:style>
+        <p:txBody>
+          <a:bodyPr rtlCol="0" anchor="ctr"/>
+          <a:lstStyle/>
+          <a:p>
+            <a:pPr algn="ctr"/>
+            <a:endParaRPr lang="ko-KR" altLang="en-US"/>
+          </a:p>
+        </p:txBody>
+      </p:sp>
     </p:spTree>
     <p:extLst>
       <p:ext uri="{BB962C8B-B14F-4D97-AF65-F5344CB8AC3E}">
@@ -21987,6 +22820,72 @@
 </file>
 
 <file path=ppt/slides/slide4.xml><?xml version="1.0" encoding="utf-8"?>
+<p:sld xmlns:a="http://schemas.openxmlformats.org/drawingml/2006/main" xmlns:r="http://schemas.openxmlformats.org/officeDocument/2006/relationships" xmlns:p="http://schemas.openxmlformats.org/presentationml/2006/main">
+  <p:cSld>
+    <p:spTree>
+      <p:nvGrpSpPr>
+        <p:cNvPr id="1" name=""/>
+        <p:cNvGrpSpPr/>
+        <p:nvPr/>
+      </p:nvGrpSpPr>
+      <p:grpSpPr>
+        <a:xfrm>
+          <a:off x="0" y="0"/>
+          <a:ext cx="0" cy="0"/>
+          <a:chOff x="0" y="0"/>
+          <a:chExt cx="0" cy="0"/>
+        </a:xfrm>
+      </p:grpSpPr>
+      <p:pic>
+        <p:nvPicPr>
+          <p:cNvPr id="3" name="그림 2">
+            <a:extLst>
+              <a:ext uri="{FF2B5EF4-FFF2-40B4-BE49-F238E27FC236}">
+                <a16:creationId xmlns:a16="http://schemas.microsoft.com/office/drawing/2014/main" id="{8E2627F5-25C0-4D7C-989F-71A952FD2608}"/>
+              </a:ext>
+            </a:extLst>
+          </p:cNvPr>
+          <p:cNvPicPr>
+            <a:picLocks noChangeAspect="1"/>
+          </p:cNvPicPr>
+          <p:nvPr/>
+        </p:nvPicPr>
+        <p:blipFill>
+          <a:blip r:embed="rId2">
+            <a:extLst>
+              <a:ext uri="{28A0092B-C50C-407E-A947-70E740481C1C}">
+                <a14:useLocalDpi xmlns:a14="http://schemas.microsoft.com/office/drawing/2010/main" val="0"/>
+              </a:ext>
+            </a:extLst>
+          </a:blip>
+          <a:stretch>
+            <a:fillRect/>
+          </a:stretch>
+        </p:blipFill>
+        <p:spPr>
+          <a:xfrm>
+            <a:off x="1667019" y="0"/>
+            <a:ext cx="8857962" cy="6858000"/>
+          </a:xfrm>
+          <a:prstGeom prst="rect">
+            <a:avLst/>
+          </a:prstGeom>
+        </p:spPr>
+      </p:pic>
+    </p:spTree>
+    <p:extLst>
+      <p:ext uri="{BB962C8B-B14F-4D97-AF65-F5344CB8AC3E}">
+        <p14:creationId xmlns:p14="http://schemas.microsoft.com/office/powerpoint/2010/main" val="1519663067"/>
+      </p:ext>
+    </p:extLst>
+  </p:cSld>
+  <p:clrMapOvr>
+    <a:masterClrMapping/>
+  </p:clrMapOvr>
+</p:sld>
+</file>
+
+<file path=ppt/slides/slide5.xml><?xml version="1.0" encoding="utf-8"?>
 <p:sld xmlns:a="http://schemas.openxmlformats.org/drawingml/2006/main" xmlns:r="http://schemas.openxmlformats.org/officeDocument/2006/relationships" xmlns:p="http://schemas.openxmlformats.org/presentationml/2006/main">
   <p:cSld>
     <p:spTree>

</xml_diff>

<commit_message>
Add search icon to map 2.0.pptx, 2F_1.2.png, modify 3F_1.0.png
modify 3F_1.0.png
3F_1.1 : Paint, add search area, search icon to search area, fix stairs location
3F_1.2 : Add missing shelfs
3F_1.3 : Add missing shelfs
</commit_message>
<xml_diff>
--- a/img/map_make/map_pptx/map 2.0.pptx
+++ b/img/map_make/map_pptx/map 2.0.pptx
@@ -9,7 +9,6 @@
     <p:sldId id="270" r:id="rId3"/>
     <p:sldId id="272" r:id="rId4"/>
     <p:sldId id="274" r:id="rId5"/>
-    <p:sldId id="273" r:id="rId6"/>
   </p:sldIdLst>
   <p:sldSz cx="12192000" cy="6858000"/>
   <p:notesSz cx="6858000" cy="9144000"/>
@@ -263,7 +262,7 @@
           <a:p>
             <a:fld id="{7D6AA50B-2CE9-4D67-90C0-860399FE3F45}" type="datetimeFigureOut">
               <a:rPr lang="ko-KR" altLang="en-US" smtClean="0"/>
-              <a:t>2021-07-21</a:t>
+              <a:t>2021-07-22</a:t>
             </a:fld>
             <a:endParaRPr lang="ko-KR" altLang="en-US"/>
           </a:p>
@@ -461,7 +460,7 @@
           <a:p>
             <a:fld id="{7D6AA50B-2CE9-4D67-90C0-860399FE3F45}" type="datetimeFigureOut">
               <a:rPr lang="ko-KR" altLang="en-US" smtClean="0"/>
-              <a:t>2021-07-21</a:t>
+              <a:t>2021-07-22</a:t>
             </a:fld>
             <a:endParaRPr lang="ko-KR" altLang="en-US"/>
           </a:p>
@@ -669,7 +668,7 @@
           <a:p>
             <a:fld id="{7D6AA50B-2CE9-4D67-90C0-860399FE3F45}" type="datetimeFigureOut">
               <a:rPr lang="ko-KR" altLang="en-US" smtClean="0"/>
-              <a:t>2021-07-21</a:t>
+              <a:t>2021-07-22</a:t>
             </a:fld>
             <a:endParaRPr lang="ko-KR" altLang="en-US"/>
           </a:p>
@@ -867,7 +866,7 @@
           <a:p>
             <a:fld id="{7D6AA50B-2CE9-4D67-90C0-860399FE3F45}" type="datetimeFigureOut">
               <a:rPr lang="ko-KR" altLang="en-US" smtClean="0"/>
-              <a:t>2021-07-21</a:t>
+              <a:t>2021-07-22</a:t>
             </a:fld>
             <a:endParaRPr lang="ko-KR" altLang="en-US"/>
           </a:p>
@@ -1142,7 +1141,7 @@
           <a:p>
             <a:fld id="{7D6AA50B-2CE9-4D67-90C0-860399FE3F45}" type="datetimeFigureOut">
               <a:rPr lang="ko-KR" altLang="en-US" smtClean="0"/>
-              <a:t>2021-07-21</a:t>
+              <a:t>2021-07-22</a:t>
             </a:fld>
             <a:endParaRPr lang="ko-KR" altLang="en-US"/>
           </a:p>
@@ -1407,7 +1406,7 @@
           <a:p>
             <a:fld id="{7D6AA50B-2CE9-4D67-90C0-860399FE3F45}" type="datetimeFigureOut">
               <a:rPr lang="ko-KR" altLang="en-US" smtClean="0"/>
-              <a:t>2021-07-21</a:t>
+              <a:t>2021-07-22</a:t>
             </a:fld>
             <a:endParaRPr lang="ko-KR" altLang="en-US"/>
           </a:p>
@@ -1819,7 +1818,7 @@
           <a:p>
             <a:fld id="{7D6AA50B-2CE9-4D67-90C0-860399FE3F45}" type="datetimeFigureOut">
               <a:rPr lang="ko-KR" altLang="en-US" smtClean="0"/>
-              <a:t>2021-07-21</a:t>
+              <a:t>2021-07-22</a:t>
             </a:fld>
             <a:endParaRPr lang="ko-KR" altLang="en-US"/>
           </a:p>
@@ -1960,7 +1959,7 @@
           <a:p>
             <a:fld id="{7D6AA50B-2CE9-4D67-90C0-860399FE3F45}" type="datetimeFigureOut">
               <a:rPr lang="ko-KR" altLang="en-US" smtClean="0"/>
-              <a:t>2021-07-21</a:t>
+              <a:t>2021-07-22</a:t>
             </a:fld>
             <a:endParaRPr lang="ko-KR" altLang="en-US"/>
           </a:p>
@@ -2073,7 +2072,7 @@
           <a:p>
             <a:fld id="{7D6AA50B-2CE9-4D67-90C0-860399FE3F45}" type="datetimeFigureOut">
               <a:rPr lang="ko-KR" altLang="en-US" smtClean="0"/>
-              <a:t>2021-07-21</a:t>
+              <a:t>2021-07-22</a:t>
             </a:fld>
             <a:endParaRPr lang="ko-KR" altLang="en-US"/>
           </a:p>
@@ -2384,7 +2383,7 @@
           <a:p>
             <a:fld id="{7D6AA50B-2CE9-4D67-90C0-860399FE3F45}" type="datetimeFigureOut">
               <a:rPr lang="ko-KR" altLang="en-US" smtClean="0"/>
-              <a:t>2021-07-21</a:t>
+              <a:t>2021-07-22</a:t>
             </a:fld>
             <a:endParaRPr lang="ko-KR" altLang="en-US"/>
           </a:p>
@@ -2672,7 +2671,7 @@
           <a:p>
             <a:fld id="{7D6AA50B-2CE9-4D67-90C0-860399FE3F45}" type="datetimeFigureOut">
               <a:rPr lang="ko-KR" altLang="en-US" smtClean="0"/>
-              <a:t>2021-07-21</a:t>
+              <a:t>2021-07-22</a:t>
             </a:fld>
             <a:endParaRPr lang="ko-KR" altLang="en-US"/>
           </a:p>
@@ -2913,7 +2912,7 @@
           <a:p>
             <a:fld id="{7D6AA50B-2CE9-4D67-90C0-860399FE3F45}" type="datetimeFigureOut">
               <a:rPr lang="ko-KR" altLang="en-US" smtClean="0"/>
-              <a:t>2021-07-21</a:t>
+              <a:t>2021-07-22</a:t>
             </a:fld>
             <a:endParaRPr lang="ko-KR" altLang="en-US"/>
           </a:p>
@@ -9132,7 +9131,7 @@
         </p:nvSpPr>
         <p:spPr>
           <a:xfrm>
-            <a:off x="1897047" y="522323"/>
+            <a:off x="1907071" y="526058"/>
             <a:ext cx="8372637" cy="3792205"/>
           </a:xfrm>
           <a:custGeom>
@@ -19596,7 +19595,7 @@
           <p:nvPr>
             <p:extLst>
               <p:ext uri="{D42A27DB-BD31-4B8C-83A1-F6EECF244321}">
-                <p14:modId xmlns:p14="http://schemas.microsoft.com/office/powerpoint/2010/main" val="310821668"/>
+                <p14:modId xmlns:p14="http://schemas.microsoft.com/office/powerpoint/2010/main" val="4103161374"/>
               </p:ext>
             </p:extLst>
           </p:nvPr>
@@ -19793,7 +19792,7 @@
           <p:nvPr>
             <p:extLst>
               <p:ext uri="{D42A27DB-BD31-4B8C-83A1-F6EECF244321}">
-                <p14:modId xmlns:p14="http://schemas.microsoft.com/office/powerpoint/2010/main" val="1922809533"/>
+                <p14:modId xmlns:p14="http://schemas.microsoft.com/office/powerpoint/2010/main" val="1422380327"/>
               </p:ext>
             </p:extLst>
           </p:nvPr>
@@ -19899,7 +19898,7 @@
                           <a:latin typeface="나눔스퀘어OTF" panose="020B0600000101010101" pitchFamily="34" charset="-127"/>
                           <a:ea typeface="나눔스퀘어OTF" panose="020B0600000101010101" pitchFamily="34" charset="-127"/>
                         </a:rPr>
-                        <a:t>254</a:t>
+                        <a:t>252</a:t>
                       </a:r>
                       <a:endParaRPr lang="ko-KR" altLang="en-US" sz="800">
                         <a:latin typeface="나눔스퀘어OTF" panose="020B0600000101010101" pitchFamily="34" charset="-127"/>
@@ -22504,14 +22503,14 @@
           <p:nvPr>
             <p:extLst>
               <p:ext uri="{D42A27DB-BD31-4B8C-83A1-F6EECF244321}">
-                <p14:modId xmlns:p14="http://schemas.microsoft.com/office/powerpoint/2010/main" val="1642051137"/>
+                <p14:modId xmlns:p14="http://schemas.microsoft.com/office/powerpoint/2010/main" val="225744912"/>
               </p:ext>
             </p:extLst>
           </p:nvPr>
         </p:nvGraphicFramePr>
         <p:xfrm>
-          <a:off x="1985682" y="5923866"/>
-          <a:ext cx="957476" cy="228600"/>
+          <a:off x="1985682" y="5847666"/>
+          <a:ext cx="957476" cy="304800"/>
         </p:xfrm>
         <a:graphic>
           <a:graphicData uri="http://schemas.openxmlformats.org/drawingml/2006/table">
@@ -22520,14 +22519,7 @@
                 <a:tableStyleId>{5940675A-B579-460E-94D1-54222C63F5DA}</a:tableStyleId>
               </a:tblPr>
               <a:tblGrid>
-                <a:gridCol w="365935">
-                  <a:extLst>
-                    <a:ext uri="{9D8B030D-6E8A-4147-A177-3AD203B41FA5}">
-                      <a16:colId xmlns:a16="http://schemas.microsoft.com/office/drawing/2014/main" val="2905739457"/>
-                    </a:ext>
-                  </a:extLst>
-                </a:gridCol>
-                <a:gridCol w="591541">
+                <a:gridCol w="957476">
                   <a:extLst>
                     <a:ext uri="{9D8B030D-6E8A-4147-A177-3AD203B41FA5}">
                       <a16:colId xmlns:a16="http://schemas.microsoft.com/office/drawing/2014/main" val="470330918"/>
@@ -22557,6 +22549,13 @@
                     </a:solidFill>
                   </a:tcPr>
                 </a:tc>
+                <a:extLst>
+                  <a:ext uri="{0D108BD9-81ED-4DB2-BD59-A6C34878D82A}">
+                    <a16:rowId xmlns:a16="http://schemas.microsoft.com/office/drawing/2014/main" val="2170387259"/>
+                  </a:ext>
+                </a:extLst>
+              </a:tr>
+              <a:tr h="60718">
                 <a:tc>
                   <a:txBody>
                     <a:bodyPr/>
@@ -22606,27 +22605,6 @@
                     </a:solidFill>
                   </a:tcPr>
                 </a:tc>
-                <a:tc>
-                  <a:txBody>
-                    <a:bodyPr/>
-                    <a:lstStyle/>
-                    <a:p>
-                      <a:pPr latinLnBrk="1"/>
-                      <a:endParaRPr lang="ko-KR" altLang="en-US" sz="500">
-                        <a:latin typeface="나눔스퀘어OTF" panose="020B0600000101010101" pitchFamily="34" charset="-127"/>
-                        <a:ea typeface="나눔스퀘어OTF" panose="020B0600000101010101" pitchFamily="34" charset="-127"/>
-                      </a:endParaRPr>
-                    </a:p>
-                  </a:txBody>
-                  <a:tcPr marL="0" marR="0" marT="0" marB="0">
-                    <a:solidFill>
-                      <a:schemeClr val="accent2">
-                        <a:lumMod val="20000"/>
-                        <a:lumOff val="80000"/>
-                      </a:schemeClr>
-                    </a:solidFill>
-                  </a:tcPr>
-                </a:tc>
                 <a:extLst>
                   <a:ext uri="{0D108BD9-81ED-4DB2-BD59-A6C34878D82A}">
                     <a16:rowId xmlns:a16="http://schemas.microsoft.com/office/drawing/2014/main" val="2926609775"/>
@@ -22634,27 +22612,6 @@
                 </a:extLst>
               </a:tr>
               <a:tr h="60718">
-                <a:tc>
-                  <a:txBody>
-                    <a:bodyPr/>
-                    <a:lstStyle/>
-                    <a:p>
-                      <a:pPr latinLnBrk="1"/>
-                      <a:endParaRPr lang="ko-KR" altLang="en-US" sz="500">
-                        <a:latin typeface="나눔스퀘어OTF" panose="020B0600000101010101" pitchFamily="34" charset="-127"/>
-                        <a:ea typeface="나눔스퀘어OTF" panose="020B0600000101010101" pitchFamily="34" charset="-127"/>
-                      </a:endParaRPr>
-                    </a:p>
-                  </a:txBody>
-                  <a:tcPr marL="0" marR="0" marT="0" marB="0">
-                    <a:solidFill>
-                      <a:schemeClr val="accent2">
-                        <a:lumMod val="20000"/>
-                        <a:lumOff val="80000"/>
-                      </a:schemeClr>
-                    </a:solidFill>
-                  </a:tcPr>
-                </a:tc>
                 <a:tc>
                   <a:txBody>
                     <a:bodyPr/>
@@ -22710,6 +22667,132 @@
             <a:srgbClr val="FAFED2"/>
           </a:solidFill>
           <a:ln>
+            <a:solidFill>
+              <a:schemeClr val="tx1"/>
+            </a:solidFill>
+          </a:ln>
+        </p:spPr>
+        <p:style>
+          <a:lnRef idx="2">
+            <a:schemeClr val="accent1">
+              <a:shade val="50000"/>
+            </a:schemeClr>
+          </a:lnRef>
+          <a:fillRef idx="1">
+            <a:schemeClr val="accent1"/>
+          </a:fillRef>
+          <a:effectRef idx="0">
+            <a:schemeClr val="accent1"/>
+          </a:effectRef>
+          <a:fontRef idx="minor">
+            <a:schemeClr val="lt1"/>
+          </a:fontRef>
+        </p:style>
+        <p:txBody>
+          <a:bodyPr rtlCol="0" anchor="ctr"/>
+          <a:lstStyle/>
+          <a:p>
+            <a:pPr algn="ctr"/>
+            <a:endParaRPr lang="ko-KR" altLang="en-US"/>
+          </a:p>
+        </p:txBody>
+      </p:sp>
+      <p:pic>
+        <p:nvPicPr>
+          <p:cNvPr id="11" name="그림 10">
+            <a:extLst>
+              <a:ext uri="{FF2B5EF4-FFF2-40B4-BE49-F238E27FC236}">
+                <a16:creationId xmlns:a16="http://schemas.microsoft.com/office/drawing/2014/main" id="{81DB50A7-9AD7-4D59-B74F-167ADC072137}"/>
+              </a:ext>
+            </a:extLst>
+          </p:cNvPr>
+          <p:cNvPicPr>
+            <a:picLocks noChangeAspect="1"/>
+          </p:cNvPicPr>
+          <p:nvPr/>
+        </p:nvPicPr>
+        <p:blipFill>
+          <a:blip r:embed="rId2">
+            <a:extLst>
+              <a:ext uri="{28A0092B-C50C-407E-A947-70E740481C1C}">
+                <a14:useLocalDpi xmlns:a14="http://schemas.microsoft.com/office/drawing/2010/main" val="0"/>
+              </a:ext>
+            </a:extLst>
+          </a:blip>
+          <a:stretch>
+            <a:fillRect/>
+          </a:stretch>
+        </p:blipFill>
+        <p:spPr>
+          <a:xfrm>
+            <a:off x="3411015" y="3665554"/>
+            <a:ext cx="175923" cy="175923"/>
+          </a:xfrm>
+          <a:prstGeom prst="rect">
+            <a:avLst/>
+          </a:prstGeom>
+        </p:spPr>
+      </p:pic>
+      <p:pic>
+        <p:nvPicPr>
+          <p:cNvPr id="116" name="그림 115">
+            <a:extLst>
+              <a:ext uri="{FF2B5EF4-FFF2-40B4-BE49-F238E27FC236}">
+                <a16:creationId xmlns:a16="http://schemas.microsoft.com/office/drawing/2014/main" id="{0D6EF554-93ED-4471-9221-67527A95C9C2}"/>
+              </a:ext>
+            </a:extLst>
+          </p:cNvPr>
+          <p:cNvPicPr>
+            <a:picLocks noChangeAspect="1"/>
+          </p:cNvPicPr>
+          <p:nvPr/>
+        </p:nvPicPr>
+        <p:blipFill>
+          <a:blip r:embed="rId2">
+            <a:extLst>
+              <a:ext uri="{28A0092B-C50C-407E-A947-70E740481C1C}">
+                <a14:useLocalDpi xmlns:a14="http://schemas.microsoft.com/office/drawing/2010/main" val="0"/>
+              </a:ext>
+            </a:extLst>
+          </a:blip>
+          <a:stretch>
+            <a:fillRect/>
+          </a:stretch>
+        </p:blipFill>
+        <p:spPr>
+          <a:xfrm>
+            <a:off x="5143040" y="4691906"/>
+            <a:ext cx="175923" cy="175923"/>
+          </a:xfrm>
+          <a:prstGeom prst="rect">
+            <a:avLst/>
+          </a:prstGeom>
+        </p:spPr>
+      </p:pic>
+      <p:sp>
+        <p:nvSpPr>
+          <p:cNvPr id="2" name="직사각형 1">
+            <a:extLst>
+              <a:ext uri="{FF2B5EF4-FFF2-40B4-BE49-F238E27FC236}">
+                <a16:creationId xmlns:a16="http://schemas.microsoft.com/office/drawing/2014/main" id="{620B3E84-732D-42F2-85B0-C3694B71122E}"/>
+              </a:ext>
+            </a:extLst>
+          </p:cNvPr>
+          <p:cNvSpPr/>
+          <p:nvPr/>
+        </p:nvSpPr>
+        <p:spPr>
+          <a:xfrm>
+            <a:off x="4486977" y="858218"/>
+            <a:ext cx="377694" cy="234000"/>
+          </a:xfrm>
+          <a:prstGeom prst="rect">
+            <a:avLst/>
+          </a:prstGeom>
+          <a:solidFill>
+            <a:schemeClr val="bg1"/>
+          </a:solidFill>
+          <a:ln w="19050">
             <a:solidFill>
               <a:schemeClr val="tx1"/>
             </a:solidFill>
@@ -22876,72 +22959,6 @@
     <p:extLst>
       <p:ext uri="{BB962C8B-B14F-4D97-AF65-F5344CB8AC3E}">
         <p14:creationId xmlns:p14="http://schemas.microsoft.com/office/powerpoint/2010/main" val="1519663067"/>
-      </p:ext>
-    </p:extLst>
-  </p:cSld>
-  <p:clrMapOvr>
-    <a:masterClrMapping/>
-  </p:clrMapOvr>
-</p:sld>
-</file>
-
-<file path=ppt/slides/slide5.xml><?xml version="1.0" encoding="utf-8"?>
-<p:sld xmlns:a="http://schemas.openxmlformats.org/drawingml/2006/main" xmlns:r="http://schemas.openxmlformats.org/officeDocument/2006/relationships" xmlns:p="http://schemas.openxmlformats.org/presentationml/2006/main">
-  <p:cSld>
-    <p:spTree>
-      <p:nvGrpSpPr>
-        <p:cNvPr id="1" name=""/>
-        <p:cNvGrpSpPr/>
-        <p:nvPr/>
-      </p:nvGrpSpPr>
-      <p:grpSpPr>
-        <a:xfrm>
-          <a:off x="0" y="0"/>
-          <a:ext cx="0" cy="0"/>
-          <a:chOff x="0" y="0"/>
-          <a:chExt cx="0" cy="0"/>
-        </a:xfrm>
-      </p:grpSpPr>
-      <p:pic>
-        <p:nvPicPr>
-          <p:cNvPr id="3" name="그림 2">
-            <a:extLst>
-              <a:ext uri="{FF2B5EF4-FFF2-40B4-BE49-F238E27FC236}">
-                <a16:creationId xmlns:a16="http://schemas.microsoft.com/office/drawing/2014/main" id="{592AE947-D5E7-4A85-A94A-F0C24CDDFB82}"/>
-              </a:ext>
-            </a:extLst>
-          </p:cNvPr>
-          <p:cNvPicPr>
-            <a:picLocks noChangeAspect="1"/>
-          </p:cNvPicPr>
-          <p:nvPr/>
-        </p:nvPicPr>
-        <p:blipFill>
-          <a:blip r:embed="rId2">
-            <a:extLst>
-              <a:ext uri="{28A0092B-C50C-407E-A947-70E740481C1C}">
-                <a14:useLocalDpi xmlns:a14="http://schemas.microsoft.com/office/drawing/2010/main" val="0"/>
-              </a:ext>
-            </a:extLst>
-          </a:blip>
-          <a:stretch>
-            <a:fillRect/>
-          </a:stretch>
-        </p:blipFill>
-        <p:spPr>
-          <a:xfrm>
-            <a:off x="1914525" y="33337"/>
-            <a:ext cx="8362950" cy="6791325"/>
-          </a:xfrm>
-          <a:prstGeom prst="rect">
-            <a:avLst/>
-          </a:prstGeom>
-        </p:spPr>
-      </p:pic>
-    </p:spTree>
-    <p:extLst>
-      <p:ext uri="{BB962C8B-B14F-4D97-AF65-F5344CB8AC3E}">
-        <p14:creationId xmlns:p14="http://schemas.microsoft.com/office/powerpoint/2010/main" val="1953337296"/>
       </p:ext>
     </p:extLst>
   </p:cSld>

</xml_diff>

<commit_message>
Fix line, increase resolution
Increase resolution to 4000x2250 for fuzzy text
</commit_message>
<xml_diff>
--- a/img/map_make/map_pptx/map 2.0.pptx
+++ b/img/map_make/map_pptx/map 2.0.pptx
@@ -7,8 +7,9 @@
   <p:sldIdLst>
     <p:sldId id="269" r:id="rId2"/>
     <p:sldId id="270" r:id="rId3"/>
-    <p:sldId id="272" r:id="rId4"/>
-    <p:sldId id="274" r:id="rId5"/>
+    <p:sldId id="275" r:id="rId4"/>
+    <p:sldId id="272" r:id="rId5"/>
+    <p:sldId id="274" r:id="rId6"/>
   </p:sldIdLst>
   <p:sldSz cx="12192000" cy="6858000"/>
   <p:notesSz cx="6858000" cy="9144000"/>
@@ -8387,6 +8388,60 @@
           </a:fontRef>
         </p:style>
       </p:cxnSp>
+      <p:sp>
+        <p:nvSpPr>
+          <p:cNvPr id="107" name="직사각형 106">
+            <a:extLst>
+              <a:ext uri="{FF2B5EF4-FFF2-40B4-BE49-F238E27FC236}">
+                <a16:creationId xmlns:a16="http://schemas.microsoft.com/office/drawing/2014/main" id="{7BCA07EC-A9DE-432A-B430-33A57366CCD2}"/>
+              </a:ext>
+            </a:extLst>
+          </p:cNvPr>
+          <p:cNvSpPr/>
+          <p:nvPr/>
+        </p:nvSpPr>
+        <p:spPr>
+          <a:xfrm>
+            <a:off x="4486977" y="858218"/>
+            <a:ext cx="377694" cy="234000"/>
+          </a:xfrm>
+          <a:prstGeom prst="rect">
+            <a:avLst/>
+          </a:prstGeom>
+          <a:solidFill>
+            <a:schemeClr val="bg1"/>
+          </a:solidFill>
+          <a:ln w="19050">
+            <a:solidFill>
+              <a:schemeClr val="tx1"/>
+            </a:solidFill>
+          </a:ln>
+        </p:spPr>
+        <p:style>
+          <a:lnRef idx="2">
+            <a:schemeClr val="accent1">
+              <a:shade val="50000"/>
+            </a:schemeClr>
+          </a:lnRef>
+          <a:fillRef idx="1">
+            <a:schemeClr val="accent1"/>
+          </a:fillRef>
+          <a:effectRef idx="0">
+            <a:schemeClr val="accent1"/>
+          </a:effectRef>
+          <a:fontRef idx="minor">
+            <a:schemeClr val="lt1"/>
+          </a:fontRef>
+        </p:style>
+        <p:txBody>
+          <a:bodyPr rtlCol="0" anchor="ctr"/>
+          <a:lstStyle/>
+          <a:p>
+            <a:pPr algn="ctr"/>
+            <a:endParaRPr lang="ko-KR" altLang="en-US"/>
+          </a:p>
+        </p:txBody>
+      </p:sp>
     </p:spTree>
     <p:extLst>
       <p:ext uri="{BB962C8B-B14F-4D97-AF65-F5344CB8AC3E}">
@@ -8419,10 +8474,10 @@
       </p:grpSpPr>
       <p:sp>
         <p:nvSpPr>
-          <p:cNvPr id="148" name="자유형: 도형 147">
+          <p:cNvPr id="118" name="자유형: 도형 117">
             <a:extLst>
               <a:ext uri="{FF2B5EF4-FFF2-40B4-BE49-F238E27FC236}">
-                <a16:creationId xmlns:a16="http://schemas.microsoft.com/office/drawing/2014/main" id="{2F81B010-EF69-4771-A762-75B399BEB122}"/>
+                <a16:creationId xmlns:a16="http://schemas.microsoft.com/office/drawing/2014/main" id="{53B44B04-B10A-4982-889F-8DBD8AFB8843}"/>
               </a:ext>
             </a:extLst>
           </p:cNvPr>
@@ -8454,9 +8509,9 @@
               <a:gd name="connsiteX7" fmla="*/ 0 w 8376994"/>
               <a:gd name="connsiteY7" fmla="*/ 3620016 h 3620016"/>
               <a:gd name="connsiteX8" fmla="*/ 0 w 8376994"/>
-              <a:gd name="connsiteY8" fmla="*/ 1592965 h 3620016"/>
+              <a:gd name="connsiteY8" fmla="*/ 2930018 h 3620016"/>
               <a:gd name="connsiteX9" fmla="*/ 7739 w 8376994"/>
-              <a:gd name="connsiteY9" fmla="*/ 1592965 h 3620016"/>
+              <a:gd name="connsiteY9" fmla="*/ 2930018 h 3620016"/>
               <a:gd name="connsiteX10" fmla="*/ 7739 w 8376994"/>
               <a:gd name="connsiteY10" fmla="*/ 2945095 h 3620016"/>
               <a:gd name="connsiteX11" fmla="*/ 384551 w 8376994"/>
@@ -8579,10 +8634,10 @@
                   <a:pt x="0" y="3620016"/>
                 </a:lnTo>
                 <a:lnTo>
-                  <a:pt x="0" y="1592965"/>
+                  <a:pt x="0" y="2930018"/>
                 </a:lnTo>
                 <a:lnTo>
-                  <a:pt x="7739" y="1592965"/>
+                  <a:pt x="7739" y="2930018"/>
                 </a:lnTo>
                 <a:lnTo>
                   <a:pt x="7739" y="2945095"/>
@@ -9119,10 +9174,10 @@
       </p:graphicFrame>
       <p:sp>
         <p:nvSpPr>
-          <p:cNvPr id="146" name="자유형: 도형 145">
+          <p:cNvPr id="117" name="자유형: 도형 116">
             <a:extLst>
               <a:ext uri="{FF2B5EF4-FFF2-40B4-BE49-F238E27FC236}">
-                <a16:creationId xmlns:a16="http://schemas.microsoft.com/office/drawing/2014/main" id="{B5E91EB2-22E1-4F0E-AC8F-B3119AFF86CD}"/>
+                <a16:creationId xmlns:a16="http://schemas.microsoft.com/office/drawing/2014/main" id="{B22FE761-AB87-4388-9089-328E0E8F8BB3}"/>
               </a:ext>
             </a:extLst>
           </p:cNvPr>
@@ -9175,12 +9230,12 @@
               <a:gd name="connsiteY17" fmla="*/ 3792071 h 3792205"/>
               <a:gd name="connsiteX18" fmla="*/ 384997 w 8372637"/>
               <a:gd name="connsiteY18" fmla="*/ 1133213 h 3792205"/>
-              <a:gd name="connsiteX19" fmla="*/ 8185 w 8372637"/>
+              <a:gd name="connsiteX19" fmla="*/ 85653 w 8372637"/>
               <a:gd name="connsiteY19" fmla="*/ 1133213 h 3792205"/>
-              <a:gd name="connsiteX20" fmla="*/ 8185 w 8372637"/>
-              <a:gd name="connsiteY20" fmla="*/ 2203236 h 3792205"/>
+              <a:gd name="connsiteX20" fmla="*/ 85653 w 8372637"/>
+              <a:gd name="connsiteY20" fmla="*/ 1114238 h 3792205"/>
               <a:gd name="connsiteX21" fmla="*/ 0 w 8372637"/>
-              <a:gd name="connsiteY21" fmla="*/ 2203236 h 3792205"/>
+              <a:gd name="connsiteY21" fmla="*/ 1114238 h 3792205"/>
             </a:gdLst>
             <a:ahLst/>
             <a:cxnLst>
@@ -9312,13 +9367,13 @@
                   <a:pt x="384997" y="1133213"/>
                 </a:lnTo>
                 <a:lnTo>
-                  <a:pt x="8185" y="1133213"/>
+                  <a:pt x="85653" y="1133213"/>
                 </a:lnTo>
                 <a:lnTo>
-                  <a:pt x="8185" y="2203236"/>
+                  <a:pt x="85653" y="1114238"/>
                 </a:lnTo>
                 <a:lnTo>
-                  <a:pt x="0" y="2203236"/>
+                  <a:pt x="0" y="1114238"/>
                 </a:lnTo>
                 <a:close/>
               </a:path>
@@ -10412,49 +10467,6 @@
       </p:grpSp>
       <p:cxnSp>
         <p:nvCxnSpPr>
-          <p:cNvPr id="81" name="직선 연결선 80">
-            <a:extLst>
-              <a:ext uri="{FF2B5EF4-FFF2-40B4-BE49-F238E27FC236}">
-                <a16:creationId xmlns:a16="http://schemas.microsoft.com/office/drawing/2014/main" id="{78CEC05C-B9B7-476E-B4D4-19B65632FD25}"/>
-              </a:ext>
-            </a:extLst>
-          </p:cNvPr>
-          <p:cNvCxnSpPr>
-            <a:cxnSpLocks/>
-          </p:cNvCxnSpPr>
-          <p:nvPr/>
-        </p:nvCxnSpPr>
-        <p:spPr>
-          <a:xfrm>
-            <a:off x="3572109" y="3647945"/>
-            <a:ext cx="0" cy="132046"/>
-          </a:xfrm>
-          <a:prstGeom prst="line">
-            <a:avLst/>
-          </a:prstGeom>
-          <a:ln w="19050">
-            <a:solidFill>
-              <a:schemeClr val="tx1"/>
-            </a:solidFill>
-          </a:ln>
-        </p:spPr>
-        <p:style>
-          <a:lnRef idx="1">
-            <a:schemeClr val="accent1"/>
-          </a:lnRef>
-          <a:fillRef idx="0">
-            <a:schemeClr val="accent1"/>
-          </a:fillRef>
-          <a:effectRef idx="0">
-            <a:schemeClr val="accent1"/>
-          </a:effectRef>
-          <a:fontRef idx="minor">
-            <a:schemeClr val="tx1"/>
-          </a:fontRef>
-        </p:style>
-      </p:cxnSp>
-      <p:cxnSp>
-        <p:nvCxnSpPr>
           <p:cNvPr id="84" name="직선 연결선 83">
             <a:extLst>
               <a:ext uri="{FF2B5EF4-FFF2-40B4-BE49-F238E27FC236}">
@@ -13844,7 +13856,7 @@
           <p:nvPr>
             <p:extLst>
               <p:ext uri="{D42A27DB-BD31-4B8C-83A1-F6EECF244321}">
-                <p14:modId xmlns:p14="http://schemas.microsoft.com/office/powerpoint/2010/main" val="3691197512"/>
+                <p14:modId xmlns:p14="http://schemas.microsoft.com/office/powerpoint/2010/main" val="941258427"/>
               </p:ext>
             </p:extLst>
           </p:nvPr>
@@ -13884,7 +13896,7 @@
                           <a:ea typeface="나눔스퀘어OTF" panose="020B0600000101010101" pitchFamily="34" charset="-127"/>
                           <a:cs typeface="+mn-cs"/>
                         </a:rPr>
-                        <a:t>94</a:t>
+                        <a:t>094</a:t>
                       </a:r>
                       <a:endParaRPr lang="ko-KR" altLang="en-US" sz="700" kern="1200">
                         <a:solidFill>
@@ -14325,7 +14337,7 @@
           <p:nvPr>
             <p:extLst>
               <p:ext uri="{D42A27DB-BD31-4B8C-83A1-F6EECF244321}">
-                <p14:modId xmlns:p14="http://schemas.microsoft.com/office/powerpoint/2010/main" val="3441900894"/>
+                <p14:modId xmlns:p14="http://schemas.microsoft.com/office/powerpoint/2010/main" val="3923301575"/>
               </p:ext>
             </p:extLst>
           </p:nvPr>
@@ -14365,7 +14377,7 @@
                           <a:ea typeface="나눔스퀘어OTF" panose="020B0600000101010101" pitchFamily="34" charset="-127"/>
                           <a:cs typeface="+mn-cs"/>
                         </a:rPr>
-                        <a:t>93</a:t>
+                        <a:t>093</a:t>
                       </a:r>
                       <a:endParaRPr lang="ko-KR" altLang="en-US" sz="700" kern="1200">
                         <a:solidFill>
@@ -14760,7 +14772,7 @@
                           <a:ea typeface="나눔스퀘어OTF" panose="020B0600000101010101" pitchFamily="34" charset="-127"/>
                           <a:cs typeface="+mn-cs"/>
                         </a:rPr>
-                        <a:t>81</a:t>
+                        <a:t>081</a:t>
                       </a:r>
                       <a:endParaRPr lang="ko-KR" altLang="en-US" sz="700" kern="1200">
                         <a:solidFill>
@@ -21248,7 +21260,7 @@
         </p:nvSpPr>
         <p:spPr>
           <a:xfrm>
-            <a:off x="5117217" y="4702957"/>
+            <a:off x="5118805" y="4701369"/>
             <a:ext cx="225117" cy="151618"/>
           </a:xfrm>
           <a:prstGeom prst="rect">
@@ -21305,7 +21317,7 @@
         </p:nvSpPr>
         <p:spPr>
           <a:xfrm>
-            <a:off x="3421081" y="3647945"/>
+            <a:off x="3420889" y="3646045"/>
             <a:ext cx="149619" cy="211142"/>
           </a:xfrm>
           <a:prstGeom prst="rect">
@@ -22725,7 +22737,7 @@
         </p:blipFill>
         <p:spPr>
           <a:xfrm>
-            <a:off x="3411015" y="3665554"/>
+            <a:off x="3410823" y="3663654"/>
             <a:ext cx="175923" cy="175923"/>
           </a:xfrm>
           <a:prstGeom prst="rect">
@@ -22761,7 +22773,7 @@
         </p:blipFill>
         <p:spPr>
           <a:xfrm>
-            <a:off x="5143040" y="4691906"/>
+            <a:off x="5144628" y="4690318"/>
             <a:ext cx="175923" cy="175923"/>
           </a:xfrm>
           <a:prstGeom prst="rect">
@@ -22823,6 +22835,49 @@
           </a:p>
         </p:txBody>
       </p:sp>
+      <p:cxnSp>
+        <p:nvCxnSpPr>
+          <p:cNvPr id="81" name="직선 연결선 80">
+            <a:extLst>
+              <a:ext uri="{FF2B5EF4-FFF2-40B4-BE49-F238E27FC236}">
+                <a16:creationId xmlns:a16="http://schemas.microsoft.com/office/drawing/2014/main" id="{78CEC05C-B9B7-476E-B4D4-19B65632FD25}"/>
+              </a:ext>
+            </a:extLst>
+          </p:cNvPr>
+          <p:cNvCxnSpPr>
+            <a:cxnSpLocks/>
+          </p:cNvCxnSpPr>
+          <p:nvPr/>
+        </p:nvCxnSpPr>
+        <p:spPr>
+          <a:xfrm>
+            <a:off x="3572109" y="3647945"/>
+            <a:ext cx="0" cy="132046"/>
+          </a:xfrm>
+          <a:prstGeom prst="line">
+            <a:avLst/>
+          </a:prstGeom>
+          <a:ln w="19050">
+            <a:solidFill>
+              <a:schemeClr val="tx1"/>
+            </a:solidFill>
+          </a:ln>
+        </p:spPr>
+        <p:style>
+          <a:lnRef idx="1">
+            <a:schemeClr val="accent1"/>
+          </a:lnRef>
+          <a:fillRef idx="0">
+            <a:schemeClr val="accent1"/>
+          </a:fillRef>
+          <a:effectRef idx="0">
+            <a:schemeClr val="accent1"/>
+          </a:effectRef>
+          <a:fontRef idx="minor">
+            <a:schemeClr val="tx1"/>
+          </a:fontRef>
+        </p:style>
+      </p:cxnSp>
     </p:spTree>
     <p:extLst>
       <p:ext uri="{BB962C8B-B14F-4D97-AF65-F5344CB8AC3E}">
@@ -22858,6 +22913,72 @@
           <p:cNvPr id="3" name="그림 2">
             <a:extLst>
               <a:ext uri="{FF2B5EF4-FFF2-40B4-BE49-F238E27FC236}">
+                <a16:creationId xmlns:a16="http://schemas.microsoft.com/office/drawing/2014/main" id="{96ABBCD8-5368-49C5-9E4C-77E520BA285E}"/>
+              </a:ext>
+            </a:extLst>
+          </p:cNvPr>
+          <p:cNvPicPr>
+            <a:picLocks noChangeAspect="1"/>
+          </p:cNvPicPr>
+          <p:nvPr/>
+        </p:nvPicPr>
+        <p:blipFill>
+          <a:blip r:embed="rId2">
+            <a:extLst>
+              <a:ext uri="{28A0092B-C50C-407E-A947-70E740481C1C}">
+                <a14:useLocalDpi xmlns:a14="http://schemas.microsoft.com/office/drawing/2010/main" val="0"/>
+              </a:ext>
+            </a:extLst>
+          </a:blip>
+          <a:stretch>
+            <a:fillRect/>
+          </a:stretch>
+        </p:blipFill>
+        <p:spPr>
+          <a:xfrm>
+            <a:off x="1658062" y="0"/>
+            <a:ext cx="8875875" cy="6858000"/>
+          </a:xfrm>
+          <a:prstGeom prst="rect">
+            <a:avLst/>
+          </a:prstGeom>
+        </p:spPr>
+      </p:pic>
+    </p:spTree>
+    <p:extLst>
+      <p:ext uri="{BB962C8B-B14F-4D97-AF65-F5344CB8AC3E}">
+        <p14:creationId xmlns:p14="http://schemas.microsoft.com/office/powerpoint/2010/main" val="1517023570"/>
+      </p:ext>
+    </p:extLst>
+  </p:cSld>
+  <p:clrMapOvr>
+    <a:masterClrMapping/>
+  </p:clrMapOvr>
+</p:sld>
+</file>
+
+<file path=ppt/slides/slide4.xml><?xml version="1.0" encoding="utf-8"?>
+<p:sld xmlns:a="http://schemas.openxmlformats.org/drawingml/2006/main" xmlns:r="http://schemas.openxmlformats.org/officeDocument/2006/relationships" xmlns:p="http://schemas.openxmlformats.org/presentationml/2006/main">
+  <p:cSld>
+    <p:spTree>
+      <p:nvGrpSpPr>
+        <p:cNvPr id="1" name=""/>
+        <p:cNvGrpSpPr/>
+        <p:nvPr/>
+      </p:nvGrpSpPr>
+      <p:grpSpPr>
+        <a:xfrm>
+          <a:off x="0" y="0"/>
+          <a:ext cx="0" cy="0"/>
+          <a:chOff x="0" y="0"/>
+          <a:chExt cx="0" cy="0"/>
+        </a:xfrm>
+      </p:grpSpPr>
+      <p:pic>
+        <p:nvPicPr>
+          <p:cNvPr id="3" name="그림 2">
+            <a:extLst>
+              <a:ext uri="{FF2B5EF4-FFF2-40B4-BE49-F238E27FC236}">
                 <a16:creationId xmlns:a16="http://schemas.microsoft.com/office/drawing/2014/main" id="{30233E3F-5DE5-45CF-9406-D042D52DAAB7}"/>
               </a:ext>
             </a:extLst>
@@ -22902,7 +23023,7 @@
 </p:sld>
 </file>
 
-<file path=ppt/slides/slide4.xml><?xml version="1.0" encoding="utf-8"?>
+<file path=ppt/slides/slide5.xml><?xml version="1.0" encoding="utf-8"?>
 <p:sld xmlns:a="http://schemas.openxmlformats.org/drawingml/2006/main" xmlns:r="http://schemas.openxmlformats.org/officeDocument/2006/relationships" xmlns:p="http://schemas.openxmlformats.org/presentationml/2006/main">
   <p:cSld>
     <p:spTree>

</xml_diff>

<commit_message>
Fix shelf location in 2F, 3F, 4F
</commit_message>
<xml_diff>
--- a/img/map_make/map_pptx/map 2.0.pptx
+++ b/img/map_make/map_pptx/map 2.0.pptx
@@ -3505,7 +3505,7 @@
         </p:nvSpPr>
         <p:spPr>
           <a:xfrm>
-            <a:off x="1898237" y="3311072"/>
+            <a:off x="1902471" y="3313189"/>
             <a:ext cx="1184613" cy="953996"/>
           </a:xfrm>
           <a:custGeom>
@@ -3924,7 +3924,7 @@
         </p:nvSpPr>
         <p:spPr>
           <a:xfrm>
-            <a:off x="1921577" y="1660651"/>
+            <a:off x="1920293" y="1660651"/>
             <a:ext cx="1775881" cy="1650421"/>
           </a:xfrm>
           <a:custGeom>
@@ -5526,7 +5526,7 @@
         </p:nvSpPr>
         <p:spPr>
           <a:xfrm>
-            <a:off x="1901449" y="2764770"/>
+            <a:off x="1901449" y="2756830"/>
             <a:ext cx="822857" cy="552857"/>
           </a:xfrm>
           <a:prstGeom prst="rect">
@@ -5578,7 +5578,59 @@
         </p:nvSpPr>
         <p:spPr>
           <a:xfrm>
-            <a:off x="1901400" y="2215730"/>
+            <a:off x="1901400" y="2210966"/>
+            <a:ext cx="822857" cy="547200"/>
+          </a:xfrm>
+          <a:prstGeom prst="rect">
+            <a:avLst/>
+          </a:prstGeom>
+          <a:noFill/>
+          <a:ln w="19050">
+            <a:solidFill>
+              <a:schemeClr val="tx1"/>
+            </a:solidFill>
+          </a:ln>
+        </p:spPr>
+        <p:style>
+          <a:lnRef idx="2">
+            <a:schemeClr val="accent1">
+              <a:shade val="50000"/>
+            </a:schemeClr>
+          </a:lnRef>
+          <a:fillRef idx="1">
+            <a:schemeClr val="accent1"/>
+          </a:fillRef>
+          <a:effectRef idx="0">
+            <a:schemeClr val="accent1"/>
+          </a:effectRef>
+          <a:fontRef idx="minor">
+            <a:schemeClr val="lt1"/>
+          </a:fontRef>
+        </p:style>
+        <p:txBody>
+          <a:bodyPr rtlCol="0" anchor="ctr"/>
+          <a:lstStyle/>
+          <a:p>
+            <a:pPr algn="ctr"/>
+            <a:endParaRPr lang="ko-KR" altLang="en-US" sz="688"/>
+          </a:p>
+        </p:txBody>
+      </p:sp>
+      <p:sp>
+        <p:nvSpPr>
+          <p:cNvPr id="130" name="직사각형 129">
+            <a:extLst>
+              <a:ext uri="{FF2B5EF4-FFF2-40B4-BE49-F238E27FC236}">
+                <a16:creationId xmlns:a16="http://schemas.microsoft.com/office/drawing/2014/main" id="{7B4CD226-A05D-488D-8790-6F6C9ED3168F}"/>
+              </a:ext>
+            </a:extLst>
+          </p:cNvPr>
+          <p:cNvSpPr/>
+          <p:nvPr/>
+        </p:nvSpPr>
+        <p:spPr>
+          <a:xfrm>
+            <a:off x="1901262" y="1661241"/>
             <a:ext cx="822857" cy="552857"/>
           </a:xfrm>
           <a:prstGeom prst="rect">
@@ -5618,10 +5670,10 @@
       </p:sp>
       <p:sp>
         <p:nvSpPr>
-          <p:cNvPr id="130" name="직사각형 129">
+          <p:cNvPr id="131" name="직사각형 130">
             <a:extLst>
               <a:ext uri="{FF2B5EF4-FFF2-40B4-BE49-F238E27FC236}">
-                <a16:creationId xmlns:a16="http://schemas.microsoft.com/office/drawing/2014/main" id="{7B4CD226-A05D-488D-8790-6F6C9ED3168F}"/>
+                <a16:creationId xmlns:a16="http://schemas.microsoft.com/office/drawing/2014/main" id="{72961F6B-456B-4F44-85E1-D6F95EF0279C}"/>
               </a:ext>
             </a:extLst>
           </p:cNvPr>
@@ -5630,59 +5682,7 @@
         </p:nvSpPr>
         <p:spPr>
           <a:xfrm>
-            <a:off x="1901262" y="1664417"/>
-            <a:ext cx="822857" cy="552857"/>
-          </a:xfrm>
-          <a:prstGeom prst="rect">
-            <a:avLst/>
-          </a:prstGeom>
-          <a:noFill/>
-          <a:ln w="19050">
-            <a:solidFill>
-              <a:schemeClr val="tx1"/>
-            </a:solidFill>
-          </a:ln>
-        </p:spPr>
-        <p:style>
-          <a:lnRef idx="2">
-            <a:schemeClr val="accent1">
-              <a:shade val="50000"/>
-            </a:schemeClr>
-          </a:lnRef>
-          <a:fillRef idx="1">
-            <a:schemeClr val="accent1"/>
-          </a:fillRef>
-          <a:effectRef idx="0">
-            <a:schemeClr val="accent1"/>
-          </a:effectRef>
-          <a:fontRef idx="minor">
-            <a:schemeClr val="lt1"/>
-          </a:fontRef>
-        </p:style>
-        <p:txBody>
-          <a:bodyPr rtlCol="0" anchor="ctr"/>
-          <a:lstStyle/>
-          <a:p>
-            <a:pPr algn="ctr"/>
-            <a:endParaRPr lang="ko-KR" altLang="en-US" sz="688"/>
-          </a:p>
-        </p:txBody>
-      </p:sp>
-      <p:sp>
-        <p:nvSpPr>
-          <p:cNvPr id="131" name="직사각형 130">
-            <a:extLst>
-              <a:ext uri="{FF2B5EF4-FFF2-40B4-BE49-F238E27FC236}">
-                <a16:creationId xmlns:a16="http://schemas.microsoft.com/office/drawing/2014/main" id="{72961F6B-456B-4F44-85E1-D6F95EF0279C}"/>
-              </a:ext>
-            </a:extLst>
-          </p:cNvPr>
-          <p:cNvSpPr/>
-          <p:nvPr/>
-        </p:nvSpPr>
-        <p:spPr>
-          <a:xfrm>
-            <a:off x="2723460" y="2219536"/>
+            <a:off x="2724044" y="2220269"/>
             <a:ext cx="846357" cy="1091536"/>
           </a:xfrm>
           <a:prstGeom prst="rect">
@@ -7261,7 +7261,7 @@
         </p:nvSpPr>
         <p:spPr>
           <a:xfrm rot="5400000">
-            <a:off x="2551025" y="3230206"/>
+            <a:off x="2555788" y="3230206"/>
             <a:ext cx="334286" cy="334285"/>
           </a:xfrm>
           <a:prstGeom prst="pie">

</xml_diff>